<commit_message>
chapter 4 add equation
</commit_message>
<xml_diff>
--- a/images/data_flow.pptx
+++ b/images/data_flow.pptx
@@ -4845,8 +4845,8 @@
         </p:nvSpPr>
         <p:spPr>
           <a:xfrm>
-            <a:off x="12507118" y="12115480"/>
-            <a:ext cx="1715330" cy="495300"/>
+            <a:off x="12354560" y="12115165"/>
+            <a:ext cx="1886585" cy="495300"/>
           </a:xfrm>
           <a:prstGeom prst="rect">
             <a:avLst/>
@@ -4873,7 +4873,7 @@
               <a:t>ψ</a:t>
             </a:r>
             <a:r>
-              <a:rPr lang="en-US" altLang="de-DE" sz="2625" i="1" dirty="0" smtClean="0">
+              <a:rPr lang="en-US" altLang="de-DE" sz="2625" i="1" baseline="30000" dirty="0" smtClean="0">
                 <a:effectLst>
                   <a:outerShdw blurRad="38100" dist="38100" dir="2700000" algn="tl">
                     <a:srgbClr val="000000">
@@ -4884,7 +4884,7 @@
                 <a:cs typeface="Calibri" panose="020F0502020204030204" charset="0"/>
                 <a:sym typeface="+mn-ea"/>
               </a:rPr>
-              <a:t>2</a:t>
+              <a:t>trg</a:t>
             </a:r>
             <a:r>
               <a:rPr lang="en-US" altLang="de-DE" sz="2630" i="1" dirty="0" smtClean="0">
@@ -4896,7 +4896,21 @@
                   </a:outerShdw>
                 </a:effectLst>
               </a:rPr>
-              <a:t> and k</a:t>
+              <a:t> and  k</a:t>
+            </a:r>
+            <a:r>
+              <a:rPr lang="en-US" altLang="de-DE" sz="2625" i="1" baseline="30000" dirty="0" smtClean="0">
+                <a:effectLst>
+                  <a:outerShdw blurRad="38100" dist="38100" dir="2700000" algn="tl">
+                    <a:srgbClr val="000000">
+                      <a:alpha val="43137"/>
+                    </a:srgbClr>
+                  </a:outerShdw>
+                </a:effectLst>
+                <a:cs typeface="Calibri" panose="020F0502020204030204" charset="0"/>
+                <a:sym typeface="+mn-ea"/>
+              </a:rPr>
+              <a:t>trg</a:t>
             </a:r>
             <a:endParaRPr lang="en-US" altLang="de-DE" sz="2630" i="1" dirty="0" smtClean="0">
               <a:effectLst>
@@ -4957,7 +4971,7 @@
         </p:nvSpPr>
         <p:spPr>
           <a:xfrm>
-            <a:off x="3391069" y="12077528"/>
+            <a:off x="3238669" y="12077528"/>
             <a:ext cx="3086985" cy="495300"/>
           </a:xfrm>
           <a:prstGeom prst="rect">
@@ -4971,7 +4985,7 @@
           </a:bodyPr>
           <a:p>
             <a:r>
-              <a:rPr lang="de-DE" sz="2630" i="1" dirty="0" smtClean="0">
+              <a:rPr lang="de-DE" sz="2625" i="1" dirty="0" smtClean="0">
                 <a:effectLst>
                   <a:outerShdw blurRad="38100" dist="38100" dir="2700000" algn="tl">
                     <a:srgbClr val="000000">
@@ -4980,8 +4994,23 @@
                   </a:outerShdw>
                 </a:effectLst>
                 <a:cs typeface="Calibri" panose="020F0502020204030204" charset="0"/>
+                <a:sym typeface="+mn-ea"/>
               </a:rPr>
               <a:t>ψ</a:t>
+            </a:r>
+            <a:r>
+              <a:rPr lang="en-US" altLang="de-DE" sz="2625" i="1" baseline="30000" dirty="0" smtClean="0">
+                <a:effectLst>
+                  <a:outerShdw blurRad="38100" dist="38100" dir="2700000" algn="tl">
+                    <a:srgbClr val="000000">
+                      <a:alpha val="43137"/>
+                    </a:srgbClr>
+                  </a:outerShdw>
+                </a:effectLst>
+                <a:cs typeface="Calibri" panose="020F0502020204030204" charset="0"/>
+                <a:sym typeface="+mn-ea"/>
+              </a:rPr>
+              <a:t>src</a:t>
             </a:r>
             <a:r>
               <a:rPr lang="en-US" altLang="de-DE" sz="2630" i="1" dirty="0" smtClean="0">
@@ -4993,7 +5022,34 @@
                   </a:outerShdw>
                 </a:effectLst>
               </a:rPr>
-              <a:t>1 and k</a:t>
+              <a:t> and K</a:t>
+            </a:r>
+            <a:r>
+              <a:rPr lang="en-US" altLang="de-DE" sz="2625" i="1" baseline="30000" dirty="0" smtClean="0">
+                <a:effectLst>
+                  <a:outerShdw blurRad="38100" dist="38100" dir="2700000" algn="tl">
+                    <a:srgbClr val="000000">
+                      <a:alpha val="43137"/>
+                    </a:srgbClr>
+                  </a:outerShdw>
+                </a:effectLst>
+                <a:cs typeface="Calibri" panose="020F0502020204030204" charset="0"/>
+                <a:sym typeface="+mn-ea"/>
+              </a:rPr>
+              <a:t>src</a:t>
+            </a:r>
+            <a:r>
+              <a:rPr lang="en-US" altLang="de-DE" sz="2625" i="1" dirty="0" smtClean="0">
+                <a:effectLst>
+                  <a:outerShdw blurRad="38100" dist="38100" dir="2700000" algn="tl">
+                    <a:srgbClr val="000000">
+                      <a:alpha val="43137"/>
+                    </a:srgbClr>
+                  </a:outerShdw>
+                </a:effectLst>
+                <a:sym typeface="+mn-ea"/>
+              </a:rPr>
+              <a:t> </a:t>
             </a:r>
             <a:endParaRPr lang="en-US" altLang="de-DE" sz="2630" i="1" dirty="0" smtClean="0">
               <a:effectLst>
@@ -5445,8 +5501,8 @@
         </p:nvSpPr>
         <p:spPr>
           <a:xfrm>
-            <a:off x="13864677" y="15142404"/>
-            <a:ext cx="3086985" cy="495300"/>
+            <a:off x="13864590" y="15142210"/>
+            <a:ext cx="3612515" cy="495300"/>
           </a:xfrm>
           <a:prstGeom prst="rect">
             <a:avLst/>
@@ -5525,7 +5581,7 @@
               <a:t>ψ</a:t>
             </a:r>
             <a:r>
-              <a:rPr lang="en-US" altLang="de-DE" sz="2625" i="1" baseline="-25000" dirty="0" smtClean="0">
+              <a:rPr lang="en-US" altLang="de-DE" sz="2625" i="1" baseline="30000" dirty="0" smtClean="0">
                 <a:effectLst>
                   <a:outerShdw blurRad="38100" dist="38100" dir="2700000" algn="tl">
                     <a:srgbClr val="000000">
@@ -5535,20 +5591,7 @@
                 </a:effectLst>
                 <a:sym typeface="+mn-ea"/>
               </a:rPr>
-              <a:t>trg</a:t>
-            </a:r>
-            <a:r>
-              <a:rPr lang="en-US" altLang="de-DE" sz="2625" i="1" baseline="-25000" dirty="0" smtClean="0">
-                <a:effectLst>
-                  <a:outerShdw blurRad="38100" dist="38100" dir="2700000" algn="tl">
-                    <a:srgbClr val="000000">
-                      <a:alpha val="43137"/>
-                    </a:srgbClr>
-                  </a:outerShdw>
-                </a:effectLst>
-                <a:sym typeface="+mn-ea"/>
-              </a:rPr>
-              <a:t> </a:t>
+              <a:t>trg </a:t>
             </a:r>
             <a:r>
               <a:rPr lang="en-US" altLang="de-DE" sz="2625" i="1" dirty="0" smtClean="0">
@@ -5564,6 +5607,33 @@
               <a:t>and </a:t>
             </a:r>
             <a:r>
+              <a:rPr lang="en-US" altLang="de-DE" sz="2625" i="1" dirty="0" smtClean="0">
+                <a:effectLst>
+                  <a:outerShdw blurRad="38100" dist="38100" dir="2700000" algn="tl">
+                    <a:srgbClr val="000000">
+                      <a:alpha val="43137"/>
+                    </a:srgbClr>
+                  </a:outerShdw>
+                </a:effectLst>
+                <a:sym typeface="+mn-ea"/>
+              </a:rPr>
+              <a:t>k</a:t>
+            </a:r>
+            <a:r>
+              <a:rPr lang="en-US" altLang="de-DE" sz="2625" i="1" baseline="30000" dirty="0" smtClean="0">
+                <a:effectLst>
+                  <a:outerShdw blurRad="38100" dist="38100" dir="2700000" algn="tl">
+                    <a:srgbClr val="000000">
+                      <a:alpha val="43137"/>
+                    </a:srgbClr>
+                  </a:outerShdw>
+                </a:effectLst>
+                <a:cs typeface="Calibri" panose="020F0502020204030204" charset="0"/>
+                <a:sym typeface="+mn-ea"/>
+              </a:rPr>
+              <a:t>trg</a:t>
+            </a:r>
+            <a:r>
               <a:rPr lang="en-US" altLang="de-DE" sz="2630" i="1" dirty="0" smtClean="0">
                 <a:effectLst>
                   <a:outerShdw blurRad="38100" dist="38100" dir="2700000" algn="tl">
@@ -5573,7 +5643,7 @@
                   </a:outerShdw>
                 </a:effectLst>
               </a:rPr>
-              <a:t>k)</a:t>
+              <a:t>)</a:t>
             </a:r>
             <a:endParaRPr lang="en-US" altLang="de-DE" sz="2630" i="1" dirty="0" smtClean="0">
               <a:effectLst>
@@ -6297,7 +6367,19 @@
               </a:rPr>
               <a:t>Φ</a:t>
             </a:r>
-            <a:endParaRPr lang="de-DE" sz="2630" i="1" baseline="-25000" dirty="0">
+            <a:r>
+              <a:rPr lang="en-US" altLang="el-GR" sz="2630" i="1" baseline="-25000" dirty="0">
+                <a:effectLst>
+                  <a:outerShdw blurRad="38100" dist="38100" dir="2700000" algn="tl">
+                    <a:srgbClr val="000000">
+                      <a:alpha val="43137"/>
+                    </a:srgbClr>
+                  </a:outerShdw>
+                </a:effectLst>
+              </a:rPr>
+              <a:t>shift</a:t>
+            </a:r>
+            <a:endParaRPr lang="en-US" altLang="el-GR" sz="2630" i="1" baseline="-25000" dirty="0">
               <a:effectLst>
                 <a:outerShdw blurRad="38100" dist="38100" dir="2700000" algn="tl">
                   <a:srgbClr val="000000">

</xml_diff>

<commit_message>
chapter:application add syn ref, Ref RF sig
</commit_message>
<xml_diff>
--- a/images/data_flow.pptx
+++ b/images/data_flow.pptx
@@ -4148,7 +4148,7 @@
               <a:t>Phase </a:t>
             </a:r>
             <a:r>
-              <a:rPr lang="de-DE" sz="2630" i="1" dirty="0" err="1" smtClean="0">
+              <a:rPr lang="de-DE" sz="2630" i="1" smtClean="0">
                 <a:effectLst>
                   <a:outerShdw blurRad="38100" dist="38100" dir="2700000" algn="tl">
                     <a:srgbClr val="000000">
@@ -4157,7 +4157,7 @@
                   </a:outerShdw>
                 </a:effectLst>
               </a:rPr>
-              <a:t>advance</a:t>
+              <a:t>deviation </a:t>
             </a:r>
             <a:r>
               <a:rPr lang="de-DE" sz="2630" i="1" dirty="0" smtClean="0">
@@ -4169,7 +4169,7 @@
                   </a:outerShdw>
                 </a:effectLst>
               </a:rPr>
-              <a:t> ∆</a:t>
+              <a:t>∆</a:t>
             </a:r>
             <a:r>
               <a:rPr lang="el-GR" sz="2630" i="1" dirty="0">
@@ -4736,7 +4736,7 @@
               <a:t>Phase </a:t>
             </a:r>
             <a:r>
-              <a:rPr lang="de-DE" sz="2630" i="1" dirty="0" err="1" smtClean="0">
+              <a:rPr lang="de-DE" sz="2630" i="1" smtClean="0">
                 <a:effectLst>
                   <a:outerShdw blurRad="38100" dist="38100" dir="2700000" algn="tl">
                     <a:srgbClr val="000000">
@@ -4745,7 +4745,7 @@
                   </a:outerShdw>
                 </a:effectLst>
               </a:rPr>
-              <a:t>advance</a:t>
+              <a:t>deviation </a:t>
             </a:r>
             <a:r>
               <a:rPr lang="de-DE" sz="2630" i="1" dirty="0" smtClean="0">
@@ -4757,7 +4757,7 @@
                   </a:outerShdw>
                 </a:effectLst>
               </a:rPr>
-              <a:t> ∆</a:t>
+              <a:t>∆</a:t>
             </a:r>
             <a:r>
               <a:rPr lang="el-GR" sz="2630" i="1" dirty="0">
@@ -5604,20 +5604,7 @@
                 </a:effectLst>
                 <a:sym typeface="+mn-ea"/>
               </a:rPr>
-              <a:t>and </a:t>
-            </a:r>
-            <a:r>
-              <a:rPr lang="en-US" altLang="de-DE" sz="2625" i="1" dirty="0" smtClean="0">
-                <a:effectLst>
-                  <a:outerShdw blurRad="38100" dist="38100" dir="2700000" algn="tl">
-                    <a:srgbClr val="000000">
-                      <a:alpha val="43137"/>
-                    </a:srgbClr>
-                  </a:outerShdw>
-                </a:effectLst>
-                <a:sym typeface="+mn-ea"/>
-              </a:rPr>
-              <a:t>k</a:t>
+              <a:t>and k</a:t>
             </a:r>
             <a:r>
               <a:rPr lang="en-US" altLang="de-DE" sz="2625" i="1" baseline="30000" dirty="0" smtClean="0">

</xml_diff>

<commit_message>
Uncertainty of the start of syn win
</commit_message>
<xml_diff>
--- a/images/data_flow.pptx
+++ b/images/data_flow.pptx
@@ -3022,8 +3022,8 @@
         </p:nvSpPr>
         <p:spPr>
           <a:xfrm>
-            <a:off x="379095" y="34186495"/>
-            <a:ext cx="17317085" cy="9152890"/>
+            <a:off x="353060" y="32048450"/>
+            <a:ext cx="17317085" cy="9963150"/>
           </a:xfrm>
           <a:prstGeom prst="roundRect">
             <a:avLst/>
@@ -3059,14 +3059,14 @@
           <a:p>
             <a:pPr algn="l"/>
             <a:r>
-              <a:rPr lang="en-US" altLang="zh-CN" sz="4730">
+              <a:rPr lang="en-US" altLang="zh-CN" sz="3600">
                 <a:solidFill>
                   <a:schemeClr val="bg1"/>
                 </a:solidFill>
               </a:rPr>
               <a:t>Step 6. </a:t>
             </a:r>
-            <a:endParaRPr lang="en-US" altLang="zh-CN" sz="4730">
+            <a:endParaRPr lang="en-US" altLang="zh-CN" sz="3600">
               <a:solidFill>
                 <a:schemeClr val="bg1"/>
               </a:solidFill>
@@ -3074,7 +3074,7 @@
           </a:p>
           <a:p>
             <a:pPr algn="l"/>
-            <a:endParaRPr lang="en-US" altLang="zh-CN" sz="4730">
+            <a:endParaRPr lang="en-US" altLang="zh-CN" sz="3600">
               <a:solidFill>
                 <a:schemeClr val="bg1"/>
               </a:solidFill>
@@ -3082,7 +3082,7 @@
           </a:p>
           <a:p>
             <a:pPr algn="l"/>
-            <a:endParaRPr lang="en-US" altLang="zh-CN" sz="4730">
+            <a:endParaRPr lang="en-US" altLang="zh-CN" sz="3600">
               <a:solidFill>
                 <a:schemeClr val="bg1"/>
               </a:solidFill>
@@ -3090,7 +3090,7 @@
           </a:p>
           <a:p>
             <a:pPr algn="l"/>
-            <a:endParaRPr lang="en-US" altLang="zh-CN" sz="4730">
+            <a:endParaRPr lang="en-US" altLang="zh-CN" sz="3600">
               <a:solidFill>
                 <a:schemeClr val="bg1"/>
               </a:solidFill>
@@ -3098,7 +3098,7 @@
           </a:p>
           <a:p>
             <a:pPr algn="l"/>
-            <a:endParaRPr lang="en-US" altLang="zh-CN" sz="4730">
+            <a:endParaRPr lang="en-US" altLang="zh-CN" sz="3600">
               <a:solidFill>
                 <a:schemeClr val="bg1"/>
               </a:solidFill>
@@ -3106,7 +3106,7 @@
           </a:p>
           <a:p>
             <a:pPr algn="l"/>
-            <a:endParaRPr lang="en-US" altLang="zh-CN" sz="4730">
+            <a:endParaRPr lang="en-US" altLang="zh-CN" sz="3600">
               <a:solidFill>
                 <a:schemeClr val="bg1"/>
               </a:solidFill>
@@ -3114,7 +3114,7 @@
           </a:p>
           <a:p>
             <a:pPr algn="l"/>
-            <a:endParaRPr lang="en-US" altLang="zh-CN" sz="4730">
+            <a:endParaRPr lang="en-US" altLang="zh-CN" sz="3600">
               <a:solidFill>
                 <a:schemeClr val="bg1"/>
               </a:solidFill>
@@ -3123,14 +3123,14 @@
           <a:p>
             <a:pPr algn="l"/>
             <a:r>
-              <a:rPr lang="en-US" altLang="zh-CN" sz="4730">
+              <a:rPr lang="en-US" altLang="zh-CN" sz="3600">
                 <a:solidFill>
                   <a:schemeClr val="bg1"/>
                 </a:solidFill>
               </a:rPr>
               <a:t> </a:t>
             </a:r>
-            <a:endParaRPr lang="en-US" altLang="zh-CN" sz="4730">
+            <a:endParaRPr lang="en-US" altLang="zh-CN" sz="3600">
               <a:solidFill>
                 <a:schemeClr val="bg1"/>
               </a:solidFill>
@@ -3138,7 +3138,7 @@
           </a:p>
           <a:p>
             <a:pPr algn="l"/>
-            <a:endParaRPr lang="en-US" altLang="zh-CN" sz="4730">
+            <a:endParaRPr lang="en-US" altLang="zh-CN" sz="3600">
               <a:solidFill>
                 <a:schemeClr val="bg1"/>
               </a:solidFill>
@@ -3146,7 +3146,7 @@
           </a:p>
           <a:p>
             <a:pPr algn="l"/>
-            <a:endParaRPr lang="en-US" altLang="zh-CN" sz="4730">
+            <a:endParaRPr lang="en-US" altLang="zh-CN" sz="3600">
               <a:solidFill>
                 <a:schemeClr val="bg1"/>
               </a:solidFill>
@@ -3154,7 +3154,7 @@
           </a:p>
           <a:p>
             <a:pPr algn="l"/>
-            <a:endParaRPr lang="en-US" altLang="zh-CN" sz="4730">
+            <a:endParaRPr lang="en-US" altLang="zh-CN" sz="3600">
               <a:solidFill>
                 <a:schemeClr val="bg1"/>
               </a:solidFill>
@@ -3170,8 +3170,8 @@
         </p:nvSpPr>
         <p:spPr>
           <a:xfrm>
-            <a:off x="379122" y="27150015"/>
-            <a:ext cx="17316797" cy="7045090"/>
+            <a:off x="173990" y="24080470"/>
+            <a:ext cx="17522190" cy="7853680"/>
           </a:xfrm>
           <a:prstGeom prst="roundRect">
             <a:avLst/>
@@ -3206,62 +3206,50 @@
           <a:p>
             <a:pPr algn="l"/>
             <a:r>
-              <a:rPr lang="en-US" altLang="zh-CN" sz="4730"/>
-              <a:t>Step 4.</a:t>
-            </a:r>
-            <a:endParaRPr lang="en-US" altLang="zh-CN" sz="4730"/>
+              <a:rPr lang="en-US" altLang="zh-CN" sz="3600"/>
+              <a:t>Step 5.</a:t>
+            </a:r>
+            <a:endParaRPr lang="en-US" altLang="zh-CN" sz="3600"/>
           </a:p>
           <a:p>
             <a:pPr algn="l"/>
-            <a:endParaRPr lang="en-US" altLang="zh-CN" sz="4730"/>
+            <a:endParaRPr lang="en-US" altLang="zh-CN" sz="3600"/>
           </a:p>
           <a:p>
             <a:pPr algn="l"/>
-            <a:r>
-              <a:rPr lang="en-US" altLang="zh-CN" sz="4730"/>
-              <a:t>Step 5.</a:t>
-            </a:r>
-            <a:endParaRPr lang="en-US" altLang="zh-CN" sz="4730"/>
+            <a:endParaRPr lang="en-US" altLang="zh-CN" sz="3600"/>
           </a:p>
           <a:p>
             <a:pPr algn="l"/>
-            <a:endParaRPr lang="en-US" altLang="zh-CN" sz="4730"/>
+            <a:endParaRPr lang="en-US" altLang="zh-CN" sz="3600"/>
           </a:p>
           <a:p>
             <a:pPr algn="l"/>
-            <a:endParaRPr lang="en-US" altLang="zh-CN" sz="4730"/>
+            <a:endParaRPr lang="en-US" altLang="zh-CN" sz="3600"/>
           </a:p>
           <a:p>
             <a:pPr algn="l"/>
-            <a:endParaRPr lang="en-US" altLang="zh-CN" sz="4730"/>
+            <a:endParaRPr lang="en-US" altLang="zh-CN" sz="3600"/>
           </a:p>
           <a:p>
             <a:pPr algn="l"/>
-            <a:endParaRPr lang="en-US" altLang="zh-CN" sz="4730"/>
+            <a:r>
+              <a:rPr lang="en-US" altLang="zh-CN" sz="3600"/>
+              <a:t> </a:t>
+            </a:r>
+            <a:endParaRPr lang="en-US" altLang="zh-CN" sz="3600"/>
           </a:p>
           <a:p>
             <a:pPr algn="l"/>
-            <a:endParaRPr lang="en-US" altLang="zh-CN" sz="4730"/>
+            <a:endParaRPr lang="en-US" altLang="zh-CN" sz="3600"/>
           </a:p>
           <a:p>
             <a:pPr algn="l"/>
-            <a:r>
-              <a:rPr lang="en-US" altLang="zh-CN" sz="4730"/>
-              <a:t> </a:t>
-            </a:r>
-            <a:endParaRPr lang="en-US" altLang="zh-CN" sz="4730"/>
+            <a:endParaRPr lang="en-US" altLang="zh-CN" sz="3600"/>
           </a:p>
           <a:p>
             <a:pPr algn="l"/>
-            <a:endParaRPr lang="en-US" altLang="zh-CN" sz="4730"/>
-          </a:p>
-          <a:p>
-            <a:pPr algn="l"/>
-            <a:endParaRPr lang="en-US" altLang="zh-CN" sz="4730"/>
-          </a:p>
-          <a:p>
-            <a:pPr algn="l"/>
-            <a:endParaRPr lang="en-US" altLang="zh-CN" sz="4730"/>
+            <a:endParaRPr lang="en-US" altLang="zh-CN" sz="3600"/>
           </a:p>
         </p:txBody>
       </p:sp>
@@ -3273,7 +3261,7 @@
         </p:nvSpPr>
         <p:spPr>
           <a:xfrm>
-            <a:off x="160686" y="17830567"/>
+            <a:off x="135921" y="14595242"/>
             <a:ext cx="17316653" cy="9339105"/>
           </a:xfrm>
           <a:prstGeom prst="roundRect">
@@ -3310,58 +3298,58 @@
           <a:p>
             <a:pPr algn="l"/>
             <a:r>
-              <a:rPr lang="en-US" altLang="zh-CN" sz="4730"/>
+              <a:rPr lang="en-US" altLang="zh-CN" sz="3600"/>
               <a:t>Step 4.</a:t>
             </a:r>
-            <a:endParaRPr lang="en-US" altLang="zh-CN" sz="4730"/>
+            <a:endParaRPr lang="en-US" altLang="zh-CN" sz="3600"/>
           </a:p>
           <a:p>
             <a:pPr algn="l"/>
-            <a:endParaRPr lang="en-US" altLang="zh-CN" sz="4730"/>
+            <a:endParaRPr lang="en-US" altLang="zh-CN" sz="3600"/>
           </a:p>
           <a:p>
             <a:pPr algn="l"/>
-            <a:endParaRPr lang="en-US" altLang="zh-CN" sz="4730"/>
+            <a:endParaRPr lang="en-US" altLang="zh-CN" sz="3600"/>
           </a:p>
           <a:p>
             <a:pPr algn="l"/>
-            <a:endParaRPr lang="en-US" altLang="zh-CN" sz="4730"/>
+            <a:endParaRPr lang="en-US" altLang="zh-CN" sz="3600"/>
           </a:p>
           <a:p>
             <a:pPr algn="l"/>
-            <a:endParaRPr lang="en-US" altLang="zh-CN" sz="4730"/>
+            <a:endParaRPr lang="en-US" altLang="zh-CN" sz="3600"/>
           </a:p>
           <a:p>
             <a:pPr algn="l"/>
-            <a:endParaRPr lang="en-US" altLang="zh-CN" sz="4730"/>
+            <a:endParaRPr lang="en-US" altLang="zh-CN" sz="3600"/>
           </a:p>
           <a:p>
             <a:pPr algn="l"/>
-            <a:endParaRPr lang="en-US" altLang="zh-CN" sz="4730"/>
+            <a:endParaRPr lang="en-US" altLang="zh-CN" sz="3600"/>
           </a:p>
           <a:p>
             <a:pPr algn="l"/>
-            <a:endParaRPr lang="en-US" altLang="zh-CN" sz="4730"/>
+            <a:endParaRPr lang="en-US" altLang="zh-CN" sz="3600"/>
           </a:p>
           <a:p>
             <a:pPr algn="l"/>
             <a:r>
-              <a:rPr lang="en-US" altLang="zh-CN" sz="4730"/>
+              <a:rPr lang="en-US" altLang="zh-CN" sz="3600"/>
               <a:t> </a:t>
             </a:r>
-            <a:endParaRPr lang="en-US" altLang="zh-CN" sz="4730"/>
+            <a:endParaRPr lang="en-US" altLang="zh-CN" sz="3600"/>
           </a:p>
           <a:p>
             <a:pPr algn="l"/>
-            <a:endParaRPr lang="en-US" altLang="zh-CN" sz="4730"/>
+            <a:endParaRPr lang="en-US" altLang="zh-CN" sz="3600"/>
           </a:p>
           <a:p>
             <a:pPr algn="l"/>
-            <a:endParaRPr lang="en-US" altLang="zh-CN" sz="4730"/>
+            <a:endParaRPr lang="en-US" altLang="zh-CN" sz="3600"/>
           </a:p>
           <a:p>
             <a:pPr algn="l"/>
-            <a:endParaRPr lang="en-US" altLang="zh-CN" sz="4730"/>
+            <a:endParaRPr lang="en-US" altLang="zh-CN" sz="3600"/>
           </a:p>
         </p:txBody>
       </p:sp>
@@ -3373,8 +3361,8 @@
         </p:nvSpPr>
         <p:spPr>
           <a:xfrm>
-            <a:off x="252133" y="14706592"/>
-            <a:ext cx="17316509" cy="3104232"/>
+            <a:off x="135890" y="10751820"/>
+            <a:ext cx="17316450" cy="3769360"/>
           </a:xfrm>
           <a:prstGeom prst="roundRect">
             <a:avLst/>
@@ -3410,22 +3398,22 @@
           <a:p>
             <a:pPr algn="l"/>
             <a:r>
-              <a:rPr lang="en-US" altLang="zh-CN" sz="4730"/>
+              <a:rPr lang="en-US" altLang="zh-CN" sz="3600"/>
               <a:t>Step 3. </a:t>
             </a:r>
-            <a:endParaRPr lang="en-US" altLang="zh-CN" sz="4730"/>
+            <a:endParaRPr lang="en-US" altLang="zh-CN" sz="3600"/>
           </a:p>
           <a:p>
             <a:pPr algn="l"/>
-            <a:endParaRPr lang="en-US" altLang="zh-CN" sz="4730"/>
+            <a:endParaRPr lang="en-US" altLang="zh-CN" sz="3600"/>
           </a:p>
           <a:p>
             <a:pPr algn="l"/>
-            <a:endParaRPr lang="en-US" altLang="zh-CN" sz="4730"/>
+            <a:endParaRPr lang="en-US" altLang="zh-CN" sz="3600"/>
           </a:p>
           <a:p>
             <a:pPr algn="l"/>
-            <a:endParaRPr lang="en-US" altLang="zh-CN" sz="4730"/>
+            <a:endParaRPr lang="en-US" altLang="zh-CN" sz="3600"/>
           </a:p>
         </p:txBody>
       </p:sp>
@@ -3437,8 +3425,8 @@
         </p:nvSpPr>
         <p:spPr>
           <a:xfrm>
-            <a:off x="252126" y="11409537"/>
-            <a:ext cx="17316653" cy="3297201"/>
+            <a:off x="173990" y="6948805"/>
+            <a:ext cx="17316450" cy="3744595"/>
           </a:xfrm>
           <a:prstGeom prst="roundRect">
             <a:avLst/>
@@ -3474,22 +3462,30 @@
           <a:p>
             <a:pPr algn="l"/>
             <a:r>
-              <a:rPr lang="en-US" altLang="zh-CN" sz="4730"/>
+              <a:rPr lang="en-US" altLang="zh-CN" sz="3600"/>
               <a:t>Step 2.</a:t>
             </a:r>
-            <a:endParaRPr lang="en-US" altLang="zh-CN" sz="4730"/>
+            <a:endParaRPr lang="en-US" altLang="zh-CN" sz="3600"/>
           </a:p>
           <a:p>
             <a:pPr algn="l"/>
-            <a:endParaRPr lang="en-US" altLang="zh-CN" sz="4730"/>
+            <a:endParaRPr lang="en-US" altLang="zh-CN" sz="3600"/>
           </a:p>
           <a:p>
             <a:pPr algn="l"/>
-            <a:endParaRPr lang="en-US" altLang="zh-CN" sz="4730"/>
+            <a:endParaRPr lang="en-US" altLang="zh-CN" sz="3600"/>
           </a:p>
           <a:p>
             <a:pPr algn="l"/>
-            <a:endParaRPr lang="en-US" altLang="zh-CN" sz="4730"/>
+            <a:endParaRPr lang="en-US" altLang="zh-CN" sz="3600"/>
+          </a:p>
+          <a:p>
+            <a:pPr algn="l"/>
+            <a:endParaRPr lang="en-US" altLang="zh-CN" sz="3600"/>
+          </a:p>
+          <a:p>
+            <a:pPr algn="l"/>
+            <a:endParaRPr lang="en-US" altLang="zh-CN" sz="3600"/>
           </a:p>
         </p:txBody>
       </p:sp>
@@ -3501,7 +3497,7 @@
         </p:nvSpPr>
         <p:spPr>
           <a:xfrm>
-            <a:off x="3140441" y="12781671"/>
+            <a:off x="2805161" y="8741166"/>
             <a:ext cx="4901486" cy="1453680"/>
           </a:xfrm>
           <a:prstGeom prst="rect">
@@ -3550,7 +3546,7 @@
           <a:bodyPr rtlCol="0" anchor="ctr"/>
           <a:p>
             <a:pPr algn="ctr"/>
-            <a:endParaRPr lang="de-DE" sz="1970"/>
+            <a:endParaRPr lang="de-DE" sz="3600"/>
           </a:p>
         </p:txBody>
       </p:sp>
@@ -3562,8 +3558,8 @@
         </p:nvSpPr>
         <p:spPr>
           <a:xfrm>
-            <a:off x="252133" y="7118734"/>
-            <a:ext cx="17316509" cy="4274035"/>
+            <a:off x="252095" y="2183765"/>
+            <a:ext cx="17316450" cy="4707255"/>
           </a:xfrm>
           <a:prstGeom prst="roundRect">
             <a:avLst/>
@@ -3599,26 +3595,30 @@
           <a:p>
             <a:pPr algn="l"/>
             <a:r>
-              <a:rPr lang="en-US" altLang="zh-CN" sz="4730"/>
-              <a:t>Step 1. </a:t>
-            </a:r>
-            <a:endParaRPr lang="en-US" altLang="zh-CN" sz="4730"/>
+              <a:rPr lang="en-US" altLang="zh-CN" sz="3600"/>
+              <a:t>Step 1.</a:t>
+            </a:r>
+            <a:r>
+              <a:rPr lang="en-US" altLang="zh-CN" sz="4400"/>
+              <a:t> </a:t>
+            </a:r>
+            <a:endParaRPr lang="en-US" altLang="zh-CN" sz="4400"/>
           </a:p>
           <a:p>
             <a:pPr algn="l"/>
-            <a:endParaRPr lang="en-US" altLang="zh-CN" sz="4730"/>
+            <a:endParaRPr lang="en-US" altLang="zh-CN" sz="3600"/>
           </a:p>
           <a:p>
             <a:pPr algn="l"/>
-            <a:endParaRPr lang="en-US" altLang="zh-CN" sz="4730"/>
+            <a:endParaRPr lang="en-US" altLang="zh-CN" sz="3600"/>
           </a:p>
           <a:p>
             <a:pPr algn="l"/>
-            <a:endParaRPr lang="en-US" altLang="zh-CN" sz="4730"/>
+            <a:endParaRPr lang="en-US" altLang="zh-CN" sz="3600"/>
           </a:p>
           <a:p>
             <a:pPr algn="l"/>
-            <a:endParaRPr lang="en-US" altLang="zh-CN" sz="4730"/>
+            <a:endParaRPr lang="en-US" altLang="zh-CN" sz="3600"/>
           </a:p>
         </p:txBody>
       </p:sp>
@@ -3630,8 +3630,8 @@
         </p:nvSpPr>
         <p:spPr>
           <a:xfrm>
-            <a:off x="8885302" y="8594006"/>
-            <a:ext cx="2305311" cy="1447964"/>
+            <a:off x="8326755" y="3456940"/>
+            <a:ext cx="2863850" cy="1966595"/>
           </a:xfrm>
           <a:prstGeom prst="cloud">
             <a:avLst/>
@@ -3668,14 +3668,14 @@
           <a:p>
             <a:pPr algn="ctr"/>
             <a:r>
-              <a:rPr lang="en-US" altLang="zh-CN" sz="2400">
+              <a:rPr lang="en-US" altLang="zh-CN" sz="3600">
                 <a:solidFill>
                   <a:schemeClr val="tx1"/>
                 </a:solidFill>
               </a:rPr>
               <a:t>WR network</a:t>
             </a:r>
-            <a:endParaRPr lang="en-US" altLang="zh-CN" sz="2400">
+            <a:endParaRPr lang="en-US" altLang="zh-CN" sz="3600">
               <a:solidFill>
                 <a:schemeClr val="tx1"/>
               </a:solidFill>
@@ -3694,8 +3694,8 @@
         </p:nvCxnSpPr>
         <p:spPr>
           <a:xfrm rot="10800000" flipV="1">
-            <a:off x="3780790" y="9317355"/>
-            <a:ext cx="5111115" cy="478155"/>
+            <a:off x="3908425" y="4440555"/>
+            <a:ext cx="4427220" cy="420370"/>
           </a:xfrm>
           <a:prstGeom prst="bentConnector2">
             <a:avLst/>
@@ -3733,7 +3733,7 @@
         </p:nvCxnSpPr>
         <p:spPr>
           <a:xfrm>
-            <a:off x="11188709" y="9317988"/>
+            <a:off x="11188074" y="4440553"/>
             <a:ext cx="1848695" cy="485195"/>
           </a:xfrm>
           <a:prstGeom prst="bentConnector2">
@@ -3769,8 +3769,8 @@
         </p:nvSpPr>
         <p:spPr>
           <a:xfrm>
-            <a:off x="4599836" y="8857561"/>
-            <a:ext cx="2363103" cy="460375"/>
+            <a:off x="4599940" y="3779520"/>
+            <a:ext cx="4393565" cy="645160"/>
           </a:xfrm>
           <a:prstGeom prst="rect">
             <a:avLst/>
@@ -3783,10 +3783,10 @@
           </a:bodyPr>
           <a:p>
             <a:r>
-              <a:rPr lang="en-US" altLang="zh-CN" sz="2400"/>
+              <a:rPr lang="en-US" altLang="zh-CN" sz="3600"/>
               <a:t>CMD_START_B2B</a:t>
             </a:r>
-            <a:endParaRPr lang="en-US" altLang="zh-CN" sz="2400"/>
+            <a:endParaRPr lang="en-US" altLang="zh-CN" sz="3600"/>
           </a:p>
         </p:txBody>
       </p:sp>
@@ -3798,8 +3798,8 @@
         </p:nvSpPr>
         <p:spPr>
           <a:xfrm>
-            <a:off x="11190614" y="8857561"/>
-            <a:ext cx="2400572" cy="460375"/>
+            <a:off x="11190605" y="3722370"/>
+            <a:ext cx="4623435" cy="645160"/>
           </a:xfrm>
           <a:prstGeom prst="rect">
             <a:avLst/>
@@ -3812,10 +3812,10 @@
           </a:bodyPr>
           <a:p>
             <a:r>
-              <a:rPr lang="en-US" altLang="zh-CN" sz="2400"/>
+              <a:rPr lang="en-US" altLang="zh-CN" sz="3600"/>
               <a:t>CMD_START_B2B</a:t>
             </a:r>
-            <a:endParaRPr lang="en-US" altLang="zh-CN" sz="2400"/>
+            <a:endParaRPr lang="en-US" altLang="zh-CN" sz="3600"/>
           </a:p>
         </p:txBody>
       </p:sp>
@@ -3827,7 +3827,7 @@
         </p:nvSpPr>
         <p:spPr>
           <a:xfrm>
-            <a:off x="9440990" y="7485805"/>
+            <a:off x="9167940" y="2550585"/>
             <a:ext cx="1193935" cy="660475"/>
           </a:xfrm>
           <a:prstGeom prst="rect">
@@ -3861,14 +3861,14 @@
           <a:p>
             <a:pPr algn="ctr"/>
             <a:r>
-              <a:rPr lang="en-US" altLang="zh-CN" sz="2800">
+              <a:rPr lang="en-US" altLang="zh-CN" sz="3600">
                 <a:solidFill>
                   <a:schemeClr val="tx1"/>
                 </a:solidFill>
               </a:rPr>
               <a:t>DM</a:t>
             </a:r>
-            <a:endParaRPr lang="en-US" altLang="zh-CN" sz="2800">
+            <a:endParaRPr lang="en-US" altLang="zh-CN" sz="3600">
               <a:solidFill>
                 <a:schemeClr val="tx1"/>
               </a:solidFill>
@@ -3887,11 +3887,13 @@
         </p:nvCxnSpPr>
         <p:spPr>
           <a:xfrm rot="5400000">
-            <a:off x="9772968" y="8411528"/>
-            <a:ext cx="530225" cy="3175"/>
-          </a:xfrm>
-          <a:prstGeom prst="bentConnector2">
-            <a:avLst/>
+            <a:off x="9582785" y="3387090"/>
+            <a:ext cx="358140" cy="6350"/>
+          </a:xfrm>
+          <a:prstGeom prst="bentConnector3">
+            <a:avLst>
+              <a:gd name="adj1" fmla="val 34397"/>
+            </a:avLst>
           </a:prstGeom>
           <a:ln w="38100">
             <a:solidFill>
@@ -3923,8 +3925,8 @@
         </p:nvSpPr>
         <p:spPr>
           <a:xfrm>
-            <a:off x="3121380" y="12783986"/>
-            <a:ext cx="1295846" cy="1453423"/>
+            <a:off x="2786380" y="8743315"/>
+            <a:ext cx="1437640" cy="1453515"/>
           </a:xfrm>
           <a:prstGeom prst="rect">
             <a:avLst/>
@@ -3951,22 +3953,22 @@
           <a:p>
             <a:pPr algn="ctr"/>
             <a:r>
-              <a:rPr lang="de-DE" sz="3070" dirty="0" smtClean="0"/>
+              <a:rPr lang="de-DE" sz="3600" dirty="0" smtClean="0"/>
               <a:t>B2B</a:t>
             </a:r>
-            <a:endParaRPr lang="de-DE" sz="3070" dirty="0" smtClean="0"/>
+            <a:endParaRPr lang="de-DE" sz="3600" dirty="0" smtClean="0"/>
           </a:p>
           <a:p>
             <a:pPr algn="ctr"/>
             <a:r>
-              <a:rPr lang="de-DE" sz="3070" dirty="0" err="1" smtClean="0"/>
+              <a:rPr lang="de-DE" sz="3600" dirty="0" err="1" smtClean="0"/>
               <a:t>source</a:t>
             </a:r>
             <a:r>
-              <a:rPr lang="de-DE" sz="3070" dirty="0" smtClean="0"/>
+              <a:rPr lang="de-DE" sz="3600" dirty="0" smtClean="0"/>
               <a:t> SCU</a:t>
             </a:r>
-            <a:endParaRPr lang="de-DE" sz="3070" dirty="0"/>
+            <a:endParaRPr lang="de-DE" sz="3600" dirty="0"/>
           </a:p>
         </p:txBody>
       </p:sp>
@@ -3978,7 +3980,7 @@
         </p:nvSpPr>
         <p:spPr>
           <a:xfrm>
-            <a:off x="4417227" y="12781782"/>
+            <a:off x="4224822" y="8741277"/>
             <a:ext cx="1074785" cy="1455776"/>
           </a:xfrm>
           <a:prstGeom prst="rect">
@@ -4009,14 +4011,14 @@
           <a:p>
             <a:pPr algn="ctr"/>
             <a:r>
-              <a:rPr lang="de-DE" sz="3070" i="1" dirty="0" smtClean="0">
+              <a:rPr lang="de-DE" sz="3600" i="1" dirty="0" smtClean="0">
                 <a:solidFill>
                   <a:schemeClr val="tx1"/>
                 </a:solidFill>
               </a:rPr>
               <a:t>PAP</a:t>
             </a:r>
-            <a:endParaRPr lang="de-DE" sz="3070" i="1" dirty="0">
+            <a:endParaRPr lang="de-DE" sz="3600" i="1" dirty="0" smtClean="0">
               <a:solidFill>
                 <a:schemeClr val="tx1"/>
               </a:solidFill>
@@ -4032,7 +4034,7 @@
         </p:nvSpPr>
         <p:spPr>
           <a:xfrm>
-            <a:off x="4417226" y="11575462"/>
+            <a:off x="4081946" y="7126017"/>
             <a:ext cx="1074786" cy="577058"/>
           </a:xfrm>
           <a:prstGeom prst="rect">
@@ -4063,14 +4065,14 @@
           <a:p>
             <a:pPr algn="ctr"/>
             <a:r>
-              <a:rPr lang="de-DE" sz="3070" i="1" dirty="0" smtClean="0">
+              <a:rPr lang="de-DE" sz="3600" i="1" dirty="0" smtClean="0">
                 <a:solidFill>
                   <a:schemeClr val="tx1"/>
                 </a:solidFill>
               </a:rPr>
               <a:t>PAM</a:t>
             </a:r>
-            <a:endParaRPr lang="de-DE" sz="3070" i="1" dirty="0">
+            <a:endParaRPr lang="de-DE" sz="3600" i="1" dirty="0" smtClean="0">
               <a:solidFill>
                 <a:schemeClr val="tx1"/>
               </a:solidFill>
@@ -4081,13 +4083,15 @@
       <p:cxnSp>
         <p:nvCxnSpPr>
           <p:cNvPr id="31" name="Gerade Verbindung mit Pfeil 17"/>
-          <p:cNvCxnSpPr/>
+          <p:cNvCxnSpPr>
+            <a:endCxn id="26" idx="0"/>
+          </p:cNvCxnSpPr>
           <p:nvPr/>
         </p:nvCxnSpPr>
         <p:spPr>
           <a:xfrm>
-            <a:off x="4954619" y="12184022"/>
-            <a:ext cx="0" cy="616663"/>
+            <a:off x="4762500" y="7734300"/>
+            <a:ext cx="0" cy="1007110"/>
           </a:xfrm>
           <a:prstGeom prst="straightConnector1">
             <a:avLst/>
@@ -4122,8 +4126,8 @@
         </p:nvSpPr>
         <p:spPr>
           <a:xfrm>
-            <a:off x="4954617" y="12224865"/>
-            <a:ext cx="3086985" cy="495300"/>
+            <a:off x="4715510" y="8074660"/>
+            <a:ext cx="4544695" cy="645160"/>
           </a:xfrm>
           <a:prstGeom prst="rect">
             <a:avLst/>
@@ -4136,7 +4140,7 @@
           </a:bodyPr>
           <a:p>
             <a:r>
-              <a:rPr lang="de-DE" sz="2630" i="1" dirty="0">
+              <a:rPr lang="de-DE" sz="3600" i="1" dirty="0">
                 <a:effectLst>
                   <a:outerShdw blurRad="38100" dist="38100" dir="2700000" algn="tl">
                     <a:srgbClr val="000000">
@@ -4148,7 +4152,7 @@
               <a:t>Phase </a:t>
             </a:r>
             <a:r>
-              <a:rPr lang="de-DE" sz="2630" i="1" smtClean="0">
+              <a:rPr lang="de-DE" sz="3600" i="1" smtClean="0">
                 <a:effectLst>
                   <a:outerShdw blurRad="38100" dist="38100" dir="2700000" algn="tl">
                     <a:srgbClr val="000000">
@@ -4160,7 +4164,7 @@
               <a:t>deviation </a:t>
             </a:r>
             <a:r>
-              <a:rPr lang="de-DE" sz="2630" i="1" dirty="0" smtClean="0">
+              <a:rPr lang="de-DE" sz="3600" i="1" dirty="0" smtClean="0">
                 <a:effectLst>
                   <a:outerShdw blurRad="38100" dist="38100" dir="2700000" algn="tl">
                     <a:srgbClr val="000000">
@@ -4172,7 +4176,7 @@
               <a:t>∆</a:t>
             </a:r>
             <a:r>
-              <a:rPr lang="el-GR" sz="2630" i="1" dirty="0">
+              <a:rPr lang="el-GR" sz="3600" i="1" dirty="0">
                 <a:effectLst>
                   <a:outerShdw blurRad="38100" dist="38100" dir="2700000" algn="tl">
                     <a:srgbClr val="000000">
@@ -4185,7 +4189,7 @@
               <a:t>φ</a:t>
             </a:r>
             <a:r>
-              <a:rPr lang="en-US" altLang="el-GR" sz="2630" i="1" baseline="30000" dirty="0">
+              <a:rPr lang="en-US" altLang="el-GR" sz="3600" i="1" baseline="30000" dirty="0">
                 <a:effectLst>
                   <a:outerShdw blurRad="38100" dist="38100" dir="2700000" algn="tl">
                     <a:srgbClr val="000000">
@@ -4197,7 +4201,7 @@
               </a:rPr>
               <a:t>src</a:t>
             </a:r>
-            <a:endParaRPr lang="en-US" altLang="el-GR" sz="2630" i="1" baseline="30000" dirty="0">
+            <a:endParaRPr lang="en-US" altLang="el-GR" sz="3600" i="1" baseline="30000" dirty="0">
               <a:effectLst>
                 <a:outerShdw blurRad="38100" dist="38100" dir="2700000" algn="tl">
                   <a:srgbClr val="000000">
@@ -4218,7 +4222,7 @@
         </p:nvSpPr>
         <p:spPr>
           <a:xfrm>
-            <a:off x="3140441" y="9803183"/>
+            <a:off x="3140441" y="4867963"/>
             <a:ext cx="4901486" cy="1453680"/>
           </a:xfrm>
           <a:prstGeom prst="rect">
@@ -4267,7 +4271,7 @@
           <a:bodyPr rtlCol="0" anchor="ctr"/>
           <a:p>
             <a:pPr algn="ctr"/>
-            <a:endParaRPr lang="de-DE" sz="1970"/>
+            <a:endParaRPr lang="de-DE" sz="3600"/>
           </a:p>
         </p:txBody>
       </p:sp>
@@ -4279,8 +4283,8 @@
         </p:nvSpPr>
         <p:spPr>
           <a:xfrm>
-            <a:off x="3121389" y="9796198"/>
-            <a:ext cx="1319680" cy="1453680"/>
+            <a:off x="3121660" y="4860925"/>
+            <a:ext cx="1572895" cy="1453515"/>
           </a:xfrm>
           <a:prstGeom prst="rect">
             <a:avLst/>
@@ -4307,22 +4311,22 @@
           <a:p>
             <a:pPr algn="ctr"/>
             <a:r>
-              <a:rPr lang="de-DE" sz="3070" dirty="0" smtClean="0"/>
+              <a:rPr lang="de-DE" sz="3600" dirty="0" smtClean="0"/>
               <a:t>B2B</a:t>
             </a:r>
-            <a:endParaRPr lang="de-DE" sz="3070" dirty="0" smtClean="0"/>
+            <a:endParaRPr lang="de-DE" sz="3600" dirty="0" smtClean="0"/>
           </a:p>
           <a:p>
             <a:pPr algn="ctr"/>
             <a:r>
-              <a:rPr lang="de-DE" sz="3070" dirty="0" err="1" smtClean="0"/>
+              <a:rPr lang="de-DE" sz="3600" dirty="0" err="1" smtClean="0"/>
               <a:t>source</a:t>
             </a:r>
             <a:r>
-              <a:rPr lang="de-DE" sz="3070" dirty="0" smtClean="0"/>
+              <a:rPr lang="de-DE" sz="3600" dirty="0" smtClean="0"/>
               <a:t> SCU</a:t>
             </a:r>
-            <a:endParaRPr lang="de-DE" sz="3070" dirty="0"/>
+            <a:endParaRPr lang="de-DE" sz="3600" dirty="0"/>
           </a:p>
         </p:txBody>
       </p:sp>
@@ -4334,7 +4338,7 @@
         </p:nvSpPr>
         <p:spPr>
           <a:xfrm>
-            <a:off x="12331838" y="9803183"/>
+            <a:off x="12331838" y="4867963"/>
             <a:ext cx="4690007" cy="1453680"/>
           </a:xfrm>
           <a:prstGeom prst="rect">
@@ -4383,7 +4387,7 @@
           <a:bodyPr rtlCol="0" anchor="ctr"/>
           <a:p>
             <a:pPr algn="ctr"/>
-            <a:endParaRPr lang="de-DE" sz="1970"/>
+            <a:endParaRPr lang="de-DE" sz="3600"/>
           </a:p>
         </p:txBody>
       </p:sp>
@@ -4395,8 +4399,8 @@
         </p:nvSpPr>
         <p:spPr>
           <a:xfrm>
-            <a:off x="12312777" y="9805498"/>
-            <a:ext cx="1295846" cy="1453423"/>
+            <a:off x="12312650" y="4870450"/>
+            <a:ext cx="1654175" cy="1453515"/>
           </a:xfrm>
           <a:prstGeom prst="rect">
             <a:avLst/>
@@ -4423,22 +4427,26 @@
           <a:p>
             <a:pPr algn="ctr"/>
             <a:r>
-              <a:rPr lang="de-DE" sz="3070" dirty="0" smtClean="0"/>
+              <a:rPr lang="de-DE" sz="3600" dirty="0" smtClean="0"/>
               <a:t>B2B</a:t>
             </a:r>
-            <a:endParaRPr lang="de-DE" sz="3070" dirty="0" smtClean="0"/>
+            <a:endParaRPr lang="de-DE" sz="3600" dirty="0" smtClean="0"/>
           </a:p>
           <a:p>
             <a:pPr algn="ctr"/>
             <a:r>
-              <a:rPr lang="en-US" altLang="de-DE" sz="3070" dirty="0" err="1" smtClean="0"/>
+              <a:rPr lang="en-US" altLang="de-DE" sz="3600" dirty="0" err="1" smtClean="0"/>
               <a:t>target</a:t>
             </a:r>
-            <a:r>
-              <a:rPr lang="de-DE" sz="3070" dirty="0" smtClean="0"/>
+            <a:endParaRPr lang="en-US" altLang="de-DE" sz="3600" dirty="0" err="1" smtClean="0"/>
+          </a:p>
+          <a:p>
+            <a:pPr algn="ctr"/>
+            <a:r>
+              <a:rPr lang="de-DE" sz="3600" dirty="0" smtClean="0"/>
               <a:t>SCU</a:t>
             </a:r>
-            <a:endParaRPr lang="de-DE" sz="3070" dirty="0"/>
+            <a:endParaRPr lang="de-DE" sz="3600" dirty="0"/>
           </a:p>
         </p:txBody>
       </p:sp>
@@ -4450,7 +4458,7 @@
         </p:nvSpPr>
         <p:spPr>
           <a:xfrm>
-            <a:off x="12331838" y="12818505"/>
+            <a:off x="11539358" y="8778000"/>
             <a:ext cx="4901486" cy="1453680"/>
           </a:xfrm>
           <a:prstGeom prst="rect">
@@ -4499,7 +4507,7 @@
           <a:bodyPr rtlCol="0" anchor="ctr"/>
           <a:p>
             <a:pPr algn="ctr"/>
-            <a:endParaRPr lang="de-DE" sz="1970"/>
+            <a:endParaRPr lang="de-DE" sz="3600"/>
           </a:p>
         </p:txBody>
       </p:sp>
@@ -4511,8 +4519,8 @@
         </p:nvSpPr>
         <p:spPr>
           <a:xfrm>
-            <a:off x="12312777" y="12811294"/>
-            <a:ext cx="1295846" cy="1453423"/>
+            <a:off x="11520170" y="8770620"/>
+            <a:ext cx="1467485" cy="1453515"/>
           </a:xfrm>
           <a:prstGeom prst="rect">
             <a:avLst/>
@@ -4539,22 +4547,22 @@
           <a:p>
             <a:pPr algn="ctr"/>
             <a:r>
-              <a:rPr lang="de-DE" sz="3070" dirty="0" smtClean="0"/>
+              <a:rPr lang="de-DE" sz="3600" dirty="0" smtClean="0"/>
               <a:t>B2B</a:t>
             </a:r>
-            <a:endParaRPr lang="de-DE" sz="3070" dirty="0" smtClean="0"/>
+            <a:endParaRPr lang="de-DE" sz="3600" dirty="0" smtClean="0"/>
           </a:p>
           <a:p>
             <a:pPr algn="ctr"/>
             <a:r>
-              <a:rPr lang="en-US" altLang="de-DE" sz="3070" dirty="0" err="1" smtClean="0"/>
+              <a:rPr lang="en-US" altLang="de-DE" sz="3600" dirty="0" err="1" smtClean="0"/>
               <a:t>target</a:t>
             </a:r>
             <a:r>
-              <a:rPr lang="de-DE" sz="3070" dirty="0" smtClean="0"/>
+              <a:rPr lang="de-DE" sz="3600" dirty="0" smtClean="0"/>
               <a:t>SCU</a:t>
             </a:r>
-            <a:endParaRPr lang="de-DE" sz="3070" dirty="0"/>
+            <a:endParaRPr lang="de-DE" sz="3600" dirty="0"/>
           </a:p>
         </p:txBody>
       </p:sp>
@@ -4566,7 +4574,7 @@
         </p:nvSpPr>
         <p:spPr>
           <a:xfrm>
-            <a:off x="13608624" y="12818616"/>
+            <a:off x="12987594" y="8778111"/>
             <a:ext cx="1074785" cy="1455776"/>
           </a:xfrm>
           <a:prstGeom prst="rect">
@@ -4597,14 +4605,14 @@
           <a:p>
             <a:pPr algn="ctr"/>
             <a:r>
-              <a:rPr lang="de-DE" sz="3070" i="1" dirty="0" smtClean="0">
+              <a:rPr lang="de-DE" sz="3600" i="1" dirty="0" smtClean="0">
                 <a:solidFill>
                   <a:schemeClr val="tx1"/>
                 </a:solidFill>
               </a:rPr>
               <a:t>PAP</a:t>
             </a:r>
-            <a:endParaRPr lang="de-DE" sz="3070" i="1" dirty="0">
+            <a:endParaRPr lang="de-DE" sz="3600" i="1" dirty="0" smtClean="0">
               <a:solidFill>
                 <a:schemeClr val="tx1"/>
               </a:solidFill>
@@ -4620,7 +4628,7 @@
         </p:nvSpPr>
         <p:spPr>
           <a:xfrm>
-            <a:off x="13608623" y="11612296"/>
+            <a:off x="12901868" y="7162851"/>
             <a:ext cx="1074786" cy="577058"/>
           </a:xfrm>
           <a:prstGeom prst="rect">
@@ -4651,14 +4659,14 @@
           <a:p>
             <a:pPr algn="ctr"/>
             <a:r>
-              <a:rPr lang="de-DE" sz="3070" i="1" dirty="0" smtClean="0">
+              <a:rPr lang="de-DE" sz="3600" i="1" dirty="0" smtClean="0">
                 <a:solidFill>
                   <a:schemeClr val="tx1"/>
                 </a:solidFill>
               </a:rPr>
               <a:t>PAM</a:t>
             </a:r>
-            <a:endParaRPr lang="de-DE" sz="3070" i="1" dirty="0">
+            <a:endParaRPr lang="de-DE" sz="3600" i="1" dirty="0" smtClean="0">
               <a:solidFill>
                 <a:schemeClr val="tx1"/>
               </a:solidFill>
@@ -4669,13 +4677,15 @@
       <p:cxnSp>
         <p:nvCxnSpPr>
           <p:cNvPr id="44" name="Gerade Verbindung mit Pfeil 17"/>
-          <p:cNvCxnSpPr/>
+          <p:cNvCxnSpPr>
+            <a:stCxn id="40" idx="2"/>
+          </p:cNvCxnSpPr>
           <p:nvPr/>
         </p:nvCxnSpPr>
         <p:spPr>
-          <a:xfrm>
-            <a:off x="14146016" y="12220856"/>
-            <a:ext cx="0" cy="616663"/>
+          <a:xfrm flipH="1">
+            <a:off x="13358495" y="7740015"/>
+            <a:ext cx="52705" cy="1067435"/>
           </a:xfrm>
           <a:prstGeom prst="straightConnector1">
             <a:avLst/>
@@ -4710,8 +4720,8 @@
         </p:nvSpPr>
         <p:spPr>
           <a:xfrm>
-            <a:off x="14146014" y="12261699"/>
-            <a:ext cx="3086985" cy="495300"/>
+            <a:off x="13387070" y="7915275"/>
+            <a:ext cx="5366385" cy="645160"/>
           </a:xfrm>
           <a:prstGeom prst="rect">
             <a:avLst/>
@@ -4724,7 +4734,7 @@
           </a:bodyPr>
           <a:p>
             <a:r>
-              <a:rPr lang="de-DE" sz="2630" i="1" dirty="0">
+              <a:rPr lang="de-DE" sz="3600" i="1" dirty="0">
                 <a:effectLst>
                   <a:outerShdw blurRad="38100" dist="38100" dir="2700000" algn="tl">
                     <a:srgbClr val="000000">
@@ -4736,7 +4746,7 @@
               <a:t>Phase </a:t>
             </a:r>
             <a:r>
-              <a:rPr lang="de-DE" sz="2630" i="1" smtClean="0">
+              <a:rPr lang="de-DE" sz="3600" i="1" smtClean="0">
                 <a:effectLst>
                   <a:outerShdw blurRad="38100" dist="38100" dir="2700000" algn="tl">
                     <a:srgbClr val="000000">
@@ -4748,7 +4758,7 @@
               <a:t>deviation </a:t>
             </a:r>
             <a:r>
-              <a:rPr lang="de-DE" sz="2630" i="1" dirty="0" smtClean="0">
+              <a:rPr lang="de-DE" sz="3600" i="1" dirty="0" smtClean="0">
                 <a:effectLst>
                   <a:outerShdw blurRad="38100" dist="38100" dir="2700000" algn="tl">
                     <a:srgbClr val="000000">
@@ -4760,7 +4770,7 @@
               <a:t>∆</a:t>
             </a:r>
             <a:r>
-              <a:rPr lang="el-GR" sz="2630" i="1" dirty="0">
+              <a:rPr lang="el-GR" sz="3600" i="1" dirty="0">
                 <a:effectLst>
                   <a:outerShdw blurRad="38100" dist="38100" dir="2700000" algn="tl">
                     <a:srgbClr val="000000">
@@ -4773,7 +4783,7 @@
               <a:t>φ</a:t>
             </a:r>
             <a:r>
-              <a:rPr lang="en-US" altLang="de-DE" sz="2630" i="1" baseline="30000" dirty="0" smtClean="0">
+              <a:rPr lang="en-US" altLang="de-DE" sz="3600" i="1" baseline="30000" dirty="0" smtClean="0">
                 <a:effectLst>
                   <a:outerShdw blurRad="38100" dist="38100" dir="2700000" algn="tl">
                     <a:srgbClr val="000000">
@@ -4784,7 +4794,7 @@
               </a:rPr>
               <a:t>trg</a:t>
             </a:r>
-            <a:endParaRPr lang="en-US" altLang="de-DE" sz="2630" i="1" baseline="30000" dirty="0">
+            <a:endParaRPr lang="en-US" altLang="de-DE" sz="3600" i="1" baseline="30000" dirty="0">
               <a:effectLst>
                 <a:outerShdw blurRad="38100" dist="38100" dir="2700000" algn="tl">
                   <a:srgbClr val="000000">
@@ -4806,7 +4816,7 @@
         </p:nvCxnSpPr>
         <p:spPr>
           <a:xfrm rot="10800000">
-            <a:off x="12961195" y="12810884"/>
+            <a:off x="12225865" y="8770379"/>
             <a:ext cx="1005954" cy="338493"/>
           </a:xfrm>
           <a:prstGeom prst="curvedConnector4">
@@ -4845,8 +4855,8 @@
         </p:nvSpPr>
         <p:spPr>
           <a:xfrm>
-            <a:off x="12354560" y="12115165"/>
-            <a:ext cx="1886585" cy="495300"/>
+            <a:off x="10153650" y="8074660"/>
+            <a:ext cx="2560320" cy="645160"/>
           </a:xfrm>
           <a:prstGeom prst="rect">
             <a:avLst/>
@@ -4859,7 +4869,7 @@
           </a:bodyPr>
           <a:p>
             <a:r>
-              <a:rPr lang="de-DE" sz="2625" i="1" dirty="0" smtClean="0">
+              <a:rPr lang="de-DE" sz="3600" i="1" dirty="0" smtClean="0">
                 <a:effectLst>
                   <a:outerShdw blurRad="38100" dist="38100" dir="2700000" algn="tl">
                     <a:srgbClr val="000000">
@@ -4873,7 +4883,7 @@
               <a:t>ψ</a:t>
             </a:r>
             <a:r>
-              <a:rPr lang="en-US" altLang="de-DE" sz="2625" i="1" baseline="30000" dirty="0" smtClean="0">
+              <a:rPr lang="en-US" altLang="de-DE" sz="3600" i="1" baseline="30000" dirty="0" smtClean="0">
                 <a:effectLst>
                   <a:outerShdw blurRad="38100" dist="38100" dir="2700000" algn="tl">
                     <a:srgbClr val="000000">
@@ -4887,7 +4897,7 @@
               <a:t>trg</a:t>
             </a:r>
             <a:r>
-              <a:rPr lang="en-US" altLang="de-DE" sz="2630" i="1" dirty="0" smtClean="0">
+              <a:rPr lang="en-US" altLang="de-DE" sz="3600" i="1" dirty="0" smtClean="0">
                 <a:effectLst>
                   <a:outerShdw blurRad="38100" dist="38100" dir="2700000" algn="tl">
                     <a:srgbClr val="000000">
@@ -4899,7 +4909,7 @@
               <a:t> and  k</a:t>
             </a:r>
             <a:r>
-              <a:rPr lang="en-US" altLang="de-DE" sz="2625" i="1" baseline="30000" dirty="0" smtClean="0">
+              <a:rPr lang="en-US" altLang="de-DE" sz="3600" i="1" baseline="30000" dirty="0" smtClean="0">
                 <a:effectLst>
                   <a:outerShdw blurRad="38100" dist="38100" dir="2700000" algn="tl">
                     <a:srgbClr val="000000">
@@ -4912,7 +4922,7 @@
               </a:rPr>
               <a:t>trg</a:t>
             </a:r>
-            <a:endParaRPr lang="en-US" altLang="de-DE" sz="2630" i="1" dirty="0" smtClean="0">
+            <a:endParaRPr lang="en-US" altLang="de-DE" sz="3600" i="1" dirty="0" smtClean="0">
               <a:effectLst>
                 <a:outerShdw blurRad="38100" dist="38100" dir="2700000" algn="tl">
                   <a:srgbClr val="000000">
@@ -4932,7 +4942,7 @@
         </p:nvCxnSpPr>
         <p:spPr>
           <a:xfrm rot="10800000">
-            <a:off x="3853627" y="12800723"/>
+            <a:off x="3518347" y="8760218"/>
             <a:ext cx="1005954" cy="338493"/>
           </a:xfrm>
           <a:prstGeom prst="curvedConnector4">
@@ -4971,8 +4981,8 @@
         </p:nvSpPr>
         <p:spPr>
           <a:xfrm>
-            <a:off x="3238669" y="12077528"/>
-            <a:ext cx="3086985" cy="495300"/>
+            <a:off x="1442720" y="7915275"/>
+            <a:ext cx="2764790" cy="645160"/>
           </a:xfrm>
           <a:prstGeom prst="rect">
             <a:avLst/>
@@ -4985,7 +4995,7 @@
           </a:bodyPr>
           <a:p>
             <a:r>
-              <a:rPr lang="de-DE" sz="2625" i="1" dirty="0" smtClean="0">
+              <a:rPr lang="de-DE" sz="3600" i="1" dirty="0" smtClean="0">
                 <a:effectLst>
                   <a:outerShdw blurRad="38100" dist="38100" dir="2700000" algn="tl">
                     <a:srgbClr val="000000">
@@ -4999,7 +5009,7 @@
               <a:t>ψ</a:t>
             </a:r>
             <a:r>
-              <a:rPr lang="en-US" altLang="de-DE" sz="2625" i="1" baseline="30000" dirty="0" smtClean="0">
+              <a:rPr lang="en-US" altLang="de-DE" sz="3600" i="1" baseline="30000" dirty="0" smtClean="0">
                 <a:effectLst>
                   <a:outerShdw blurRad="38100" dist="38100" dir="2700000" algn="tl">
                     <a:srgbClr val="000000">
@@ -5013,7 +5023,7 @@
               <a:t>src</a:t>
             </a:r>
             <a:r>
-              <a:rPr lang="en-US" altLang="de-DE" sz="2630" i="1" dirty="0" smtClean="0">
+              <a:rPr lang="en-US" altLang="de-DE" sz="3600" i="1" dirty="0" smtClean="0">
                 <a:effectLst>
                   <a:outerShdw blurRad="38100" dist="38100" dir="2700000" algn="tl">
                     <a:srgbClr val="000000">
@@ -5025,7 +5035,7 @@
               <a:t> and K</a:t>
             </a:r>
             <a:r>
-              <a:rPr lang="en-US" altLang="de-DE" sz="2625" i="1" baseline="30000" dirty="0" smtClean="0">
+              <a:rPr lang="en-US" altLang="de-DE" sz="3600" i="1" baseline="30000" dirty="0" smtClean="0">
                 <a:effectLst>
                   <a:outerShdw blurRad="38100" dist="38100" dir="2700000" algn="tl">
                     <a:srgbClr val="000000">
@@ -5039,7 +5049,7 @@
               <a:t>src</a:t>
             </a:r>
             <a:r>
-              <a:rPr lang="en-US" altLang="de-DE" sz="2625" i="1" dirty="0" smtClean="0">
+              <a:rPr lang="en-US" altLang="de-DE" sz="3600" i="1" dirty="0" smtClean="0">
                 <a:effectLst>
                   <a:outerShdw blurRad="38100" dist="38100" dir="2700000" algn="tl">
                     <a:srgbClr val="000000">
@@ -5051,7 +5061,7 @@
               </a:rPr>
               <a:t> </a:t>
             </a:r>
-            <a:endParaRPr lang="en-US" altLang="de-DE" sz="2630" i="1" dirty="0" smtClean="0">
+            <a:endParaRPr lang="en-US" altLang="de-DE" sz="3600" i="1" dirty="0" smtClean="0">
               <a:effectLst>
                 <a:outerShdw blurRad="38100" dist="38100" dir="2700000" algn="tl">
                   <a:srgbClr val="000000">
@@ -5071,8 +5081,8 @@
         </p:nvSpPr>
         <p:spPr>
           <a:xfrm>
-            <a:off x="8854184" y="14896479"/>
-            <a:ext cx="2305311" cy="1447964"/>
+            <a:off x="8336280" y="10751820"/>
+            <a:ext cx="2707005" cy="2244090"/>
           </a:xfrm>
           <a:prstGeom prst="cloud">
             <a:avLst/>
@@ -5109,14 +5119,14 @@
           <a:p>
             <a:pPr algn="ctr"/>
             <a:r>
-              <a:rPr lang="en-US" altLang="zh-CN" sz="2400">
+              <a:rPr lang="en-US" altLang="zh-CN" sz="3600">
                 <a:solidFill>
                   <a:schemeClr val="tx1"/>
                 </a:solidFill>
               </a:rPr>
               <a:t>WR network</a:t>
             </a:r>
-            <a:endParaRPr lang="en-US" altLang="zh-CN" sz="2400">
+            <a:endParaRPr lang="en-US" altLang="zh-CN" sz="3600">
               <a:solidFill>
                 <a:schemeClr val="tx1"/>
               </a:solidFill>
@@ -5129,13 +5139,14 @@
           <p:cNvPr id="51" name="肘形连接符 50"/>
           <p:cNvCxnSpPr>
             <a:stCxn id="50" idx="2"/>
+            <a:endCxn id="56" idx="0"/>
           </p:cNvCxnSpPr>
           <p:nvPr/>
         </p:nvCxnSpPr>
         <p:spPr>
           <a:xfrm rot="10800000" flipV="1">
-            <a:off x="3829494" y="15620461"/>
-            <a:ext cx="5031676" cy="513138"/>
+            <a:off x="3748405" y="11873230"/>
+            <a:ext cx="4595495" cy="885825"/>
           </a:xfrm>
           <a:prstGeom prst="bentConnector2">
             <a:avLst/>
@@ -5173,8 +5184,8 @@
         </p:nvCxnSpPr>
         <p:spPr>
           <a:xfrm rot="16200000" flipV="1">
-            <a:off x="11799888" y="14978063"/>
-            <a:ext cx="487680" cy="1772285"/>
+            <a:off x="11526203" y="11388408"/>
+            <a:ext cx="885825" cy="1856740"/>
           </a:xfrm>
           <a:prstGeom prst="bentConnector2">
             <a:avLst/>
@@ -5209,8 +5220,8 @@
         </p:nvSpPr>
         <p:spPr>
           <a:xfrm>
-            <a:off x="4568718" y="15160034"/>
-            <a:ext cx="2743511" cy="460375"/>
+            <a:off x="3518535" y="11169015"/>
+            <a:ext cx="4243705" cy="645160"/>
           </a:xfrm>
           <a:prstGeom prst="rect">
             <a:avLst/>
@@ -5223,12 +5234,14 @@
           </a:bodyPr>
           <a:p>
             <a:r>
-              <a:rPr lang="en-US" altLang="zh-CN" sz="2400">
+              <a:rPr lang="en-US" altLang="zh-CN" sz="3600">
                 <a:sym typeface="+mn-ea"/>
               </a:rPr>
               <a:t>TGM_PHASE_TIME</a:t>
             </a:r>
-            <a:endParaRPr lang="en-US" altLang="zh-CN" sz="2400"/>
+            <a:endParaRPr lang="en-US" altLang="zh-CN" sz="3600">
+              <a:sym typeface="+mn-ea"/>
+            </a:endParaRPr>
           </a:p>
         </p:txBody>
       </p:sp>
@@ -5240,8 +5253,8 @@
         </p:nvSpPr>
         <p:spPr>
           <a:xfrm>
-            <a:off x="11273808" y="15160034"/>
-            <a:ext cx="3028659" cy="460375"/>
+            <a:off x="11214735" y="11198225"/>
+            <a:ext cx="4474210" cy="645160"/>
           </a:xfrm>
           <a:prstGeom prst="rect">
             <a:avLst/>
@@ -5254,10 +5267,10 @@
           </a:bodyPr>
           <a:p>
             <a:r>
-              <a:rPr lang="en-US" altLang="zh-CN" sz="2400"/>
+              <a:rPr lang="en-US" altLang="zh-CN" sz="3600"/>
               <a:t>TGM_PHASE_TIME </a:t>
             </a:r>
-            <a:endParaRPr lang="en-US" altLang="zh-CN" sz="2400"/>
+            <a:endParaRPr lang="en-US" altLang="zh-CN" sz="3600"/>
           </a:p>
         </p:txBody>
       </p:sp>
@@ -5269,7 +5282,7 @@
         </p:nvSpPr>
         <p:spPr>
           <a:xfrm>
-            <a:off x="3109322" y="16105656"/>
+            <a:off x="2993117" y="12757301"/>
             <a:ext cx="4901486" cy="1453680"/>
           </a:xfrm>
           <a:prstGeom prst="rect">
@@ -5318,7 +5331,7 @@
           <a:bodyPr rtlCol="0" anchor="ctr"/>
           <a:p>
             <a:pPr algn="ctr"/>
-            <a:endParaRPr lang="de-DE" sz="1970"/>
+            <a:endParaRPr lang="de-DE" sz="3600"/>
           </a:p>
         </p:txBody>
       </p:sp>
@@ -5330,8 +5343,8 @@
         </p:nvSpPr>
         <p:spPr>
           <a:xfrm>
-            <a:off x="3090270" y="16108197"/>
-            <a:ext cx="1319680" cy="1453680"/>
+            <a:off x="2974340" y="12759690"/>
+            <a:ext cx="1549400" cy="1453515"/>
           </a:xfrm>
           <a:prstGeom prst="rect">
             <a:avLst/>
@@ -5358,22 +5371,22 @@
           <a:p>
             <a:pPr algn="ctr"/>
             <a:r>
-              <a:rPr lang="de-DE" sz="3070" dirty="0" smtClean="0"/>
+              <a:rPr lang="de-DE" sz="3600" dirty="0" smtClean="0"/>
               <a:t>B2B</a:t>
             </a:r>
-            <a:endParaRPr lang="de-DE" sz="3070" dirty="0" smtClean="0"/>
+            <a:endParaRPr lang="de-DE" sz="3600" dirty="0" smtClean="0"/>
           </a:p>
           <a:p>
             <a:pPr algn="ctr"/>
             <a:r>
-              <a:rPr lang="de-DE" sz="3070" dirty="0" err="1" smtClean="0"/>
+              <a:rPr lang="de-DE" sz="3600" dirty="0" err="1" smtClean="0"/>
               <a:t>source</a:t>
             </a:r>
             <a:r>
-              <a:rPr lang="de-DE" sz="3070" dirty="0" smtClean="0"/>
+              <a:rPr lang="de-DE" sz="3600" dirty="0" smtClean="0"/>
               <a:t> SCU</a:t>
             </a:r>
-            <a:endParaRPr lang="de-DE" sz="3070" dirty="0"/>
+            <a:endParaRPr lang="de-DE" sz="3600" dirty="0"/>
           </a:p>
         </p:txBody>
       </p:sp>
@@ -5385,7 +5398,7 @@
         </p:nvSpPr>
         <p:spPr>
           <a:xfrm>
-            <a:off x="12300720" y="16105656"/>
+            <a:off x="12184515" y="12757301"/>
             <a:ext cx="4690007" cy="1453680"/>
           </a:xfrm>
           <a:prstGeom prst="rect">
@@ -5434,7 +5447,7 @@
           <a:bodyPr rtlCol="0" anchor="ctr"/>
           <a:p>
             <a:pPr algn="ctr"/>
-            <a:endParaRPr lang="de-DE" sz="1970"/>
+            <a:endParaRPr lang="de-DE" sz="3600"/>
           </a:p>
         </p:txBody>
       </p:sp>
@@ -5446,8 +5459,8 @@
         </p:nvSpPr>
         <p:spPr>
           <a:xfrm>
-            <a:off x="12281659" y="16107971"/>
-            <a:ext cx="1295846" cy="1453423"/>
+            <a:off x="12165330" y="12759690"/>
+            <a:ext cx="1464310" cy="1453515"/>
           </a:xfrm>
           <a:prstGeom prst="rect">
             <a:avLst/>
@@ -5474,22 +5487,22 @@
           <a:p>
             <a:pPr algn="ctr"/>
             <a:r>
-              <a:rPr lang="de-DE" sz="3070" dirty="0" smtClean="0"/>
+              <a:rPr lang="de-DE" sz="3600" dirty="0" smtClean="0"/>
               <a:t>B2B</a:t>
             </a:r>
-            <a:endParaRPr lang="de-DE" sz="3070" dirty="0" smtClean="0"/>
+            <a:endParaRPr lang="de-DE" sz="3600" dirty="0" smtClean="0"/>
           </a:p>
           <a:p>
             <a:pPr algn="ctr"/>
             <a:r>
-              <a:rPr lang="en-US" altLang="de-DE" sz="3070" dirty="0" err="1" smtClean="0"/>
+              <a:rPr lang="en-US" altLang="de-DE" sz="3600" dirty="0" err="1" smtClean="0"/>
               <a:t>target</a:t>
             </a:r>
             <a:r>
-              <a:rPr lang="de-DE" sz="3070" dirty="0" smtClean="0"/>
+              <a:rPr lang="de-DE" sz="3600" dirty="0" smtClean="0"/>
               <a:t>SCU</a:t>
             </a:r>
-            <a:endParaRPr lang="de-DE" sz="3070" dirty="0"/>
+            <a:endParaRPr lang="de-DE" sz="3600" dirty="0"/>
           </a:p>
         </p:txBody>
       </p:sp>
@@ -5501,8 +5514,8 @@
         </p:nvSpPr>
         <p:spPr>
           <a:xfrm>
-            <a:off x="13864590" y="15142210"/>
-            <a:ext cx="3612515" cy="495300"/>
+            <a:off x="13452475" y="11814175"/>
+            <a:ext cx="3612515" cy="645160"/>
           </a:xfrm>
           <a:prstGeom prst="rect">
             <a:avLst/>
@@ -5515,7 +5528,7 @@
           </a:bodyPr>
           <a:p>
             <a:r>
-              <a:rPr lang="en-US" altLang="de-DE" sz="2630" i="1" dirty="0" smtClean="0">
+              <a:rPr lang="en-US" altLang="de-DE" sz="3600" i="1" dirty="0" smtClean="0">
                 <a:effectLst>
                   <a:outerShdw blurRad="38100" dist="38100" dir="2700000" algn="tl">
                     <a:srgbClr val="000000">
@@ -5527,7 +5540,7 @@
               <a:t>(</a:t>
             </a:r>
             <a:r>
-              <a:rPr lang="de-DE" sz="2625" i="1" dirty="0" smtClean="0">
+              <a:rPr lang="de-DE" sz="3600" i="1" dirty="0" smtClean="0">
                 <a:effectLst>
                   <a:outerShdw blurRad="38100" dist="38100" dir="2700000" algn="tl">
                     <a:srgbClr val="000000">
@@ -5541,7 +5554,7 @@
               <a:t>ψ</a:t>
             </a:r>
             <a:r>
-              <a:rPr lang="en-US" altLang="de-DE" sz="2625" i="1" baseline="30000" dirty="0" smtClean="0">
+              <a:rPr lang="en-US" altLang="de-DE" sz="3600" i="1" baseline="30000" dirty="0" smtClean="0">
                 <a:effectLst>
                   <a:outerShdw blurRad="38100" dist="38100" dir="2700000" algn="tl">
                     <a:srgbClr val="000000">
@@ -5555,7 +5568,7 @@
               <a:t>trg</a:t>
             </a:r>
             <a:r>
-              <a:rPr lang="en-US" altLang="de-DE" sz="2630" i="1" dirty="0" smtClean="0">
+              <a:rPr lang="en-US" altLang="de-DE" sz="3600" i="1" dirty="0" smtClean="0">
                 <a:effectLst>
                   <a:outerShdw blurRad="38100" dist="38100" dir="2700000" algn="tl">
                     <a:srgbClr val="000000">
@@ -5567,7 +5580,7 @@
               <a:t>, t</a:t>
             </a:r>
             <a:r>
-              <a:rPr lang="de-DE" sz="2625" i="1" baseline="-25000" dirty="0" smtClean="0">
+              <a:rPr lang="de-DE" sz="3600" i="1" baseline="-25000" dirty="0" smtClean="0">
                 <a:effectLst>
                   <a:outerShdw blurRad="38100" dist="38100" dir="2700000" algn="tl">
                     <a:srgbClr val="000000">
@@ -5581,7 +5594,7 @@
               <a:t>ψ</a:t>
             </a:r>
             <a:r>
-              <a:rPr lang="en-US" altLang="de-DE" sz="2625" i="1" baseline="30000" dirty="0" smtClean="0">
+              <a:rPr lang="en-US" altLang="de-DE" sz="3600" i="1" baseline="30000" dirty="0" smtClean="0">
                 <a:effectLst>
                   <a:outerShdw blurRad="38100" dist="38100" dir="2700000" algn="tl">
                     <a:srgbClr val="000000">
@@ -5594,7 +5607,7 @@
               <a:t>trg </a:t>
             </a:r>
             <a:r>
-              <a:rPr lang="en-US" altLang="de-DE" sz="2625" i="1" dirty="0" smtClean="0">
+              <a:rPr lang="en-US" altLang="de-DE" sz="3600" i="1" dirty="0" smtClean="0">
                 <a:effectLst>
                   <a:outerShdw blurRad="38100" dist="38100" dir="2700000" algn="tl">
                     <a:srgbClr val="000000">
@@ -5607,7 +5620,7 @@
               <a:t>and k</a:t>
             </a:r>
             <a:r>
-              <a:rPr lang="en-US" altLang="de-DE" sz="2625" i="1" baseline="30000" dirty="0" smtClean="0">
+              <a:rPr lang="en-US" altLang="de-DE" sz="3600" i="1" baseline="30000" dirty="0" smtClean="0">
                 <a:effectLst>
                   <a:outerShdw blurRad="38100" dist="38100" dir="2700000" algn="tl">
                     <a:srgbClr val="000000">
@@ -5621,7 +5634,7 @@
               <a:t>trg</a:t>
             </a:r>
             <a:r>
-              <a:rPr lang="en-US" altLang="de-DE" sz="2630" i="1" dirty="0" smtClean="0">
+              <a:rPr lang="en-US" altLang="de-DE" sz="3600" i="1" dirty="0" smtClean="0">
                 <a:effectLst>
                   <a:outerShdw blurRad="38100" dist="38100" dir="2700000" algn="tl">
                     <a:srgbClr val="000000">
@@ -5632,7 +5645,7 @@
               </a:rPr>
               <a:t>)</a:t>
             </a:r>
-            <a:endParaRPr lang="en-US" altLang="de-DE" sz="2630" i="1" dirty="0" smtClean="0">
+            <a:endParaRPr lang="en-US" altLang="de-DE" sz="3600" i="1" dirty="0" smtClean="0">
               <a:effectLst>
                 <a:outerShdw blurRad="38100" dist="38100" dir="2700000" algn="tl">
                   <a:srgbClr val="000000">
@@ -5652,8 +5665,8 @@
         </p:nvSpPr>
         <p:spPr>
           <a:xfrm>
-            <a:off x="9058678" y="19077126"/>
-            <a:ext cx="2305311" cy="1447964"/>
+            <a:off x="9015095" y="15841980"/>
+            <a:ext cx="3232785" cy="1447800"/>
           </a:xfrm>
           <a:prstGeom prst="cloud">
             <a:avLst/>
@@ -5690,14 +5703,14 @@
           <a:p>
             <a:pPr algn="ctr"/>
             <a:r>
-              <a:rPr lang="en-US" altLang="zh-CN" sz="2400">
+              <a:rPr lang="en-US" altLang="zh-CN" sz="3600">
                 <a:solidFill>
                   <a:schemeClr val="tx1"/>
                 </a:solidFill>
               </a:rPr>
               <a:t>WR network</a:t>
             </a:r>
-            <a:endParaRPr lang="en-US" altLang="zh-CN" sz="2400">
+            <a:endParaRPr lang="en-US" altLang="zh-CN" sz="3600">
               <a:solidFill>
                 <a:schemeClr val="tx1"/>
               </a:solidFill>
@@ -5715,7 +5728,7 @@
         </p:nvCxnSpPr>
         <p:spPr>
           <a:xfrm rot="10800000" flipV="1">
-            <a:off x="3759530" y="19710328"/>
+            <a:off x="3781120" y="16475003"/>
             <a:ext cx="5450034" cy="1920403"/>
           </a:xfrm>
           <a:prstGeom prst="bentConnector2">
@@ -5752,8 +5765,8 @@
         </p:nvSpPr>
         <p:spPr>
           <a:xfrm>
-            <a:off x="4693694" y="18884123"/>
-            <a:ext cx="4198342" cy="826135"/>
+            <a:off x="3626485" y="15061565"/>
+            <a:ext cx="5708015" cy="1193800"/>
           </a:xfrm>
           <a:prstGeom prst="rect">
             <a:avLst/>
@@ -5766,17 +5779,17 @@
           </a:bodyPr>
           <a:p>
             <a:r>
-              <a:rPr lang="en-US" altLang="zh-CN" sz="2400"/>
+              <a:rPr lang="en-US" altLang="zh-CN" sz="3600"/>
               <a:t>TGM_SYNCH_WIN </a:t>
             </a:r>
-            <a:endParaRPr lang="en-US" altLang="zh-CN" sz="2400"/>
-          </a:p>
-          <a:p>
-            <a:r>
-              <a:rPr lang="en-US" altLang="zh-CN" sz="2400"/>
+            <a:endParaRPr lang="en-US" altLang="zh-CN" sz="3600"/>
+          </a:p>
+          <a:p>
+            <a:r>
+              <a:rPr lang="en-US" altLang="zh-CN" sz="3600"/>
               <a:t>TGM_PHASE_CORRECTION</a:t>
             </a:r>
-            <a:endParaRPr lang="en-US" altLang="zh-CN" sz="2400"/>
+            <a:endParaRPr lang="en-US" altLang="zh-CN" sz="3600"/>
           </a:p>
         </p:txBody>
       </p:sp>
@@ -5788,7 +5801,7 @@
         </p:nvSpPr>
         <p:spPr>
           <a:xfrm>
-            <a:off x="9614366" y="17968925"/>
+            <a:off x="9570551" y="14733600"/>
             <a:ext cx="1193935" cy="660475"/>
           </a:xfrm>
           <a:prstGeom prst="rect">
@@ -5822,14 +5835,14 @@
           <a:p>
             <a:pPr algn="ctr"/>
             <a:r>
-              <a:rPr lang="en-US" altLang="zh-CN" sz="2800">
+              <a:rPr lang="en-US" altLang="zh-CN" sz="3600">
                 <a:solidFill>
                   <a:schemeClr val="tx1"/>
                 </a:solidFill>
               </a:rPr>
               <a:t>DM</a:t>
             </a:r>
-            <a:endParaRPr lang="en-US" altLang="zh-CN" sz="2800">
+            <a:endParaRPr lang="en-US" altLang="zh-CN" sz="3600">
               <a:solidFill>
                 <a:schemeClr val="tx1"/>
               </a:solidFill>
@@ -5845,7 +5858,7 @@
         </p:nvCxnSpPr>
         <p:spPr>
           <a:xfrm rot="5400000">
-            <a:off x="9945908" y="18892696"/>
+            <a:off x="9902093" y="15657371"/>
             <a:ext cx="530270" cy="3175"/>
           </a:xfrm>
           <a:prstGeom prst="bentConnector2">
@@ -5882,12 +5895,12 @@
         </p:nvCxnSpPr>
         <p:spPr>
           <a:xfrm rot="16200000">
-            <a:off x="5288598" y="20039648"/>
-            <a:ext cx="4436745" cy="5405120"/>
+            <a:off x="4854575" y="17103090"/>
+            <a:ext cx="4982845" cy="4953000"/>
           </a:xfrm>
           <a:prstGeom prst="bentConnector3">
             <a:avLst>
-              <a:gd name="adj1" fmla="val 31959"/>
+              <a:gd name="adj1" fmla="val 36096"/>
             </a:avLst>
           </a:prstGeom>
           <a:ln w="38100">
@@ -5924,8 +5937,8 @@
         </p:nvCxnSpPr>
         <p:spPr>
           <a:xfrm rot="16200000" flipV="1">
-            <a:off x="9566275" y="21596985"/>
-            <a:ext cx="5160010" cy="1568450"/>
+            <a:off x="9822815" y="18988405"/>
+            <a:ext cx="5160010" cy="314960"/>
           </a:xfrm>
           <a:prstGeom prst="bentConnector2">
             <a:avLst/>
@@ -5961,7 +5974,7 @@
         </p:nvSpPr>
         <p:spPr>
           <a:xfrm>
-            <a:off x="3140370" y="21659258"/>
+            <a:off x="3096555" y="18423933"/>
             <a:ext cx="6180397" cy="1453382"/>
           </a:xfrm>
           <a:prstGeom prst="rect">
@@ -6010,7 +6023,7 @@
           <a:bodyPr rtlCol="0" anchor="ctr"/>
           <a:p>
             <a:pPr algn="ctr"/>
-            <a:endParaRPr lang="de-DE" sz="1970"/>
+            <a:endParaRPr lang="de-DE" sz="3600"/>
           </a:p>
         </p:txBody>
       </p:sp>
@@ -6022,8 +6035,8 @@
         </p:nvSpPr>
         <p:spPr>
           <a:xfrm>
-            <a:off x="3111793" y="21630681"/>
-            <a:ext cx="1295809" cy="1453382"/>
+            <a:off x="3035300" y="18395315"/>
+            <a:ext cx="1492250" cy="1453515"/>
           </a:xfrm>
           <a:prstGeom prst="rect">
             <a:avLst/>
@@ -6050,22 +6063,22 @@
           <a:p>
             <a:pPr algn="ctr"/>
             <a:r>
-              <a:rPr lang="de-DE" sz="3070" dirty="0" smtClean="0"/>
+              <a:rPr lang="de-DE" sz="3600" dirty="0" smtClean="0"/>
               <a:t>B2B</a:t>
             </a:r>
-            <a:endParaRPr lang="de-DE" sz="3070" dirty="0" smtClean="0"/>
+            <a:endParaRPr lang="de-DE" sz="3600" dirty="0" smtClean="0"/>
           </a:p>
           <a:p>
             <a:pPr algn="ctr"/>
             <a:r>
-              <a:rPr lang="de-DE" sz="3070" dirty="0" err="1" smtClean="0"/>
+              <a:rPr lang="de-DE" sz="3600" dirty="0" err="1" smtClean="0"/>
               <a:t>source</a:t>
             </a:r>
             <a:r>
-              <a:rPr lang="de-DE" sz="3070" dirty="0" smtClean="0"/>
+              <a:rPr lang="de-DE" sz="3600" dirty="0" smtClean="0"/>
               <a:t> SCU</a:t>
             </a:r>
-            <a:endParaRPr lang="de-DE" sz="3070" dirty="0"/>
+            <a:endParaRPr lang="de-DE" sz="3600" dirty="0"/>
           </a:p>
         </p:txBody>
       </p:sp>
@@ -6077,8 +6090,8 @@
         </p:nvSpPr>
         <p:spPr>
           <a:xfrm>
-            <a:off x="6268553" y="21645279"/>
-            <a:ext cx="1074754" cy="1455735"/>
+            <a:off x="6224905" y="18409920"/>
+            <a:ext cx="1395095" cy="1455420"/>
           </a:xfrm>
           <a:prstGeom prst="rect">
             <a:avLst/>
@@ -6108,14 +6121,14 @@
           <a:p>
             <a:pPr algn="ctr"/>
             <a:r>
-              <a:rPr lang="de-DE" sz="3070" i="1" dirty="0" smtClean="0">
+              <a:rPr lang="de-DE" sz="3600" i="1" dirty="0" smtClean="0">
                 <a:solidFill>
                   <a:schemeClr val="tx1"/>
                 </a:solidFill>
               </a:rPr>
               <a:t>PSM</a:t>
             </a:r>
-            <a:endParaRPr lang="de-DE" sz="3070" i="1" dirty="0">
+            <a:endParaRPr lang="de-DE" sz="3600" i="1" dirty="0" smtClean="0">
               <a:solidFill>
                 <a:schemeClr val="tx1"/>
               </a:solidFill>
@@ -6133,7 +6146,7 @@
         </p:nvCxnSpPr>
         <p:spPr>
           <a:xfrm flipH="1" flipV="1">
-            <a:off x="6793183" y="21082285"/>
+            <a:off x="6991303" y="17846960"/>
             <a:ext cx="2540" cy="534715"/>
           </a:xfrm>
           <a:prstGeom prst="straightConnector1">
@@ -6169,8 +6182,8 @@
         </p:nvSpPr>
         <p:spPr>
           <a:xfrm>
-            <a:off x="6130782" y="20259185"/>
-            <a:ext cx="1324892" cy="823114"/>
+            <a:off x="6087110" y="16757650"/>
+            <a:ext cx="1808480" cy="1089025"/>
           </a:xfrm>
           <a:prstGeom prst="rect">
             <a:avLst/>
@@ -6200,14 +6213,14 @@
           <a:p>
             <a:pPr algn="ctr"/>
             <a:r>
-              <a:rPr lang="de-DE" sz="3070" i="1" dirty="0" smtClean="0">
+              <a:rPr lang="de-DE" sz="3600" i="1" dirty="0" smtClean="0">
                 <a:solidFill>
                   <a:schemeClr val="tx1"/>
                 </a:solidFill>
               </a:rPr>
               <a:t>Group DDS</a:t>
             </a:r>
-            <a:endParaRPr lang="de-DE" sz="3070" i="1" dirty="0">
+            <a:endParaRPr lang="de-DE" sz="3600" i="1" dirty="0" smtClean="0">
               <a:solidFill>
                 <a:schemeClr val="tx1"/>
               </a:solidFill>
@@ -6223,8 +6236,8 @@
         </p:nvSpPr>
         <p:spPr>
           <a:xfrm>
-            <a:off x="4127382" y="19993275"/>
-            <a:ext cx="4435092" cy="1296670"/>
+            <a:off x="3826510" y="16348710"/>
+            <a:ext cx="2730500" cy="1742440"/>
           </a:xfrm>
           <a:prstGeom prst="rect">
             <a:avLst/>
@@ -6237,7 +6250,7 @@
           </a:bodyPr>
           <a:p>
             <a:r>
-              <a:rPr lang="de-DE" sz="2630" i="1" dirty="0" err="1">
+              <a:rPr lang="de-DE" sz="3600" i="1" dirty="0" err="1">
                 <a:effectLst>
                   <a:outerShdw blurRad="38100" dist="38100" dir="2700000" algn="tl">
                     <a:srgbClr val="000000">
@@ -6249,7 +6262,7 @@
               <a:t>Required</a:t>
             </a:r>
             <a:r>
-              <a:rPr lang="de-DE" sz="2630" i="1" dirty="0">
+              <a:rPr lang="de-DE" sz="3600" i="1" dirty="0">
                 <a:effectLst>
                   <a:outerShdw blurRad="38100" dist="38100" dir="2700000" algn="tl">
                     <a:srgbClr val="000000">
@@ -6260,7 +6273,7 @@
               </a:rPr>
               <a:t> </a:t>
             </a:r>
-            <a:endParaRPr lang="de-DE" sz="2630" i="1" dirty="0">
+            <a:endParaRPr lang="de-DE" sz="3600" i="1" dirty="0">
               <a:effectLst>
                 <a:outerShdw blurRad="38100" dist="38100" dir="2700000" algn="tl">
                   <a:srgbClr val="000000">
@@ -6272,7 +6285,7 @@
           </a:p>
           <a:p>
             <a:r>
-              <a:rPr lang="de-DE" sz="2630" i="1" dirty="0" err="1">
+              <a:rPr lang="de-DE" sz="3600" i="1" dirty="0" err="1">
                 <a:effectLst>
                   <a:outerShdw blurRad="38100" dist="38100" dir="2700000" algn="tl">
                     <a:srgbClr val="000000">
@@ -6284,7 +6297,7 @@
               <a:t>phase</a:t>
             </a:r>
             <a:r>
-              <a:rPr lang="de-DE" sz="2630" i="1" dirty="0">
+              <a:rPr lang="de-DE" sz="3600" i="1" dirty="0">
                 <a:effectLst>
                   <a:outerShdw blurRad="38100" dist="38100" dir="2700000" algn="tl">
                     <a:srgbClr val="000000">
@@ -6296,7 +6309,7 @@
               <a:t> </a:t>
             </a:r>
             <a:r>
-              <a:rPr lang="de-DE" sz="2630" i="1" dirty="0" err="1">
+              <a:rPr lang="de-DE" sz="3600" i="1" dirty="0" err="1">
                 <a:effectLst>
                   <a:outerShdw blurRad="38100" dist="38100" dir="2700000" algn="tl">
                     <a:srgbClr val="000000">
@@ -6308,7 +6321,7 @@
               <a:t>shift</a:t>
             </a:r>
             <a:r>
-              <a:rPr lang="de-DE" sz="2630" i="1" dirty="0">
+              <a:rPr lang="de-DE" sz="3600" i="1" dirty="0">
                 <a:effectLst>
                   <a:outerShdw blurRad="38100" dist="38100" dir="2700000" algn="tl">
                     <a:srgbClr val="000000">
@@ -6319,7 +6332,7 @@
               </a:rPr>
               <a:t> </a:t>
             </a:r>
-            <a:endParaRPr lang="de-DE" sz="2630" i="1" dirty="0">
+            <a:endParaRPr lang="de-DE" sz="3600" i="1" dirty="0">
               <a:effectLst>
                 <a:outerShdw blurRad="38100" dist="38100" dir="2700000" algn="tl">
                   <a:srgbClr val="000000">
@@ -6331,7 +6344,7 @@
           </a:p>
           <a:p>
             <a:r>
-              <a:rPr lang="de-DE" sz="2630" i="1" dirty="0">
+              <a:rPr lang="de-DE" sz="3600" i="1" dirty="0">
                 <a:effectLst>
                   <a:outerShdw blurRad="38100" dist="38100" dir="2700000" algn="tl">
                     <a:srgbClr val="000000">
@@ -6343,7 +6356,7 @@
               <a:t>∆</a:t>
             </a:r>
             <a:r>
-              <a:rPr lang="el-GR" sz="2630" i="1" dirty="0">
+              <a:rPr lang="el-GR" sz="3600" i="1" dirty="0">
                 <a:effectLst>
                   <a:outerShdw blurRad="38100" dist="38100" dir="2700000" algn="tl">
                     <a:srgbClr val="000000">
@@ -6355,7 +6368,7 @@
               <a:t>Φ</a:t>
             </a:r>
             <a:r>
-              <a:rPr lang="en-US" altLang="el-GR" sz="2630" i="1" baseline="-25000" dirty="0">
+              <a:rPr lang="en-US" altLang="el-GR" sz="3600" i="1" baseline="-25000" dirty="0">
                 <a:effectLst>
                   <a:outerShdw blurRad="38100" dist="38100" dir="2700000" algn="tl">
                     <a:srgbClr val="000000">
@@ -6366,7 +6379,7 @@
               </a:rPr>
               <a:t>shift</a:t>
             </a:r>
-            <a:endParaRPr lang="en-US" altLang="el-GR" sz="2630" i="1" baseline="-25000" dirty="0">
+            <a:endParaRPr lang="en-US" altLang="el-GR" sz="3600" i="1" baseline="-25000" dirty="0">
               <a:effectLst>
                 <a:outerShdw blurRad="38100" dist="38100" dir="2700000" algn="tl">
                   <a:srgbClr val="000000">
@@ -6386,7 +6399,7 @@
         </p:nvSpPr>
         <p:spPr>
           <a:xfrm>
-            <a:off x="4207241" y="24958415"/>
+            <a:off x="4124691" y="22062815"/>
             <a:ext cx="5170610" cy="1453639"/>
           </a:xfrm>
           <a:prstGeom prst="rect">
@@ -6435,7 +6448,7 @@
           <a:bodyPr rtlCol="0" anchor="ctr"/>
           <a:p>
             <a:pPr algn="ctr"/>
-            <a:endParaRPr lang="de-DE" sz="1970"/>
+            <a:endParaRPr lang="de-DE" sz="3600"/>
           </a:p>
         </p:txBody>
       </p:sp>
@@ -6447,8 +6460,8 @@
         </p:nvSpPr>
         <p:spPr>
           <a:xfrm>
-            <a:off x="4157767" y="24960273"/>
-            <a:ext cx="1295809" cy="1453382"/>
+            <a:off x="4075430" y="22064980"/>
+            <a:ext cx="1596390" cy="1453515"/>
           </a:xfrm>
           <a:prstGeom prst="rect">
             <a:avLst/>
@@ -6475,10 +6488,10 @@
           <a:p>
             <a:pPr algn="ctr"/>
             <a:r>
-              <a:rPr lang="de-DE" sz="3070" dirty="0" err="1" smtClean="0"/>
+              <a:rPr lang="de-DE" sz="3600" dirty="0" err="1" smtClean="0"/>
               <a:t>TriggerSCU</a:t>
             </a:r>
-            <a:endParaRPr lang="de-DE" sz="3070" dirty="0"/>
+            <a:endParaRPr lang="de-DE" sz="3600" dirty="0" err="1" smtClean="0"/>
           </a:p>
         </p:txBody>
       </p:sp>
@@ -6493,8 +6506,8 @@
         </p:nvCxnSpPr>
         <p:spPr>
           <a:xfrm flipV="1">
-            <a:off x="7106650" y="24429538"/>
-            <a:ext cx="19050" cy="528955"/>
+            <a:off x="7024100" y="21194213"/>
+            <a:ext cx="57785" cy="840105"/>
           </a:xfrm>
           <a:prstGeom prst="straightConnector1">
             <a:avLst/>
@@ -6529,7 +6542,7 @@
         </p:nvSpPr>
         <p:spPr>
           <a:xfrm>
-            <a:off x="6588324" y="23896025"/>
+            <a:off x="6544509" y="20660700"/>
             <a:ext cx="1074754" cy="533269"/>
           </a:xfrm>
           <a:prstGeom prst="rect">
@@ -6560,14 +6573,14 @@
           <a:p>
             <a:pPr algn="ctr"/>
             <a:r>
-              <a:rPr lang="de-DE" sz="3070" i="1" dirty="0" smtClean="0">
+              <a:rPr lang="de-DE" sz="3600" i="1" dirty="0" smtClean="0">
                 <a:solidFill>
                   <a:schemeClr val="tx1"/>
                 </a:solidFill>
               </a:rPr>
               <a:t>SR</a:t>
             </a:r>
-            <a:endParaRPr lang="de-DE" sz="3070" i="1" dirty="0">
+            <a:endParaRPr lang="de-DE" sz="3600" i="1" dirty="0" smtClean="0">
               <a:solidFill>
                 <a:schemeClr val="tx1"/>
               </a:solidFill>
@@ -6583,7 +6596,7 @@
         </p:nvSpPr>
         <p:spPr>
           <a:xfrm>
-            <a:off x="6569273" y="24958493"/>
+            <a:off x="6486723" y="22034318"/>
             <a:ext cx="1074754" cy="1455735"/>
           </a:xfrm>
           <a:prstGeom prst="rect">
@@ -6614,14 +6627,14 @@
           <a:p>
             <a:pPr algn="ctr"/>
             <a:r>
-              <a:rPr lang="de-DE" sz="3070" i="1" dirty="0" smtClean="0">
+              <a:rPr lang="de-DE" sz="3600" i="1" dirty="0" smtClean="0">
                 <a:solidFill>
                   <a:schemeClr val="tx1"/>
                 </a:solidFill>
               </a:rPr>
               <a:t>PCM</a:t>
             </a:r>
-            <a:endParaRPr lang="de-DE" sz="3070" i="1" dirty="0">
+            <a:endParaRPr lang="de-DE" sz="3600" i="1" dirty="0" smtClean="0">
               <a:solidFill>
                 <a:schemeClr val="tx1"/>
               </a:solidFill>
@@ -6637,8 +6650,8 @@
         </p:nvSpPr>
         <p:spPr>
           <a:xfrm>
-            <a:off x="5082270" y="23877304"/>
-            <a:ext cx="3809833" cy="895985"/>
+            <a:off x="5038455" y="20641979"/>
+            <a:ext cx="3809833" cy="1193800"/>
           </a:xfrm>
           <a:prstGeom prst="rect">
             <a:avLst/>
@@ -6651,7 +6664,7 @@
           </a:bodyPr>
           <a:p>
             <a:r>
-              <a:rPr lang="de-DE" sz="2630" i="1" dirty="0">
+              <a:rPr lang="de-DE" sz="3600" i="1" dirty="0">
                 <a:effectLst>
                   <a:outerShdw blurRad="38100" dist="38100" dir="2700000" algn="tl">
                     <a:srgbClr val="000000">
@@ -6662,7 +6675,7 @@
               </a:rPr>
               <a:t>Phase </a:t>
             </a:r>
-            <a:endParaRPr lang="de-DE" sz="2630" i="1" dirty="0">
+            <a:endParaRPr lang="de-DE" sz="3600" i="1" dirty="0">
               <a:effectLst>
                 <a:outerShdw blurRad="38100" dist="38100" dir="2700000" algn="tl">
                   <a:srgbClr val="000000">
@@ -6674,7 +6687,7 @@
           </a:p>
           <a:p>
             <a:r>
-              <a:rPr lang="de-DE" sz="2630" i="1" dirty="0" err="1" smtClean="0">
+              <a:rPr lang="de-DE" sz="3600" i="1" dirty="0" err="1" smtClean="0">
                 <a:effectLst>
                   <a:outerShdw blurRad="38100" dist="38100" dir="2700000" algn="tl">
                     <a:srgbClr val="000000">
@@ -6685,7 +6698,7 @@
               </a:rPr>
               <a:t>correction</a:t>
             </a:r>
-            <a:endParaRPr lang="de-DE" sz="2630" i="1" dirty="0">
+            <a:endParaRPr lang="de-DE" sz="3600" i="1" dirty="0">
               <a:effectLst>
                 <a:outerShdw blurRad="38100" dist="38100" dir="2700000" algn="tl">
                   <a:srgbClr val="000000">
@@ -6705,7 +6718,7 @@
         </p:nvSpPr>
         <p:spPr>
           <a:xfrm>
-            <a:off x="12311167" y="24960955"/>
+            <a:off x="11810152" y="21725630"/>
             <a:ext cx="4768621" cy="1453639"/>
           </a:xfrm>
           <a:prstGeom prst="rect">
@@ -6754,7 +6767,7 @@
           <a:bodyPr rtlCol="0" anchor="ctr"/>
           <a:p>
             <a:pPr algn="ctr"/>
-            <a:endParaRPr lang="de-DE" sz="1970"/>
+            <a:endParaRPr lang="de-DE" sz="3600"/>
           </a:p>
         </p:txBody>
       </p:sp>
@@ -6766,8 +6779,8 @@
         </p:nvSpPr>
         <p:spPr>
           <a:xfrm>
-            <a:off x="12282013" y="24960908"/>
-            <a:ext cx="1295809" cy="1453382"/>
+            <a:off x="11760835" y="21725890"/>
+            <a:ext cx="1598295" cy="1453515"/>
           </a:xfrm>
           <a:prstGeom prst="rect">
             <a:avLst/>
@@ -6794,10 +6807,18 @@
           <a:p>
             <a:pPr algn="ctr"/>
             <a:r>
-              <a:rPr lang="de-DE" sz="3070" dirty="0" err="1" smtClean="0"/>
-              <a:t>TriggerSCU</a:t>
-            </a:r>
-            <a:endParaRPr lang="de-DE" sz="3070" dirty="0"/>
+              <a:rPr lang="de-DE" sz="3600" dirty="0" err="1" smtClean="0"/>
+              <a:t>Trigger</a:t>
+            </a:r>
+            <a:endParaRPr lang="de-DE" sz="3600" dirty="0" err="1" smtClean="0"/>
+          </a:p>
+          <a:p>
+            <a:pPr algn="ctr"/>
+            <a:r>
+              <a:rPr lang="de-DE" sz="3600" dirty="0" err="1" smtClean="0"/>
+              <a:t>SCU</a:t>
+            </a:r>
+            <a:endParaRPr lang="de-DE" sz="3600" dirty="0" err="1" smtClean="0"/>
           </a:p>
         </p:txBody>
       </p:sp>
@@ -6812,8 +6833,8 @@
         </p:nvCxnSpPr>
         <p:spPr>
           <a:xfrm flipV="1">
-            <a:off x="15074050" y="24410489"/>
-            <a:ext cx="0" cy="548005"/>
+            <a:off x="15030235" y="20298864"/>
+            <a:ext cx="28575" cy="1395730"/>
           </a:xfrm>
           <a:prstGeom prst="straightConnector1">
             <a:avLst/>
@@ -6848,7 +6869,7 @@
         </p:nvSpPr>
         <p:spPr>
           <a:xfrm>
-            <a:off x="14536673" y="23876975"/>
+            <a:off x="14521433" y="19765350"/>
             <a:ext cx="1074754" cy="533269"/>
           </a:xfrm>
           <a:prstGeom prst="rect">
@@ -6879,14 +6900,14 @@
           <a:p>
             <a:pPr algn="ctr"/>
             <a:r>
-              <a:rPr lang="de-DE" sz="3070" i="1" dirty="0" smtClean="0">
+              <a:rPr lang="de-DE" sz="3600" i="1" dirty="0" smtClean="0">
                 <a:solidFill>
                   <a:schemeClr val="tx1"/>
                 </a:solidFill>
               </a:rPr>
               <a:t>SR</a:t>
             </a:r>
-            <a:endParaRPr lang="de-DE" sz="3070" i="1" dirty="0">
+            <a:endParaRPr lang="de-DE" sz="3600" i="1" dirty="0" smtClean="0">
               <a:solidFill>
                 <a:schemeClr val="tx1"/>
               </a:solidFill>
@@ -6902,7 +6923,7 @@
         </p:nvSpPr>
         <p:spPr>
           <a:xfrm>
-            <a:off x="14536673" y="24958494"/>
+            <a:off x="14492858" y="21694594"/>
             <a:ext cx="1074754" cy="1455735"/>
           </a:xfrm>
           <a:prstGeom prst="rect">
@@ -6933,14 +6954,14 @@
           <a:p>
             <a:pPr algn="ctr"/>
             <a:r>
-              <a:rPr lang="de-DE" sz="3070" i="1" dirty="0" smtClean="0">
+              <a:rPr lang="de-DE" sz="3600" i="1" dirty="0" smtClean="0">
                 <a:solidFill>
                   <a:schemeClr val="tx1"/>
                 </a:solidFill>
               </a:rPr>
               <a:t>PCM</a:t>
             </a:r>
-            <a:endParaRPr lang="de-DE" sz="3070" i="1" dirty="0">
+            <a:endParaRPr lang="de-DE" sz="3600" i="1" dirty="0" smtClean="0">
               <a:solidFill>
                 <a:schemeClr val="tx1"/>
               </a:solidFill>
@@ -6956,8 +6977,8 @@
         </p:nvSpPr>
         <p:spPr>
           <a:xfrm>
-            <a:off x="13127138" y="23924929"/>
-            <a:ext cx="3809833" cy="895985"/>
+            <a:off x="12921615" y="20380325"/>
+            <a:ext cx="2304415" cy="1193800"/>
           </a:xfrm>
           <a:prstGeom prst="rect">
             <a:avLst/>
@@ -6970,7 +6991,7 @@
           </a:bodyPr>
           <a:p>
             <a:r>
-              <a:rPr lang="de-DE" sz="2630" i="1" dirty="0">
+              <a:rPr lang="de-DE" sz="3600" i="1" dirty="0">
                 <a:effectLst>
                   <a:outerShdw blurRad="38100" dist="38100" dir="2700000" algn="tl">
                     <a:srgbClr val="000000">
@@ -6981,7 +7002,7 @@
               </a:rPr>
               <a:t>Phase </a:t>
             </a:r>
-            <a:endParaRPr lang="de-DE" sz="2630" i="1" dirty="0">
+            <a:endParaRPr lang="de-DE" sz="3600" i="1" dirty="0">
               <a:effectLst>
                 <a:outerShdw blurRad="38100" dist="38100" dir="2700000" algn="tl">
                   <a:srgbClr val="000000">
@@ -6993,7 +7014,7 @@
           </a:p>
           <a:p>
             <a:r>
-              <a:rPr lang="de-DE" sz="2630" i="1" dirty="0" err="1" smtClean="0">
+              <a:rPr lang="de-DE" sz="3600" i="1" dirty="0" err="1" smtClean="0">
                 <a:effectLst>
                   <a:outerShdw blurRad="38100" dist="38100" dir="2700000" algn="tl">
                     <a:srgbClr val="000000">
@@ -7004,7 +7025,7 @@
               </a:rPr>
               <a:t>correction</a:t>
             </a:r>
-            <a:endParaRPr lang="de-DE" sz="2630" i="1" dirty="0">
+            <a:endParaRPr lang="de-DE" sz="3600" i="1" dirty="0">
               <a:effectLst>
                 <a:outerShdw blurRad="38100" dist="38100" dir="2700000" algn="tl">
                   <a:srgbClr val="000000">
@@ -7024,7 +7045,7 @@
         </p:nvSpPr>
         <p:spPr>
           <a:xfrm>
-            <a:off x="3938615" y="21290343"/>
+            <a:off x="3894800" y="18055018"/>
             <a:ext cx="2627854" cy="642040"/>
           </a:xfrm>
           <a:custGeom>
@@ -7096,7 +7117,7 @@
           <a:bodyPr rtlCol="0" anchor="ctr"/>
           <a:p>
             <a:pPr algn="ctr"/>
-            <a:endParaRPr lang="zh-CN" altLang="en-US"/>
+            <a:endParaRPr lang="zh-CN" altLang="en-US" sz="3600"/>
           </a:p>
         </p:txBody>
       </p:sp>
@@ -7108,7 +7129,7 @@
         </p:nvSpPr>
         <p:spPr>
           <a:xfrm>
-            <a:off x="3249082" y="30140413"/>
+            <a:off x="2991907" y="27051773"/>
             <a:ext cx="6190919" cy="1492877"/>
           </a:xfrm>
           <a:prstGeom prst="rect">
@@ -7157,7 +7178,7 @@
           <a:bodyPr rtlCol="0" anchor="ctr"/>
           <a:p>
             <a:pPr algn="ctr"/>
-            <a:endParaRPr lang="de-DE" sz="1970"/>
+            <a:endParaRPr lang="de-DE" sz="3600"/>
           </a:p>
         </p:txBody>
       </p:sp>
@@ -7169,8 +7190,8 @@
         </p:nvSpPr>
         <p:spPr>
           <a:xfrm>
-            <a:off x="3249081" y="30140413"/>
-            <a:ext cx="1298016" cy="1492877"/>
+            <a:off x="2992120" y="27051635"/>
+            <a:ext cx="1536065" cy="1492885"/>
           </a:xfrm>
           <a:prstGeom prst="rect">
             <a:avLst/>
@@ -7197,10 +7218,10 @@
           <a:p>
             <a:pPr algn="ctr"/>
             <a:r>
-              <a:rPr lang="de-DE" sz="3070" dirty="0" err="1" smtClean="0"/>
+              <a:rPr lang="de-DE" sz="3600" dirty="0" err="1" smtClean="0"/>
               <a:t>TriggerSCU</a:t>
             </a:r>
-            <a:endParaRPr lang="de-DE" sz="3070" dirty="0"/>
+            <a:endParaRPr lang="de-DE" sz="3600" dirty="0" err="1" smtClean="0"/>
           </a:p>
         </p:txBody>
       </p:sp>
@@ -7212,7 +7233,7 @@
         </p:nvSpPr>
         <p:spPr>
           <a:xfrm>
-            <a:off x="5630456" y="30124663"/>
+            <a:off x="5373281" y="27036023"/>
             <a:ext cx="1076584" cy="1495294"/>
           </a:xfrm>
           <a:prstGeom prst="rect">
@@ -7243,14 +7264,14 @@
           <a:p>
             <a:pPr algn="ctr"/>
             <a:r>
-              <a:rPr lang="de-DE" sz="3070" i="1" dirty="0" smtClean="0">
+              <a:rPr lang="de-DE" sz="3600" i="1" dirty="0" smtClean="0">
                 <a:solidFill>
                   <a:schemeClr val="tx1"/>
                 </a:solidFill>
               </a:rPr>
               <a:t>TD</a:t>
             </a:r>
-            <a:endParaRPr lang="de-DE" sz="3070" i="1" dirty="0">
+            <a:endParaRPr lang="de-DE" sz="3600" i="1" dirty="0" smtClean="0">
               <a:solidFill>
                 <a:schemeClr val="tx1"/>
               </a:solidFill>
@@ -7266,8 +7287,8 @@
         </p:nvSpPr>
         <p:spPr>
           <a:xfrm>
-            <a:off x="5191425" y="27377993"/>
-            <a:ext cx="1954006" cy="1204663"/>
+            <a:off x="4693920" y="24289385"/>
+            <a:ext cx="2193925" cy="1204595"/>
           </a:xfrm>
           <a:prstGeom prst="rect">
             <a:avLst/>
@@ -7297,7 +7318,7 @@
           <a:p>
             <a:pPr algn="ctr"/>
             <a:r>
-              <a:rPr lang="de-DE" sz="3070" i="1" dirty="0" err="1" smtClean="0">
+              <a:rPr lang="de-DE" sz="3600" i="1" dirty="0" err="1" smtClean="0">
                 <a:solidFill>
                   <a:schemeClr val="tx1"/>
                 </a:solidFill>
@@ -7305,7 +7326,7 @@
               <a:t>Extraction</a:t>
             </a:r>
             <a:r>
-              <a:rPr lang="de-DE" sz="3070" i="1" dirty="0" smtClean="0">
+              <a:rPr lang="de-DE" sz="3600" i="1" dirty="0" smtClean="0">
                 <a:solidFill>
                   <a:schemeClr val="tx1"/>
                 </a:solidFill>
@@ -7313,14 +7334,14 @@
               <a:t> </a:t>
             </a:r>
             <a:r>
-              <a:rPr lang="de-DE" sz="3070" i="1" dirty="0" err="1" smtClean="0">
+              <a:rPr lang="de-DE" sz="3600" i="1" dirty="0" err="1" smtClean="0">
                 <a:solidFill>
                   <a:schemeClr val="tx1"/>
                 </a:solidFill>
               </a:rPr>
               <a:t>kicker</a:t>
             </a:r>
-            <a:endParaRPr lang="de-DE" sz="3070" i="1" dirty="0">
+            <a:endParaRPr lang="de-DE" sz="3600" i="1" dirty="0">
               <a:solidFill>
                 <a:schemeClr val="tx1"/>
               </a:solidFill>
@@ -7331,15 +7352,13 @@
       <p:cxnSp>
         <p:nvCxnSpPr>
           <p:cNvPr id="127" name="Gerade Verbindung mit Pfeil 15"/>
-          <p:cNvCxnSpPr>
-            <a:endCxn id="126" idx="2"/>
-          </p:cNvCxnSpPr>
+          <p:cNvCxnSpPr/>
           <p:nvPr/>
         </p:nvCxnSpPr>
         <p:spPr>
           <a:xfrm flipH="1" flipV="1">
-            <a:off x="6168111" y="28582656"/>
-            <a:ext cx="14606" cy="676313"/>
+            <a:off x="5876925" y="25493980"/>
+            <a:ext cx="15875" cy="1090930"/>
           </a:xfrm>
           <a:prstGeom prst="straightConnector1">
             <a:avLst/>
@@ -7375,8 +7394,8 @@
         </p:nvSpPr>
         <p:spPr>
           <a:xfrm>
-            <a:off x="6731276" y="28678010"/>
-            <a:ext cx="1952152" cy="1077649"/>
+            <a:off x="6702425" y="25589230"/>
+            <a:ext cx="2418715" cy="1077595"/>
           </a:xfrm>
           <a:prstGeom prst="rect">
             <a:avLst/>
@@ -7406,7 +7425,7 @@
           <a:p>
             <a:pPr algn="ctr"/>
             <a:r>
-              <a:rPr lang="de-DE" sz="3070" i="1" dirty="0" smtClean="0">
+              <a:rPr lang="de-DE" sz="3600" i="1" dirty="0" smtClean="0">
                 <a:solidFill>
                   <a:schemeClr val="tx1"/>
                 </a:solidFill>
@@ -7414,14 +7433,14 @@
               <a:t>Emergency </a:t>
             </a:r>
             <a:r>
-              <a:rPr lang="de-DE" sz="3070" i="1" dirty="0" err="1" smtClean="0">
+              <a:rPr lang="de-DE" sz="3600" i="1" dirty="0" err="1" smtClean="0">
                 <a:solidFill>
                   <a:schemeClr val="tx1"/>
                 </a:solidFill>
               </a:rPr>
               <a:t>kicker</a:t>
             </a:r>
-            <a:endParaRPr lang="de-DE" sz="3070" i="1" dirty="0">
+            <a:endParaRPr lang="de-DE" sz="3600" i="1" dirty="0">
               <a:solidFill>
                 <a:schemeClr val="tx1"/>
               </a:solidFill>
@@ -7436,9 +7455,9 @@
           <p:nvPr/>
         </p:nvCxnSpPr>
         <p:spPr>
-          <a:xfrm>
-            <a:off x="6159855" y="29368831"/>
-            <a:ext cx="571532" cy="635"/>
+          <a:xfrm flipV="1">
+            <a:off x="5960110" y="26267410"/>
+            <a:ext cx="711835" cy="12700"/>
           </a:xfrm>
           <a:prstGeom prst="straightConnector1">
             <a:avLst/>
@@ -7474,7 +7493,7 @@
         </p:nvCxnSpPr>
         <p:spPr>
           <a:xfrm flipH="1">
-            <a:off x="6156045" y="29432334"/>
+            <a:off x="5898870" y="26343694"/>
             <a:ext cx="3810" cy="692189"/>
           </a:xfrm>
           <a:prstGeom prst="line">
@@ -7505,8 +7524,8 @@
         </p:nvSpPr>
         <p:spPr>
           <a:xfrm>
-            <a:off x="6154775" y="28874138"/>
-            <a:ext cx="551846" cy="495300"/>
+            <a:off x="5941060" y="25525095"/>
+            <a:ext cx="761365" cy="645160"/>
           </a:xfrm>
           <a:prstGeom prst="rect">
             <a:avLst/>
@@ -7519,7 +7538,7 @@
           </a:bodyPr>
           <a:p>
             <a:r>
-              <a:rPr lang="en-US" altLang="de-DE" sz="2630" i="1" dirty="0" err="1" smtClean="0">
+              <a:rPr lang="en-US" altLang="de-DE" sz="3600" i="1" dirty="0" err="1" smtClean="0">
                 <a:effectLst>
                   <a:outerShdw blurRad="38100" dist="38100" dir="2700000" algn="tl">
                     <a:srgbClr val="000000">
@@ -7530,7 +7549,7 @@
               </a:rPr>
               <a:t>or</a:t>
             </a:r>
-            <a:endParaRPr lang="en-US" altLang="de-DE" sz="2630" i="1" dirty="0">
+            <a:endParaRPr lang="en-US" altLang="de-DE" sz="3600" i="1" dirty="0" err="1" smtClean="0">
               <a:effectLst>
                 <a:outerShdw blurRad="38100" dist="38100" dir="2700000" algn="tl">
                   <a:srgbClr val="000000">
@@ -7550,7 +7569,7 @@
         </p:nvSpPr>
         <p:spPr>
           <a:xfrm>
-            <a:off x="3938499" y="29869874"/>
+            <a:off x="3681324" y="26781234"/>
             <a:ext cx="2089268" cy="527715"/>
           </a:xfrm>
           <a:custGeom>
@@ -7622,7 +7641,7 @@
           <a:bodyPr rtlCol="0" anchor="ctr"/>
           <a:p>
             <a:pPr algn="ctr"/>
-            <a:endParaRPr lang="zh-CN" altLang="en-US"/>
+            <a:endParaRPr lang="zh-CN" altLang="en-US" sz="3600"/>
           </a:p>
         </p:txBody>
       </p:sp>
@@ -7634,8 +7653,8 @@
         </p:nvSpPr>
         <p:spPr>
           <a:xfrm>
-            <a:off x="3035120" y="29228604"/>
-            <a:ext cx="4435093" cy="895985"/>
+            <a:off x="1622425" y="25857835"/>
+            <a:ext cx="4147185" cy="1193800"/>
           </a:xfrm>
           <a:prstGeom prst="rect">
             <a:avLst/>
@@ -7648,7 +7667,7 @@
           </a:bodyPr>
           <a:p>
             <a:r>
-              <a:rPr lang="en-US" sz="2630" i="1" dirty="0" err="1">
+              <a:rPr lang="en-US" sz="3600" i="1" dirty="0" err="1">
                 <a:effectLst>
                   <a:outerShdw blurRad="38100" dist="38100" dir="2700000" algn="tl">
                     <a:srgbClr val="000000">
@@ -7659,7 +7678,7 @@
               </a:rPr>
               <a:t>       Synchronizaition </a:t>
             </a:r>
-            <a:endParaRPr lang="en-US" sz="2630" i="1" dirty="0" err="1">
+            <a:endParaRPr lang="en-US" sz="3600" i="1" dirty="0" err="1">
               <a:effectLst>
                 <a:outerShdw blurRad="38100" dist="38100" dir="2700000" algn="tl">
                   <a:srgbClr val="000000">
@@ -7671,7 +7690,7 @@
           </a:p>
           <a:p>
             <a:r>
-              <a:rPr lang="en-US" sz="2630" i="1" dirty="0" err="1">
+              <a:rPr lang="en-US" sz="3600" i="1" dirty="0" err="1">
                 <a:effectLst>
                   <a:outerShdw blurRad="38100" dist="38100" dir="2700000" algn="tl">
                     <a:srgbClr val="000000">
@@ -7682,7 +7701,7 @@
               </a:rPr>
               <a:t>window</a:t>
             </a:r>
-            <a:endParaRPr lang="en-US" sz="2630" i="1" baseline="-25000" dirty="0">
+            <a:endParaRPr lang="en-US" sz="3600" i="1" baseline="-25000" dirty="0">
               <a:effectLst>
                 <a:outerShdw blurRad="38100" dist="38100" dir="2700000" algn="tl">
                   <a:srgbClr val="000000">
@@ -7702,7 +7721,7 @@
         </p:nvSpPr>
         <p:spPr>
           <a:xfrm>
-            <a:off x="2959385" y="32863369"/>
+            <a:off x="2702210" y="29774729"/>
             <a:ext cx="1074754" cy="533269"/>
           </a:xfrm>
           <a:prstGeom prst="rect">
@@ -7733,14 +7752,14 @@
           <a:p>
             <a:pPr algn="ctr"/>
             <a:r>
-              <a:rPr lang="de-DE" sz="3070" i="1" dirty="0" smtClean="0">
+              <a:rPr lang="de-DE" sz="3600" i="1" dirty="0" smtClean="0">
                 <a:solidFill>
                   <a:schemeClr val="tx1"/>
                 </a:solidFill>
               </a:rPr>
               <a:t>SR</a:t>
             </a:r>
-            <a:endParaRPr lang="de-DE" sz="3070" i="1" dirty="0">
+            <a:endParaRPr lang="de-DE" sz="3600" i="1" dirty="0" smtClean="0">
               <a:solidFill>
                 <a:schemeClr val="tx1"/>
               </a:solidFill>
@@ -7756,7 +7775,7 @@
         </p:nvSpPr>
         <p:spPr>
           <a:xfrm>
-            <a:off x="4033755" y="31395866"/>
+            <a:off x="3776580" y="28307226"/>
             <a:ext cx="2234057" cy="1714597"/>
           </a:xfrm>
           <a:custGeom>
@@ -7829,7 +7848,7 @@
           <a:bodyPr rtlCol="0" anchor="ctr"/>
           <a:p>
             <a:pPr algn="ctr"/>
-            <a:endParaRPr lang="zh-CN" altLang="en-US"/>
+            <a:endParaRPr lang="zh-CN" altLang="en-US" sz="3600"/>
           </a:p>
         </p:txBody>
       </p:sp>
@@ -7841,8 +7860,8 @@
         </p:nvSpPr>
         <p:spPr>
           <a:xfrm rot="20400000">
-            <a:off x="4158499" y="32567623"/>
-            <a:ext cx="4435093" cy="895985"/>
+            <a:off x="3901324" y="29364683"/>
+            <a:ext cx="4435093" cy="1193800"/>
           </a:xfrm>
           <a:prstGeom prst="rect">
             <a:avLst/>
@@ -7855,7 +7874,7 @@
           </a:bodyPr>
           <a:p>
             <a:r>
-              <a:rPr lang="en-US" sz="2630" i="1" dirty="0" err="1">
+              <a:rPr lang="en-US" sz="3600" i="1" dirty="0" err="1">
                 <a:effectLst>
                   <a:outerShdw blurRad="38100" dist="38100" dir="2700000" algn="tl">
                     <a:srgbClr val="000000">
@@ -7866,7 +7885,7 @@
               </a:rPr>
               <a:t>Reproduced </a:t>
             </a:r>
-            <a:endParaRPr lang="en-US" sz="2630" i="1" dirty="0" err="1">
+            <a:endParaRPr lang="en-US" sz="3600" i="1" dirty="0" err="1">
               <a:effectLst>
                 <a:outerShdw blurRad="38100" dist="38100" dir="2700000" algn="tl">
                   <a:srgbClr val="000000">
@@ -7878,7 +7897,7 @@
           </a:p>
           <a:p>
             <a:r>
-              <a:rPr lang="en-US" sz="2630" i="1" dirty="0" err="1">
+              <a:rPr lang="en-US" sz="3600" i="1" dirty="0" err="1">
                 <a:effectLst>
                   <a:outerShdw blurRad="38100" dist="38100" dir="2700000" algn="tl">
                     <a:srgbClr val="000000">
@@ -7889,7 +7908,7 @@
               </a:rPr>
               <a:t>signal</a:t>
             </a:r>
-            <a:endParaRPr lang="en-US" sz="2630" i="1" baseline="-25000" dirty="0">
+            <a:endParaRPr lang="en-US" sz="3600" i="1" baseline="-25000" dirty="0">
               <a:effectLst>
                 <a:outerShdw blurRad="38100" dist="38100" dir="2700000" algn="tl">
                   <a:srgbClr val="000000">
@@ -7909,7 +7928,7 @@
         </p:nvSpPr>
         <p:spPr>
           <a:xfrm flipV="1">
-            <a:off x="3829273" y="31395866"/>
+            <a:off x="3572098" y="28307226"/>
             <a:ext cx="2089268" cy="557562"/>
           </a:xfrm>
           <a:custGeom>
@@ -7981,7 +8000,7 @@
           <a:bodyPr rtlCol="0" anchor="ctr"/>
           <a:p>
             <a:pPr algn="ctr"/>
-            <a:endParaRPr lang="zh-CN" altLang="en-US"/>
+            <a:endParaRPr lang="zh-CN" altLang="en-US" sz="3600"/>
           </a:p>
         </p:txBody>
       </p:sp>
@@ -7993,8 +8012,8 @@
         </p:nvSpPr>
         <p:spPr>
           <a:xfrm>
-            <a:off x="2810675" y="31620034"/>
-            <a:ext cx="4873266" cy="895985"/>
+            <a:off x="485140" y="28756610"/>
+            <a:ext cx="6402705" cy="645160"/>
           </a:xfrm>
           <a:prstGeom prst="rect">
             <a:avLst/>
@@ -8007,7 +8026,7 @@
           </a:bodyPr>
           <a:p>
             <a:r>
-              <a:rPr lang="en-US" sz="2630" i="1" dirty="0" err="1">
+              <a:rPr lang="en-US" sz="3600" i="1" dirty="0" err="1">
                 <a:effectLst>
                   <a:outerShdw blurRad="38100" dist="38100" dir="2700000" algn="tl">
                     <a:srgbClr val="000000">
@@ -8016,9 +8035,9 @@
                   </a:outerShdw>
                 </a:effectLst>
               </a:rPr>
-              <a:t>Kicker </a:t>
-            </a:r>
-            <a:endParaRPr lang="en-US" sz="2630" i="1" dirty="0" err="1">
+              <a:t>Kicker delay compensation</a:t>
+            </a:r>
+            <a:endParaRPr lang="en-US" sz="3600" i="1" baseline="-25000" dirty="0">
               <a:effectLst>
                 <a:outerShdw blurRad="38100" dist="38100" dir="2700000" algn="tl">
                   <a:srgbClr val="000000">
@@ -8028,83 +8047,6 @@
               </a:effectLst>
             </a:endParaRPr>
           </a:p>
-          <a:p>
-            <a:r>
-              <a:rPr lang="en-US" sz="2630" i="1" dirty="0" err="1">
-                <a:effectLst>
-                  <a:outerShdw blurRad="38100" dist="38100" dir="2700000" algn="tl">
-                    <a:srgbClr val="000000">
-                      <a:alpha val="43137"/>
-                    </a:srgbClr>
-                  </a:outerShdw>
-                </a:effectLst>
-              </a:rPr>
-              <a:t>delay compensation</a:t>
-            </a:r>
-            <a:endParaRPr lang="en-US" sz="2630" i="1" baseline="-25000" dirty="0">
-              <a:effectLst>
-                <a:outerShdw blurRad="38100" dist="38100" dir="2700000" algn="tl">
-                  <a:srgbClr val="000000">
-                    <a:alpha val="43137"/>
-                  </a:srgbClr>
-                </a:outerShdw>
-              </a:effectLst>
-            </a:endParaRPr>
-          </a:p>
-        </p:txBody>
-      </p:sp>
-      <p:sp>
-        <p:nvSpPr>
-          <p:cNvPr id="146" name="Rechteck 48"/>
-          <p:cNvSpPr/>
-          <p:nvPr/>
-        </p:nvSpPr>
-        <p:spPr>
-          <a:xfrm>
-            <a:off x="9023214" y="32516024"/>
-            <a:ext cx="1074754" cy="533269"/>
-          </a:xfrm>
-          <a:prstGeom prst="rect">
-            <a:avLst/>
-          </a:prstGeom>
-          <a:solidFill>
-            <a:schemeClr val="bg1"/>
-          </a:solidFill>
-        </p:spPr>
-        <p:style>
-          <a:lnRef idx="2">
-            <a:schemeClr val="accent1">
-              <a:shade val="50000"/>
-            </a:schemeClr>
-          </a:lnRef>
-          <a:fillRef idx="1">
-            <a:schemeClr val="accent1"/>
-          </a:fillRef>
-          <a:effectRef idx="0">
-            <a:schemeClr val="accent1"/>
-          </a:effectRef>
-          <a:fontRef idx="minor">
-            <a:schemeClr val="lt1"/>
-          </a:fontRef>
-        </p:style>
-        <p:txBody>
-          <a:bodyPr rtlCol="0" anchor="ctr"/>
-          <a:p>
-            <a:pPr algn="ctr"/>
-            <a:r>
-              <a:rPr lang="en-US" altLang="de-DE" sz="3070" i="1" dirty="0">
-                <a:solidFill>
-                  <a:schemeClr val="tx1"/>
-                </a:solidFill>
-              </a:rPr>
-              <a:t>MPS</a:t>
-            </a:r>
-            <a:endParaRPr lang="en-US" altLang="de-DE" sz="3070" i="1" dirty="0">
-              <a:solidFill>
-                <a:schemeClr val="tx1"/>
-              </a:solidFill>
-            </a:endParaRPr>
-          </a:p>
         </p:txBody>
       </p:sp>
       <p:sp>
@@ -8115,8 +8057,8 @@
         </p:nvSpPr>
         <p:spPr>
           <a:xfrm rot="600000">
-            <a:off x="6391275" y="32774255"/>
-            <a:ext cx="2941320" cy="495300"/>
+            <a:off x="6134100" y="29685615"/>
+            <a:ext cx="2941320" cy="1193800"/>
           </a:xfrm>
           <a:prstGeom prst="rect">
             <a:avLst/>
@@ -8129,7 +8071,7 @@
           </a:bodyPr>
           <a:p>
             <a:r>
-              <a:rPr lang="en-US" sz="2630" i="1" dirty="0" err="1">
+              <a:rPr lang="en-US" sz="3600" i="1" dirty="0" err="1">
                 <a:effectLst>
                   <a:outerShdw blurRad="38100" dist="38100" dir="2700000" algn="tl">
                     <a:srgbClr val="000000">
@@ -8140,7 +8082,7 @@
               </a:rPr>
               <a:t>Emergency kick</a:t>
             </a:r>
-            <a:endParaRPr lang="en-US" sz="2630" i="1" baseline="-25000" dirty="0">
+            <a:endParaRPr lang="en-US" sz="3600" i="1" baseline="-25000" dirty="0" err="1">
               <a:effectLst>
                 <a:outerShdw blurRad="38100" dist="38100" dir="2700000" algn="tl">
                   <a:srgbClr val="000000">
@@ -8160,7 +8102,7 @@
         </p:nvSpPr>
         <p:spPr>
           <a:xfrm>
-            <a:off x="12331770" y="30140400"/>
+            <a:off x="11331645" y="27051760"/>
             <a:ext cx="5237142" cy="1492970"/>
           </a:xfrm>
           <a:prstGeom prst="rect">
@@ -8209,7 +8151,7 @@
           <a:bodyPr rtlCol="0" anchor="ctr"/>
           <a:p>
             <a:pPr algn="ctr"/>
-            <a:endParaRPr lang="de-DE" sz="1970"/>
+            <a:endParaRPr lang="de-DE" sz="3600"/>
           </a:p>
         </p:txBody>
       </p:sp>
@@ -8221,7 +8163,7 @@
         </p:nvSpPr>
         <p:spPr>
           <a:xfrm>
-            <a:off x="12332001" y="30140413"/>
+            <a:off x="11331876" y="27051773"/>
             <a:ext cx="1298016" cy="1492877"/>
           </a:xfrm>
           <a:prstGeom prst="rect">
@@ -8249,10 +8191,10 @@
           <a:p>
             <a:pPr algn="ctr"/>
             <a:r>
-              <a:rPr lang="de-DE" sz="3070" dirty="0" err="1" smtClean="0"/>
+              <a:rPr lang="de-DE" sz="3600" dirty="0" err="1" smtClean="0"/>
               <a:t>TriggerSCU</a:t>
             </a:r>
-            <a:endParaRPr lang="de-DE" sz="3070" dirty="0"/>
+            <a:endParaRPr lang="de-DE" sz="3600" dirty="0" err="1" smtClean="0"/>
           </a:p>
         </p:txBody>
       </p:sp>
@@ -8264,8 +8206,8 @@
         </p:nvSpPr>
         <p:spPr>
           <a:xfrm>
-            <a:off x="14713376" y="30124663"/>
-            <a:ext cx="1076584" cy="1495294"/>
+            <a:off x="13400405" y="27035760"/>
+            <a:ext cx="1241425" cy="1495425"/>
           </a:xfrm>
           <a:prstGeom prst="rect">
             <a:avLst/>
@@ -8295,14 +8237,14 @@
           <a:p>
             <a:pPr algn="ctr"/>
             <a:r>
-              <a:rPr lang="de-DE" sz="3070" i="1" dirty="0" smtClean="0">
+              <a:rPr lang="de-DE" sz="3600" i="1" dirty="0" smtClean="0">
                 <a:solidFill>
                   <a:schemeClr val="tx1"/>
                 </a:solidFill>
               </a:rPr>
               <a:t>TD</a:t>
             </a:r>
-            <a:endParaRPr lang="de-DE" sz="3070" i="1" dirty="0">
+            <a:endParaRPr lang="de-DE" sz="3600" i="1" dirty="0" smtClean="0">
               <a:solidFill>
                 <a:schemeClr val="tx1"/>
               </a:solidFill>
@@ -8318,7 +8260,7 @@
         </p:nvSpPr>
         <p:spPr>
           <a:xfrm>
-            <a:off x="14274345" y="27377993"/>
+            <a:off x="13274220" y="24289353"/>
             <a:ext cx="1954006" cy="1204663"/>
           </a:xfrm>
           <a:prstGeom prst="rect">
@@ -8349,14 +8291,14 @@
           <a:p>
             <a:pPr algn="ctr"/>
             <a:r>
-              <a:rPr lang="en-US" altLang="de-DE" sz="3070" i="1" dirty="0" err="1" smtClean="0">
+              <a:rPr lang="en-US" altLang="de-DE" sz="3600" i="1" dirty="0" err="1" smtClean="0">
                 <a:solidFill>
                   <a:schemeClr val="tx1"/>
                 </a:solidFill>
               </a:rPr>
               <a:t>Injection</a:t>
             </a:r>
-            <a:endParaRPr lang="en-US" altLang="de-DE" sz="3070" i="1" dirty="0" err="1" smtClean="0">
+            <a:endParaRPr lang="en-US" altLang="de-DE" sz="3600" i="1" dirty="0" err="1" smtClean="0">
               <a:solidFill>
                 <a:schemeClr val="tx1"/>
               </a:solidFill>
@@ -8365,14 +8307,14 @@
           <a:p>
             <a:pPr algn="ctr"/>
             <a:r>
-              <a:rPr lang="de-DE" sz="3070" i="1" dirty="0" err="1" smtClean="0">
+              <a:rPr lang="de-DE" sz="3600" i="1" dirty="0" err="1" smtClean="0">
                 <a:solidFill>
                   <a:schemeClr val="tx1"/>
                 </a:solidFill>
               </a:rPr>
               <a:t>kicker</a:t>
             </a:r>
-            <a:endParaRPr lang="de-DE" sz="3070" i="1" dirty="0">
+            <a:endParaRPr lang="de-DE" sz="3600" i="1" dirty="0">
               <a:solidFill>
                 <a:schemeClr val="tx1"/>
               </a:solidFill>
@@ -8390,7 +8332,7 @@
         </p:nvCxnSpPr>
         <p:spPr>
           <a:xfrm flipH="1" flipV="1">
-            <a:off x="15251666" y="28582656"/>
+            <a:off x="14222966" y="25494016"/>
             <a:ext cx="14606" cy="676313"/>
           </a:xfrm>
           <a:prstGeom prst="straightConnector1">
@@ -8427,8 +8369,8 @@
         </p:nvSpPr>
         <p:spPr>
           <a:xfrm>
-            <a:off x="15814196" y="28678010"/>
-            <a:ext cx="1952152" cy="1077649"/>
+            <a:off x="14813915" y="25589230"/>
+            <a:ext cx="2399030" cy="1077595"/>
           </a:xfrm>
           <a:prstGeom prst="rect">
             <a:avLst/>
@@ -8458,7 +8400,7 @@
           <a:p>
             <a:pPr algn="ctr"/>
             <a:r>
-              <a:rPr lang="de-DE" sz="3070" i="1" dirty="0" smtClean="0">
+              <a:rPr lang="de-DE" sz="3600" i="1" dirty="0" smtClean="0">
                 <a:solidFill>
                   <a:schemeClr val="tx1"/>
                 </a:solidFill>
@@ -8466,14 +8408,14 @@
               <a:t>Emergency </a:t>
             </a:r>
             <a:r>
-              <a:rPr lang="de-DE" sz="3070" i="1" dirty="0" err="1" smtClean="0">
+              <a:rPr lang="de-DE" sz="3600" i="1" dirty="0" err="1" smtClean="0">
                 <a:solidFill>
                   <a:schemeClr val="tx1"/>
                 </a:solidFill>
               </a:rPr>
               <a:t>kicker</a:t>
             </a:r>
-            <a:endParaRPr lang="de-DE" sz="3070" i="1" dirty="0">
+            <a:endParaRPr lang="de-DE" sz="3600" i="1" dirty="0">
               <a:solidFill>
                 <a:schemeClr val="tx1"/>
               </a:solidFill>
@@ -8489,7 +8431,7 @@
         </p:nvCxnSpPr>
         <p:spPr>
           <a:xfrm>
-            <a:off x="15242775" y="29368831"/>
+            <a:off x="14242650" y="26280191"/>
             <a:ext cx="571532" cy="635"/>
           </a:xfrm>
           <a:prstGeom prst="straightConnector1">
@@ -8526,7 +8468,7 @@
         </p:nvCxnSpPr>
         <p:spPr>
           <a:xfrm flipH="1">
-            <a:off x="15238965" y="29432334"/>
+            <a:off x="14238840" y="26343694"/>
             <a:ext cx="3810" cy="692189"/>
           </a:xfrm>
           <a:prstGeom prst="line">
@@ -8557,8 +8499,8 @@
         </p:nvSpPr>
         <p:spPr>
           <a:xfrm>
-            <a:off x="15237695" y="28874138"/>
-            <a:ext cx="551846" cy="495300"/>
+            <a:off x="14208760" y="25642570"/>
+            <a:ext cx="834390" cy="645160"/>
           </a:xfrm>
           <a:prstGeom prst="rect">
             <a:avLst/>
@@ -8571,7 +8513,7 @@
           </a:bodyPr>
           <a:p>
             <a:r>
-              <a:rPr lang="en-US" altLang="de-DE" sz="2630" i="1" dirty="0" err="1" smtClean="0">
+              <a:rPr lang="en-US" altLang="de-DE" sz="3600" i="1" dirty="0" err="1" smtClean="0">
                 <a:effectLst>
                   <a:outerShdw blurRad="38100" dist="38100" dir="2700000" algn="tl">
                     <a:srgbClr val="000000">
@@ -8582,7 +8524,7 @@
               </a:rPr>
               <a:t>or</a:t>
             </a:r>
-            <a:endParaRPr lang="en-US" altLang="de-DE" sz="2630" i="1" dirty="0">
+            <a:endParaRPr lang="en-US" altLang="de-DE" sz="3600" i="1" dirty="0" err="1" smtClean="0">
               <a:effectLst>
                 <a:outerShdw blurRad="38100" dist="38100" dir="2700000" algn="tl">
                   <a:srgbClr val="000000">
@@ -8602,7 +8544,7 @@
         </p:nvSpPr>
         <p:spPr>
           <a:xfrm>
-            <a:off x="13021419" y="29869874"/>
+            <a:off x="12021294" y="26781234"/>
             <a:ext cx="2089268" cy="527715"/>
           </a:xfrm>
           <a:custGeom>
@@ -8674,7 +8616,7 @@
           <a:bodyPr rtlCol="0" anchor="ctr"/>
           <a:p>
             <a:pPr algn="ctr"/>
-            <a:endParaRPr lang="zh-CN" altLang="en-US"/>
+            <a:endParaRPr lang="zh-CN" altLang="en-US" sz="3600"/>
           </a:p>
         </p:txBody>
       </p:sp>
@@ -8686,8 +8628,8 @@
         </p:nvSpPr>
         <p:spPr>
           <a:xfrm>
-            <a:off x="12118040" y="29228604"/>
-            <a:ext cx="4435093" cy="895985"/>
+            <a:off x="9915225" y="25858024"/>
+            <a:ext cx="4435093" cy="1193800"/>
           </a:xfrm>
           <a:prstGeom prst="rect">
             <a:avLst/>
@@ -8700,7 +8642,7 @@
           </a:bodyPr>
           <a:p>
             <a:r>
-              <a:rPr lang="en-US" sz="2630" i="1" dirty="0" err="1">
+              <a:rPr lang="en-US" sz="3600" i="1" dirty="0" err="1">
                 <a:effectLst>
                   <a:outerShdw blurRad="38100" dist="38100" dir="2700000" algn="tl">
                     <a:srgbClr val="000000">
@@ -8711,7 +8653,7 @@
               </a:rPr>
               <a:t>       Synchronizaition </a:t>
             </a:r>
-            <a:endParaRPr lang="en-US" sz="2630" i="1" dirty="0" err="1">
+            <a:endParaRPr lang="en-US" sz="3600" i="1" dirty="0" err="1">
               <a:effectLst>
                 <a:outerShdw blurRad="38100" dist="38100" dir="2700000" algn="tl">
                   <a:srgbClr val="000000">
@@ -8723,7 +8665,7 @@
           </a:p>
           <a:p>
             <a:r>
-              <a:rPr lang="en-US" sz="2630" i="1" dirty="0" err="1">
+              <a:rPr lang="en-US" sz="3600" i="1" dirty="0" err="1">
                 <a:effectLst>
                   <a:outerShdw blurRad="38100" dist="38100" dir="2700000" algn="tl">
                     <a:srgbClr val="000000">
@@ -8734,7 +8676,7 @@
               </a:rPr>
               <a:t>window</a:t>
             </a:r>
-            <a:endParaRPr lang="en-US" sz="2630" i="1" baseline="-25000" dirty="0">
+            <a:endParaRPr lang="en-US" sz="3600" i="1" baseline="-25000" dirty="0">
               <a:effectLst>
                 <a:outerShdw blurRad="38100" dist="38100" dir="2700000" algn="tl">
                   <a:srgbClr val="000000">
@@ -8754,7 +8696,7 @@
         </p:nvSpPr>
         <p:spPr>
           <a:xfrm>
-            <a:off x="12042305" y="32863369"/>
+            <a:off x="11042180" y="29774729"/>
             <a:ext cx="1074754" cy="533269"/>
           </a:xfrm>
           <a:prstGeom prst="rect">
@@ -8785,14 +8727,14 @@
           <a:p>
             <a:pPr algn="ctr"/>
             <a:r>
-              <a:rPr lang="de-DE" sz="3070" i="1" dirty="0" smtClean="0">
+              <a:rPr lang="de-DE" sz="3600" i="1" dirty="0" smtClean="0">
                 <a:solidFill>
                   <a:schemeClr val="tx1"/>
                 </a:solidFill>
               </a:rPr>
               <a:t>SR</a:t>
             </a:r>
-            <a:endParaRPr lang="de-DE" sz="3070" i="1" dirty="0">
+            <a:endParaRPr lang="de-DE" sz="3600" i="1" dirty="0" smtClean="0">
               <a:solidFill>
                 <a:schemeClr val="tx1"/>
               </a:solidFill>
@@ -8808,7 +8750,7 @@
         </p:nvSpPr>
         <p:spPr>
           <a:xfrm>
-            <a:off x="13116675" y="31395866"/>
+            <a:off x="12116550" y="28307226"/>
             <a:ext cx="2234057" cy="1714597"/>
           </a:xfrm>
           <a:custGeom>
@@ -8881,7 +8823,7 @@
           <a:bodyPr rtlCol="0" anchor="ctr"/>
           <a:p>
             <a:pPr algn="ctr"/>
-            <a:endParaRPr lang="zh-CN" altLang="en-US"/>
+            <a:endParaRPr lang="zh-CN" altLang="en-US" sz="3600"/>
           </a:p>
         </p:txBody>
       </p:sp>
@@ -8893,8 +8835,8 @@
         </p:nvSpPr>
         <p:spPr>
           <a:xfrm rot="20400000">
-            <a:off x="13241419" y="32567623"/>
-            <a:ext cx="4435093" cy="895985"/>
+            <a:off x="12155569" y="29421833"/>
+            <a:ext cx="4435093" cy="1193800"/>
           </a:xfrm>
           <a:prstGeom prst="rect">
             <a:avLst/>
@@ -8907,7 +8849,7 @@
           </a:bodyPr>
           <a:p>
             <a:r>
-              <a:rPr lang="en-US" sz="2630" i="1" dirty="0" err="1">
+              <a:rPr lang="en-US" sz="3600" i="1" dirty="0" err="1">
                 <a:effectLst>
                   <a:outerShdw blurRad="38100" dist="38100" dir="2700000" algn="tl">
                     <a:srgbClr val="000000">
@@ -8918,7 +8860,7 @@
               </a:rPr>
               <a:t>Reproduced </a:t>
             </a:r>
-            <a:endParaRPr lang="en-US" sz="2630" i="1" dirty="0" err="1">
+            <a:endParaRPr lang="en-US" sz="3600" i="1" dirty="0" err="1">
               <a:effectLst>
                 <a:outerShdw blurRad="38100" dist="38100" dir="2700000" algn="tl">
                   <a:srgbClr val="000000">
@@ -8930,7 +8872,7 @@
           </a:p>
           <a:p>
             <a:r>
-              <a:rPr lang="en-US" sz="2630" i="1" dirty="0" err="1">
+              <a:rPr lang="en-US" sz="3600" i="1" dirty="0" err="1">
                 <a:effectLst>
                   <a:outerShdw blurRad="38100" dist="38100" dir="2700000" algn="tl">
                     <a:srgbClr val="000000">
@@ -8941,7 +8883,7 @@
               </a:rPr>
               <a:t>signal</a:t>
             </a:r>
-            <a:endParaRPr lang="en-US" sz="2630" i="1" baseline="-25000" dirty="0">
+            <a:endParaRPr lang="en-US" sz="3600" i="1" baseline="-25000" dirty="0">
               <a:effectLst>
                 <a:outerShdw blurRad="38100" dist="38100" dir="2700000" algn="tl">
                   <a:srgbClr val="000000">
@@ -8961,7 +8903,7 @@
         </p:nvSpPr>
         <p:spPr>
           <a:xfrm flipV="1">
-            <a:off x="12912193" y="31395866"/>
+            <a:off x="11912068" y="28307226"/>
             <a:ext cx="2089268" cy="557562"/>
           </a:xfrm>
           <a:custGeom>
@@ -9033,7 +8975,7 @@
           <a:bodyPr rtlCol="0" anchor="ctr"/>
           <a:p>
             <a:pPr algn="ctr"/>
-            <a:endParaRPr lang="zh-CN" altLang="en-US"/>
+            <a:endParaRPr lang="zh-CN" altLang="en-US" sz="3600"/>
           </a:p>
         </p:txBody>
       </p:sp>
@@ -9045,8 +8987,8 @@
         </p:nvSpPr>
         <p:spPr>
           <a:xfrm>
-            <a:off x="11893595" y="31620034"/>
-            <a:ext cx="4873266" cy="895985"/>
+            <a:off x="10297160" y="28531185"/>
+            <a:ext cx="5469255" cy="1193800"/>
           </a:xfrm>
           <a:prstGeom prst="rect">
             <a:avLst/>
@@ -9059,7 +9001,7 @@
           </a:bodyPr>
           <a:p>
             <a:r>
-              <a:rPr lang="en-US" sz="2630" i="1" dirty="0" err="1">
+              <a:rPr lang="en-US" sz="3600" i="1" dirty="0" err="1">
                 <a:effectLst>
                   <a:outerShdw blurRad="38100" dist="38100" dir="2700000" algn="tl">
                     <a:srgbClr val="000000">
@@ -9068,9 +9010,9 @@
                   </a:outerShdw>
                 </a:effectLst>
               </a:rPr>
-              <a:t>Kicker </a:t>
-            </a:r>
-            <a:endParaRPr lang="en-US" sz="2630" i="1" dirty="0" err="1">
+              <a:t>Kicker delay </a:t>
+            </a:r>
+            <a:endParaRPr lang="en-US" sz="3600" i="1" dirty="0" err="1">
               <a:effectLst>
                 <a:outerShdw blurRad="38100" dist="38100" dir="2700000" algn="tl">
                   <a:srgbClr val="000000">
@@ -9082,7 +9024,7 @@
           </a:p>
           <a:p>
             <a:r>
-              <a:rPr lang="en-US" sz="2630" i="1" dirty="0" err="1">
+              <a:rPr lang="en-US" sz="3600" i="1" dirty="0" err="1">
                 <a:effectLst>
                   <a:outerShdw blurRad="38100" dist="38100" dir="2700000" algn="tl">
                     <a:srgbClr val="000000">
@@ -9091,9 +9033,9 @@
                   </a:outerShdw>
                 </a:effectLst>
               </a:rPr>
-              <a:t>delay compensation</a:t>
-            </a:r>
-            <a:endParaRPr lang="en-US" sz="2630" i="1" baseline="-25000" dirty="0">
+              <a:t>compensation</a:t>
+            </a:r>
+            <a:endParaRPr lang="en-US" sz="3600" i="1" baseline="-25000" dirty="0">
               <a:effectLst>
                 <a:outerShdw blurRad="38100" dist="38100" dir="2700000" algn="tl">
                   <a:srgbClr val="000000">
@@ -9113,7 +9055,7 @@
         </p:nvSpPr>
         <p:spPr>
           <a:xfrm>
-            <a:off x="11761528" y="38805172"/>
+            <a:off x="11183678" y="37477387"/>
             <a:ext cx="5237143" cy="1492969"/>
           </a:xfrm>
           <a:prstGeom prst="rect">
@@ -9162,7 +9104,7 @@
           <a:bodyPr rtlCol="0" anchor="ctr"/>
           <a:p>
             <a:pPr algn="ctr"/>
-            <a:endParaRPr lang="de-DE" sz="1970"/>
+            <a:endParaRPr lang="de-DE" sz="3600"/>
           </a:p>
         </p:txBody>
       </p:sp>
@@ -9174,8 +9116,8 @@
         </p:nvSpPr>
         <p:spPr>
           <a:xfrm>
-            <a:off x="11761759" y="38805185"/>
-            <a:ext cx="1298016" cy="1492876"/>
+            <a:off x="11183620" y="37477700"/>
+            <a:ext cx="1868170" cy="1492885"/>
           </a:xfrm>
           <a:prstGeom prst="rect">
             <a:avLst/>
@@ -9202,10 +9144,18 @@
           <a:p>
             <a:pPr algn="ctr"/>
             <a:r>
-              <a:rPr lang="de-DE" sz="3070" dirty="0" err="1" smtClean="0"/>
-              <a:t>TriggerSCU</a:t>
-            </a:r>
-            <a:endParaRPr lang="de-DE" sz="3070" dirty="0"/>
+              <a:rPr lang="de-DE" sz="3600" dirty="0" err="1" smtClean="0"/>
+              <a:t>Trigger</a:t>
+            </a:r>
+            <a:endParaRPr lang="de-DE" sz="3600" dirty="0" err="1" smtClean="0"/>
+          </a:p>
+          <a:p>
+            <a:pPr algn="ctr"/>
+            <a:r>
+              <a:rPr lang="de-DE" sz="3600" dirty="0" err="1" smtClean="0"/>
+              <a:t>SCU</a:t>
+            </a:r>
+            <a:endParaRPr lang="de-DE" sz="3600" dirty="0" err="1" smtClean="0"/>
           </a:p>
         </p:txBody>
       </p:sp>
@@ -9217,7 +9167,7 @@
         </p:nvSpPr>
         <p:spPr>
           <a:xfrm>
-            <a:off x="14143134" y="38808486"/>
+            <a:off x="13565284" y="37480701"/>
             <a:ext cx="1076585" cy="1495293"/>
           </a:xfrm>
           <a:prstGeom prst="rect">
@@ -9248,14 +9198,14 @@
           <a:p>
             <a:pPr algn="ctr"/>
             <a:r>
-              <a:rPr lang="de-DE" sz="3070" i="1" dirty="0" smtClean="0">
+              <a:rPr lang="de-DE" sz="3600" i="1" dirty="0" smtClean="0">
                 <a:solidFill>
                   <a:schemeClr val="tx1"/>
                 </a:solidFill>
               </a:rPr>
               <a:t>TD</a:t>
             </a:r>
-            <a:endParaRPr lang="de-DE" sz="3070" i="1" dirty="0">
+            <a:endParaRPr lang="de-DE" sz="3600" i="1" dirty="0" smtClean="0">
               <a:solidFill>
                 <a:schemeClr val="tx1"/>
               </a:solidFill>
@@ -9271,7 +9221,7 @@
         </p:nvSpPr>
         <p:spPr>
           <a:xfrm>
-            <a:off x="13678068" y="41843491"/>
+            <a:off x="13100218" y="40515706"/>
             <a:ext cx="1954005" cy="1204663"/>
           </a:xfrm>
           <a:prstGeom prst="rect">
@@ -9302,14 +9252,14 @@
           <a:p>
             <a:pPr algn="ctr"/>
             <a:r>
-              <a:rPr lang="en-US" altLang="de-DE" sz="3070" i="1" dirty="0" err="1" smtClean="0">
+              <a:rPr lang="en-US" altLang="de-DE" sz="3600" i="1" dirty="0" err="1" smtClean="0">
                 <a:solidFill>
                   <a:schemeClr val="tx1"/>
                 </a:solidFill>
               </a:rPr>
               <a:t>Injection</a:t>
             </a:r>
-            <a:endParaRPr lang="en-US" altLang="de-DE" sz="3070" i="1" dirty="0" err="1" smtClean="0">
+            <a:endParaRPr lang="en-US" altLang="de-DE" sz="3600" i="1" dirty="0" err="1" smtClean="0">
               <a:solidFill>
                 <a:schemeClr val="tx1"/>
               </a:solidFill>
@@ -9318,14 +9268,14 @@
           <a:p>
             <a:pPr algn="ctr"/>
             <a:r>
-              <a:rPr lang="de-DE" sz="3070" i="1" dirty="0" err="1" smtClean="0">
+              <a:rPr lang="de-DE" sz="3600" i="1" dirty="0" err="1" smtClean="0">
                 <a:solidFill>
                   <a:schemeClr val="tx1"/>
                 </a:solidFill>
               </a:rPr>
               <a:t>kicker</a:t>
             </a:r>
-            <a:endParaRPr lang="de-DE" sz="3070" i="1" dirty="0">
+            <a:endParaRPr lang="de-DE" sz="3600" i="1" dirty="0">
               <a:solidFill>
                 <a:schemeClr val="tx1"/>
               </a:solidFill>
@@ -9341,8 +9291,8 @@
         </p:nvSpPr>
         <p:spPr>
           <a:xfrm>
-            <a:off x="15612888" y="40565408"/>
-            <a:ext cx="1952151" cy="1077650"/>
+            <a:off x="15034895" y="39237920"/>
+            <a:ext cx="2268855" cy="1077595"/>
           </a:xfrm>
           <a:prstGeom prst="rect">
             <a:avLst/>
@@ -9372,7 +9322,7 @@
           <a:p>
             <a:pPr algn="ctr"/>
             <a:r>
-              <a:rPr lang="de-DE" sz="3070" i="1" dirty="0" smtClean="0">
+              <a:rPr lang="de-DE" sz="3600" i="1" dirty="0" smtClean="0">
                 <a:solidFill>
                   <a:schemeClr val="tx1"/>
                 </a:solidFill>
@@ -9380,14 +9330,14 @@
               <a:t>Emergency </a:t>
             </a:r>
             <a:r>
-              <a:rPr lang="de-DE" sz="3070" i="1" dirty="0" err="1" smtClean="0">
+              <a:rPr lang="de-DE" sz="3600" i="1" dirty="0" err="1" smtClean="0">
                 <a:solidFill>
                   <a:schemeClr val="tx1"/>
                 </a:solidFill>
               </a:rPr>
               <a:t>kicker</a:t>
             </a:r>
-            <a:endParaRPr lang="de-DE" sz="3070" i="1" dirty="0">
+            <a:endParaRPr lang="de-DE" sz="3600" i="1" dirty="0">
               <a:solidFill>
                 <a:schemeClr val="tx1"/>
               </a:solidFill>
@@ -9405,7 +9355,7 @@
         </p:nvCxnSpPr>
         <p:spPr>
           <a:xfrm>
-            <a:off x="14652625" y="41104185"/>
+            <a:off x="14074775" y="39776400"/>
             <a:ext cx="960120" cy="635"/>
           </a:xfrm>
           <a:prstGeom prst="straightConnector1">
@@ -9442,8 +9392,8 @@
         </p:nvSpPr>
         <p:spPr>
           <a:xfrm>
-            <a:off x="14833188" y="41191430"/>
-            <a:ext cx="551847" cy="495300"/>
+            <a:off x="14255115" y="39863395"/>
+            <a:ext cx="779780" cy="645160"/>
           </a:xfrm>
           <a:prstGeom prst="rect">
             <a:avLst/>
@@ -9456,7 +9406,7 @@
           </a:bodyPr>
           <a:p>
             <a:r>
-              <a:rPr lang="en-US" altLang="de-DE" sz="2630" i="1" dirty="0" err="1" smtClean="0">
+              <a:rPr lang="en-US" altLang="de-DE" sz="3600" i="1" dirty="0" err="1" smtClean="0">
                 <a:effectLst>
                   <a:outerShdw blurRad="38100" dist="38100" dir="2700000" algn="tl">
                     <a:srgbClr val="000000">
@@ -9467,7 +9417,7 @@
               </a:rPr>
               <a:t>or</a:t>
             </a:r>
-            <a:endParaRPr lang="en-US" altLang="de-DE" sz="2630" i="1" dirty="0">
+            <a:endParaRPr lang="en-US" altLang="de-DE" sz="3600" i="1" dirty="0" err="1" smtClean="0">
               <a:effectLst>
                 <a:outerShdw blurRad="38100" dist="38100" dir="2700000" algn="tl">
                   <a:srgbClr val="000000">
@@ -9487,7 +9437,7 @@
         </p:nvCxnSpPr>
         <p:spPr>
           <a:xfrm>
-            <a:off x="14662785" y="40996235"/>
+            <a:off x="14084935" y="39668450"/>
             <a:ext cx="5080" cy="885190"/>
           </a:xfrm>
           <a:prstGeom prst="straightConnector1">
@@ -9524,7 +9474,7 @@
         </p:nvCxnSpPr>
         <p:spPr>
           <a:xfrm flipH="1">
-            <a:off x="14648780" y="40304367"/>
+            <a:off x="14070930" y="38976582"/>
             <a:ext cx="3810" cy="692190"/>
           </a:xfrm>
           <a:prstGeom prst="line">
@@ -9555,7 +9505,7 @@
         </p:nvSpPr>
         <p:spPr>
           <a:xfrm flipH="1" flipV="1">
-            <a:off x="12247880" y="40037385"/>
+            <a:off x="11670030" y="38709600"/>
             <a:ext cx="2145665" cy="691515"/>
           </a:xfrm>
           <a:custGeom>
@@ -9627,7 +9577,7 @@
           <a:bodyPr rtlCol="0" anchor="ctr"/>
           <a:p>
             <a:pPr algn="ctr"/>
-            <a:endParaRPr lang="zh-CN" altLang="en-US"/>
+            <a:endParaRPr lang="zh-CN" altLang="en-US" sz="3600"/>
           </a:p>
         </p:txBody>
       </p:sp>
@@ -9639,8 +9589,8 @@
         </p:nvSpPr>
         <p:spPr>
           <a:xfrm>
-            <a:off x="10586085" y="40790495"/>
-            <a:ext cx="3966210" cy="895985"/>
+            <a:off x="9245600" y="39462710"/>
+            <a:ext cx="4728845" cy="1742440"/>
           </a:xfrm>
           <a:prstGeom prst="rect">
             <a:avLst/>
@@ -9653,7 +9603,7 @@
           </a:bodyPr>
           <a:p>
             <a:r>
-              <a:rPr lang="en-US" sz="2630" i="1" dirty="0" err="1">
+              <a:rPr lang="en-US" sz="3600" i="1" dirty="0" err="1">
                 <a:effectLst>
                   <a:outerShdw blurRad="38100" dist="38100" dir="2700000" algn="tl">
                     <a:srgbClr val="000000">
@@ -9664,7 +9614,7 @@
               </a:rPr>
               <a:t>Beam injection time &amp; </a:t>
             </a:r>
-            <a:endParaRPr lang="en-US" sz="2630" i="1" dirty="0" err="1">
+            <a:endParaRPr lang="en-US" sz="3600" i="1" dirty="0" err="1">
               <a:effectLst>
                 <a:outerShdw blurRad="38100" dist="38100" dir="2700000" algn="tl">
                   <a:srgbClr val="000000">
@@ -9676,7 +9626,7 @@
           </a:p>
           <a:p>
             <a:r>
-              <a:rPr lang="en-US" sz="2630" i="1" dirty="0" err="1">
+              <a:rPr lang="en-US" sz="3600" i="1" dirty="0" err="1">
                 <a:effectLst>
                   <a:outerShdw blurRad="38100" dist="38100" dir="2700000" algn="tl">
                     <a:srgbClr val="000000">
@@ -9687,7 +9637,7 @@
               </a:rPr>
               <a:t>injection kicker trigger time</a:t>
             </a:r>
-            <a:endParaRPr lang="en-US" sz="2630" i="1" baseline="-25000" dirty="0">
+            <a:endParaRPr lang="en-US" sz="3600" i="1" baseline="-25000" dirty="0">
               <a:effectLst>
                 <a:outerShdw blurRad="38100" dist="38100" dir="2700000" algn="tl">
                   <a:srgbClr val="000000">
@@ -9707,7 +9657,7 @@
         </p:nvSpPr>
         <p:spPr>
           <a:xfrm>
-            <a:off x="3162114" y="38805172"/>
+            <a:off x="2584264" y="37477387"/>
             <a:ext cx="5237143" cy="1492969"/>
           </a:xfrm>
           <a:prstGeom prst="rect">
@@ -9756,7 +9706,7 @@
           <a:bodyPr rtlCol="0" anchor="ctr"/>
           <a:p>
             <a:pPr algn="ctr"/>
-            <a:endParaRPr lang="de-DE" sz="1970"/>
+            <a:endParaRPr lang="de-DE" sz="3600"/>
           </a:p>
         </p:txBody>
       </p:sp>
@@ -9768,8 +9718,8 @@
         </p:nvSpPr>
         <p:spPr>
           <a:xfrm>
-            <a:off x="3162345" y="38805185"/>
-            <a:ext cx="1298016" cy="1492876"/>
+            <a:off x="2584450" y="37477700"/>
+            <a:ext cx="1706880" cy="1492885"/>
           </a:xfrm>
           <a:prstGeom prst="rect">
             <a:avLst/>
@@ -9796,10 +9746,18 @@
           <a:p>
             <a:pPr algn="ctr"/>
             <a:r>
-              <a:rPr lang="de-DE" sz="3070" dirty="0" err="1" smtClean="0"/>
-              <a:t>TriggerSCU</a:t>
-            </a:r>
-            <a:endParaRPr lang="de-DE" sz="3070" dirty="0"/>
+              <a:rPr lang="de-DE" sz="3600" dirty="0" err="1" smtClean="0"/>
+              <a:t>Trigger</a:t>
+            </a:r>
+            <a:endParaRPr lang="de-DE" sz="3600" dirty="0" err="1" smtClean="0"/>
+          </a:p>
+          <a:p>
+            <a:pPr algn="ctr"/>
+            <a:r>
+              <a:rPr lang="de-DE" sz="3600" dirty="0" err="1" smtClean="0"/>
+              <a:t>SCU</a:t>
+            </a:r>
+            <a:endParaRPr lang="de-DE" sz="3600" dirty="0" err="1" smtClean="0"/>
           </a:p>
         </p:txBody>
       </p:sp>
@@ -9811,7 +9769,7 @@
         </p:nvSpPr>
         <p:spPr>
           <a:xfrm>
-            <a:off x="5560865" y="38808486"/>
+            <a:off x="4983015" y="37480701"/>
             <a:ext cx="1076585" cy="1495293"/>
           </a:xfrm>
           <a:prstGeom prst="rect">
@@ -9842,14 +9800,14 @@
           <a:p>
             <a:pPr algn="ctr"/>
             <a:r>
-              <a:rPr lang="de-DE" sz="3070" i="1" dirty="0" smtClean="0">
+              <a:rPr lang="de-DE" sz="3600" i="1" dirty="0" smtClean="0">
                 <a:solidFill>
                   <a:schemeClr val="tx1"/>
                 </a:solidFill>
               </a:rPr>
               <a:t>TD</a:t>
             </a:r>
-            <a:endParaRPr lang="de-DE" sz="3070" i="1" dirty="0">
+            <a:endParaRPr lang="de-DE" sz="3600" i="1" dirty="0" smtClean="0">
               <a:solidFill>
                 <a:schemeClr val="tx1"/>
               </a:solidFill>
@@ -9865,8 +9823,8 @@
         </p:nvSpPr>
         <p:spPr>
           <a:xfrm>
-            <a:off x="2038777" y="40756584"/>
-            <a:ext cx="4435093" cy="895985"/>
+            <a:off x="865505" y="39429055"/>
+            <a:ext cx="5030470" cy="1742440"/>
           </a:xfrm>
           <a:prstGeom prst="rect">
             <a:avLst/>
@@ -9879,7 +9837,7 @@
           </a:bodyPr>
           <a:p>
             <a:r>
-              <a:rPr lang="en-US" sz="2630" i="1" dirty="0" err="1">
+              <a:rPr lang="en-US" sz="3600" i="1" dirty="0" err="1">
                 <a:effectLst>
                   <a:outerShdw blurRad="38100" dist="38100" dir="2700000" algn="tl">
                     <a:srgbClr val="000000">
@@ -9890,7 +9848,7 @@
               </a:rPr>
               <a:t>Beam extraction time &amp; </a:t>
             </a:r>
-            <a:endParaRPr lang="en-US" sz="2630" i="1" dirty="0" err="1">
+            <a:endParaRPr lang="en-US" sz="3600" i="1" dirty="0" err="1">
               <a:effectLst>
                 <a:outerShdw blurRad="38100" dist="38100" dir="2700000" algn="tl">
                   <a:srgbClr val="000000">
@@ -9902,7 +9860,7 @@
           </a:p>
           <a:p>
             <a:r>
-              <a:rPr lang="en-US" sz="2630" i="1" dirty="0" err="1">
+              <a:rPr lang="en-US" sz="3600" i="1" dirty="0" err="1">
                 <a:effectLst>
                   <a:outerShdw blurRad="38100" dist="38100" dir="2700000" algn="tl">
                     <a:srgbClr val="000000">
@@ -9913,7 +9871,7 @@
               </a:rPr>
               <a:t>extraction kicker trigger time</a:t>
             </a:r>
-            <a:endParaRPr lang="en-US" sz="2630" i="1" baseline="-25000" dirty="0">
+            <a:endParaRPr lang="en-US" sz="3600" i="1" baseline="-25000" dirty="0">
               <a:effectLst>
                 <a:outerShdw blurRad="38100" dist="38100" dir="2700000" algn="tl">
                   <a:srgbClr val="000000">
@@ -9933,7 +9891,7 @@
         </p:nvSpPr>
         <p:spPr>
           <a:xfrm>
-            <a:off x="5182403" y="41843491"/>
+            <a:off x="4604553" y="40515706"/>
             <a:ext cx="1954005" cy="1204663"/>
           </a:xfrm>
           <a:prstGeom prst="rect">
@@ -9964,14 +9922,14 @@
           <a:p>
             <a:pPr algn="ctr"/>
             <a:r>
-              <a:rPr lang="en-US" altLang="de-DE" sz="3070" i="1" dirty="0" err="1" smtClean="0">
+              <a:rPr lang="en-US" altLang="de-DE" sz="3600" i="1" dirty="0" err="1" smtClean="0">
                 <a:solidFill>
                   <a:schemeClr val="tx1"/>
                 </a:solidFill>
               </a:rPr>
               <a:t>Injection</a:t>
             </a:r>
-            <a:endParaRPr lang="en-US" altLang="de-DE" sz="3070" i="1" dirty="0" err="1" smtClean="0">
+            <a:endParaRPr lang="en-US" altLang="de-DE" sz="3600" i="1" dirty="0" err="1" smtClean="0">
               <a:solidFill>
                 <a:schemeClr val="tx1"/>
               </a:solidFill>
@@ -9980,14 +9938,14 @@
           <a:p>
             <a:pPr algn="ctr"/>
             <a:r>
-              <a:rPr lang="de-DE" sz="3070" i="1" dirty="0" err="1" smtClean="0">
+              <a:rPr lang="de-DE" sz="3600" i="1" dirty="0" err="1" smtClean="0">
                 <a:solidFill>
                   <a:schemeClr val="tx1"/>
                 </a:solidFill>
               </a:rPr>
               <a:t>kicker</a:t>
             </a:r>
-            <a:endParaRPr lang="de-DE" sz="3070" i="1" dirty="0">
+            <a:endParaRPr lang="de-DE" sz="3600" i="1" dirty="0">
               <a:solidFill>
                 <a:schemeClr val="tx1"/>
               </a:solidFill>
@@ -10003,8 +9961,8 @@
         </p:nvSpPr>
         <p:spPr>
           <a:xfrm>
-            <a:off x="7117223" y="40565408"/>
-            <a:ext cx="1952151" cy="1077650"/>
+            <a:off x="6539230" y="39237920"/>
+            <a:ext cx="2453640" cy="1077595"/>
           </a:xfrm>
           <a:prstGeom prst="rect">
             <a:avLst/>
@@ -10034,7 +9992,7 @@
           <a:p>
             <a:pPr algn="ctr"/>
             <a:r>
-              <a:rPr lang="de-DE" sz="3070" i="1" dirty="0" smtClean="0">
+              <a:rPr lang="de-DE" sz="3600" i="1" dirty="0" smtClean="0">
                 <a:solidFill>
                   <a:schemeClr val="tx1"/>
                 </a:solidFill>
@@ -10042,14 +10000,14 @@
               <a:t>Emergency </a:t>
             </a:r>
             <a:r>
-              <a:rPr lang="de-DE" sz="3070" i="1" dirty="0" err="1" smtClean="0">
+              <a:rPr lang="de-DE" sz="3600" i="1" dirty="0" err="1" smtClean="0">
                 <a:solidFill>
                   <a:schemeClr val="tx1"/>
                 </a:solidFill>
               </a:rPr>
               <a:t>kicker</a:t>
             </a:r>
-            <a:endParaRPr lang="de-DE" sz="3070" i="1" dirty="0">
+            <a:endParaRPr lang="de-DE" sz="3600" i="1" dirty="0">
               <a:solidFill>
                 <a:schemeClr val="tx1"/>
               </a:solidFill>
@@ -10067,7 +10025,7 @@
         </p:nvCxnSpPr>
         <p:spPr>
           <a:xfrm>
-            <a:off x="6156960" y="41104185"/>
+            <a:off x="5579110" y="39776400"/>
             <a:ext cx="960120" cy="635"/>
           </a:xfrm>
           <a:prstGeom prst="straightConnector1">
@@ -10104,8 +10062,8 @@
         </p:nvSpPr>
         <p:spPr>
           <a:xfrm>
-            <a:off x="6337523" y="41191430"/>
-            <a:ext cx="551847" cy="495300"/>
+            <a:off x="5759450" y="39863395"/>
+            <a:ext cx="779780" cy="645160"/>
           </a:xfrm>
           <a:prstGeom prst="rect">
             <a:avLst/>
@@ -10118,7 +10076,7 @@
           </a:bodyPr>
           <a:p>
             <a:r>
-              <a:rPr lang="en-US" altLang="de-DE" sz="2630" i="1" dirty="0" err="1" smtClean="0">
+              <a:rPr lang="en-US" altLang="de-DE" sz="3600" i="1" dirty="0" err="1" smtClean="0">
                 <a:effectLst>
                   <a:outerShdw blurRad="38100" dist="38100" dir="2700000" algn="tl">
                     <a:srgbClr val="000000">
@@ -10129,7 +10087,7 @@
               </a:rPr>
               <a:t>or</a:t>
             </a:r>
-            <a:endParaRPr lang="en-US" altLang="de-DE" sz="2630" i="1" dirty="0">
+            <a:endParaRPr lang="en-US" altLang="de-DE" sz="3600" i="1" dirty="0" err="1" smtClean="0">
               <a:effectLst>
                 <a:outerShdw blurRad="38100" dist="38100" dir="2700000" algn="tl">
                   <a:srgbClr val="000000">
@@ -10149,7 +10107,7 @@
         </p:nvCxnSpPr>
         <p:spPr>
           <a:xfrm>
-            <a:off x="6167120" y="40996235"/>
+            <a:off x="5589270" y="39668450"/>
             <a:ext cx="5080" cy="885190"/>
           </a:xfrm>
           <a:prstGeom prst="straightConnector1">
@@ -10186,7 +10144,7 @@
         </p:nvCxnSpPr>
         <p:spPr>
           <a:xfrm flipH="1">
-            <a:off x="6153115" y="40304367"/>
+            <a:off x="5575265" y="38976582"/>
             <a:ext cx="3810" cy="692190"/>
           </a:xfrm>
           <a:prstGeom prst="line">
@@ -10217,7 +10175,7 @@
         </p:nvSpPr>
         <p:spPr>
           <a:xfrm flipH="1" flipV="1">
-            <a:off x="3752215" y="40037385"/>
+            <a:off x="3174365" y="38709600"/>
             <a:ext cx="2145665" cy="691515"/>
           </a:xfrm>
           <a:custGeom>
@@ -10289,7 +10247,7 @@
           <a:bodyPr rtlCol="0" anchor="ctr"/>
           <a:p>
             <a:pPr algn="ctr"/>
-            <a:endParaRPr lang="zh-CN" altLang="en-US"/>
+            <a:endParaRPr lang="zh-CN" altLang="en-US" sz="3600"/>
           </a:p>
         </p:txBody>
       </p:sp>
@@ -10301,8 +10259,8 @@
         </p:nvSpPr>
         <p:spPr>
           <a:xfrm>
-            <a:off x="8812909" y="37548199"/>
-            <a:ext cx="2305311" cy="1447964"/>
+            <a:off x="7828280" y="35903535"/>
+            <a:ext cx="2710180" cy="1764665"/>
           </a:xfrm>
           <a:prstGeom prst="cloud">
             <a:avLst/>
@@ -10339,14 +10297,14 @@
           <a:p>
             <a:pPr algn="ctr"/>
             <a:r>
-              <a:rPr lang="en-US" altLang="zh-CN" sz="2400">
+              <a:rPr lang="en-US" altLang="zh-CN" sz="3600">
                 <a:solidFill>
                   <a:schemeClr val="tx1"/>
                 </a:solidFill>
               </a:rPr>
               <a:t>WR network</a:t>
             </a:r>
-            <a:endParaRPr lang="en-US" altLang="zh-CN" sz="2400">
+            <a:endParaRPr lang="en-US" altLang="zh-CN" sz="3600">
               <a:solidFill>
                 <a:schemeClr val="tx1"/>
               </a:solidFill>
@@ -10365,8 +10323,8 @@
         </p:nvCxnSpPr>
         <p:spPr>
           <a:xfrm rot="10800000" flipV="1">
-            <a:off x="3811270" y="38272085"/>
-            <a:ext cx="5008880" cy="533400"/>
+            <a:off x="3437890" y="36786185"/>
+            <a:ext cx="4398645" cy="691515"/>
           </a:xfrm>
           <a:prstGeom prst="bentConnector2">
             <a:avLst/>
@@ -10402,7 +10360,7 @@
         </p:nvCxnSpPr>
         <p:spPr>
           <a:xfrm rot="16200000" flipV="1">
-            <a:off x="11496675" y="37894895"/>
+            <a:off x="10918825" y="36567110"/>
             <a:ext cx="533400" cy="1294130"/>
           </a:xfrm>
           <a:prstGeom prst="bentConnector2">
@@ -10438,8 +10396,8 @@
         </p:nvSpPr>
         <p:spPr>
           <a:xfrm>
-            <a:off x="4527550" y="37811710"/>
-            <a:ext cx="3629025" cy="460375"/>
+            <a:off x="2458085" y="35998150"/>
+            <a:ext cx="5120640" cy="645160"/>
           </a:xfrm>
           <a:prstGeom prst="rect">
             <a:avLst/>
@@ -10452,12 +10410,14 @@
           </a:bodyPr>
           <a:p>
             <a:r>
-              <a:rPr lang="en-US" altLang="zh-CN" sz="2400">
+              <a:rPr lang="en-US" altLang="zh-CN" sz="3600">
                 <a:sym typeface="+mn-ea"/>
               </a:rPr>
               <a:t>TGM_KICKER_TRIGGER_S</a:t>
             </a:r>
-            <a:endParaRPr lang="en-US" altLang="zh-CN" sz="2400"/>
+            <a:endParaRPr lang="en-US" altLang="zh-CN" sz="3600">
+              <a:sym typeface="+mn-ea"/>
+            </a:endParaRPr>
           </a:p>
         </p:txBody>
       </p:sp>
@@ -10469,8 +10429,8 @@
         </p:nvSpPr>
         <p:spPr>
           <a:xfrm>
-            <a:off x="11349990" y="37811710"/>
-            <a:ext cx="3629025" cy="460375"/>
+            <a:off x="10772140" y="36312475"/>
+            <a:ext cx="5524500" cy="645160"/>
           </a:xfrm>
           <a:prstGeom prst="rect">
             <a:avLst/>
@@ -10483,12 +10443,14 @@
           </a:bodyPr>
           <a:p>
             <a:r>
-              <a:rPr lang="en-US" altLang="zh-CN" sz="2400">
+              <a:rPr lang="en-US" altLang="zh-CN" sz="3600">
                 <a:sym typeface="+mn-ea"/>
               </a:rPr>
               <a:t>TGM_KICKER_TRIGGER_T</a:t>
             </a:r>
-            <a:endParaRPr lang="en-US" altLang="zh-CN" sz="2400"/>
+            <a:endParaRPr lang="en-US" altLang="zh-CN" sz="3600">
+              <a:sym typeface="+mn-ea"/>
+            </a:endParaRPr>
           </a:p>
         </p:txBody>
       </p:sp>
@@ -10500,7 +10462,7 @@
         </p:nvSpPr>
         <p:spPr>
           <a:xfrm>
-            <a:off x="3090359" y="35134872"/>
+            <a:off x="2512509" y="33006987"/>
             <a:ext cx="5237143" cy="1492969"/>
           </a:xfrm>
           <a:prstGeom prst="rect">
@@ -10549,7 +10511,7 @@
           <a:bodyPr rtlCol="0" anchor="ctr"/>
           <a:p>
             <a:pPr algn="ctr"/>
-            <a:endParaRPr lang="de-DE" sz="1970"/>
+            <a:endParaRPr lang="de-DE" sz="3600"/>
           </a:p>
         </p:txBody>
       </p:sp>
@@ -10561,8 +10523,8 @@
         </p:nvSpPr>
         <p:spPr>
           <a:xfrm>
-            <a:off x="3090590" y="35134885"/>
-            <a:ext cx="1298016" cy="1492876"/>
+            <a:off x="2512695" y="33007300"/>
+            <a:ext cx="1672590" cy="1492885"/>
           </a:xfrm>
           <a:prstGeom prst="rect">
             <a:avLst/>
@@ -10589,10 +10551,10 @@
           <a:p>
             <a:pPr algn="ctr"/>
             <a:r>
-              <a:rPr lang="en-US" altLang="de-DE" sz="3070" dirty="0" err="1" smtClean="0"/>
+              <a:rPr lang="en-US" altLang="de-DE" sz="3600" dirty="0" err="1" smtClean="0"/>
               <a:t>B2B source SCU</a:t>
             </a:r>
-            <a:endParaRPr lang="en-US" altLang="de-DE" sz="3070" dirty="0" err="1" smtClean="0"/>
+            <a:endParaRPr lang="en-US" altLang="de-DE" sz="3600" dirty="0" err="1" smtClean="0"/>
           </a:p>
         </p:txBody>
       </p:sp>
@@ -10607,12 +10569,12 @@
         </p:nvCxnSpPr>
         <p:spPr>
           <a:xfrm rot="16200000" flipV="1">
-            <a:off x="6351270" y="34016315"/>
-            <a:ext cx="1002665" cy="6226175"/>
+            <a:off x="5514023" y="32335153"/>
+            <a:ext cx="1504315" cy="5834380"/>
           </a:xfrm>
           <a:prstGeom prst="bentConnector3">
             <a:avLst>
-              <a:gd name="adj1" fmla="val 54085"/>
+              <a:gd name="adj1" fmla="val 53377"/>
             </a:avLst>
           </a:prstGeom>
           <a:ln w="38100">
@@ -10647,7 +10609,7 @@
         </p:nvCxnSpPr>
         <p:spPr>
           <a:xfrm rot="10800000">
-            <a:off x="3739515" y="35135185"/>
+            <a:off x="3348990" y="33007300"/>
             <a:ext cx="6353175" cy="2622550"/>
           </a:xfrm>
           <a:prstGeom prst="bentConnector4">
@@ -10687,8 +10649,8 @@
         </p:nvSpPr>
         <p:spPr>
           <a:xfrm>
-            <a:off x="5263515" y="34415095"/>
-            <a:ext cx="3629025" cy="460375"/>
+            <a:off x="4631690" y="32047815"/>
+            <a:ext cx="3629025" cy="645160"/>
           </a:xfrm>
           <a:prstGeom prst="rect">
             <a:avLst/>
@@ -10701,10 +10663,10 @@
           </a:bodyPr>
           <a:p>
             <a:r>
-              <a:rPr lang="en-US" altLang="zh-CN" sz="2400"/>
+              <a:rPr lang="en-US" altLang="zh-CN" sz="3600"/>
               <a:t>TGM_B2B_STATUS</a:t>
             </a:r>
-            <a:endParaRPr lang="en-US" altLang="zh-CN" sz="2400"/>
+            <a:endParaRPr lang="en-US" altLang="zh-CN" sz="3600"/>
           </a:p>
         </p:txBody>
       </p:sp>
@@ -10716,8 +10678,8 @@
         </p:nvCxnSpPr>
         <p:spPr>
           <a:xfrm flipV="1">
-            <a:off x="10808335" y="36610290"/>
-            <a:ext cx="952500" cy="1038860"/>
+            <a:off x="10186670" y="34523680"/>
+            <a:ext cx="1234440" cy="1960245"/>
           </a:xfrm>
           <a:prstGeom prst="straightConnector1">
             <a:avLst/>
@@ -10752,7 +10714,7 @@
         </p:nvSpPr>
         <p:spPr>
           <a:xfrm>
-            <a:off x="11515535" y="35928090"/>
+            <a:off x="10937685" y="33800205"/>
             <a:ext cx="1193935" cy="660475"/>
           </a:xfrm>
           <a:prstGeom prst="rect">
@@ -10786,14 +10748,14 @@
           <a:p>
             <a:pPr algn="ctr"/>
             <a:r>
-              <a:rPr lang="en-US" altLang="zh-CN" sz="2800">
+              <a:rPr lang="en-US" altLang="zh-CN" sz="3600">
                 <a:solidFill>
                   <a:schemeClr val="tx1"/>
                 </a:solidFill>
               </a:rPr>
               <a:t>DM</a:t>
             </a:r>
-            <a:endParaRPr lang="en-US" altLang="zh-CN" sz="2800">
+            <a:endParaRPr lang="en-US" altLang="zh-CN" sz="3600">
               <a:solidFill>
                 <a:schemeClr val="tx1"/>
               </a:solidFill>
@@ -10803,43 +10765,13 @@
       </p:sp>
       <p:cxnSp>
         <p:nvCxnSpPr>
-          <p:cNvPr id="234" name="直接连接符 233"/>
-          <p:cNvCxnSpPr/>
-          <p:nvPr/>
-        </p:nvCxnSpPr>
-        <p:spPr>
-          <a:xfrm>
-            <a:off x="18689955" y="18804890"/>
-            <a:ext cx="914400" cy="914400"/>
-          </a:xfrm>
-          <a:prstGeom prst="line">
-            <a:avLst/>
-          </a:prstGeom>
-        </p:spPr>
-        <p:style>
-          <a:lnRef idx="1">
-            <a:schemeClr val="accent1"/>
-          </a:lnRef>
-          <a:fillRef idx="0">
-            <a:schemeClr val="accent1"/>
-          </a:fillRef>
-          <a:effectRef idx="0">
-            <a:schemeClr val="accent1"/>
-          </a:effectRef>
-          <a:fontRef idx="minor">
-            <a:schemeClr val="tx1"/>
-          </a:fontRef>
-        </p:style>
-      </p:cxnSp>
-      <p:cxnSp>
-        <p:nvCxnSpPr>
           <p:cNvPr id="235" name="直接连接符 234"/>
           <p:cNvCxnSpPr/>
           <p:nvPr/>
         </p:nvCxnSpPr>
         <p:spPr>
           <a:xfrm flipH="1">
-            <a:off x="8627110" y="9795510"/>
+            <a:off x="9038590" y="5111115"/>
             <a:ext cx="1392555" cy="1779905"/>
           </a:xfrm>
           <a:prstGeom prst="line">
@@ -10876,7 +10808,7 @@
         </p:nvCxnSpPr>
         <p:spPr>
           <a:xfrm flipH="1">
-            <a:off x="8557260" y="11612245"/>
+            <a:off x="8221980" y="7571740"/>
             <a:ext cx="2355850" cy="3121660"/>
           </a:xfrm>
           <a:prstGeom prst="line">
@@ -10913,7 +10845,7 @@
         </p:nvCxnSpPr>
         <p:spPr>
           <a:xfrm flipH="1">
-            <a:off x="8484870" y="16149320"/>
+            <a:off x="8813165" y="12371705"/>
             <a:ext cx="1677035" cy="2223770"/>
           </a:xfrm>
           <a:prstGeom prst="line">
@@ -10950,7 +10882,7 @@
         </p:nvCxnSpPr>
         <p:spPr>
           <a:xfrm flipH="1">
-            <a:off x="8682990" y="21184870"/>
+            <a:off x="9765030" y="17463770"/>
             <a:ext cx="4653915" cy="6054725"/>
           </a:xfrm>
           <a:prstGeom prst="line">
@@ -10987,7 +10919,7 @@
         </p:nvCxnSpPr>
         <p:spPr>
           <a:xfrm flipH="1">
-            <a:off x="7762240" y="27239595"/>
+            <a:off x="7505065" y="24150955"/>
             <a:ext cx="5459730" cy="7046595"/>
           </a:xfrm>
           <a:prstGeom prst="line">
@@ -11024,7 +10956,7 @@
         </p:nvCxnSpPr>
         <p:spPr>
           <a:xfrm flipH="1">
-            <a:off x="7762240" y="35895915"/>
+            <a:off x="7184390" y="34568130"/>
             <a:ext cx="5632450" cy="7443470"/>
           </a:xfrm>
           <a:prstGeom prst="line">
@@ -11061,8 +10993,8 @@
         </p:nvCxnSpPr>
         <p:spPr>
           <a:xfrm flipH="1">
-            <a:off x="8892540" y="2620645"/>
-            <a:ext cx="3276600" cy="4229100"/>
+            <a:off x="9168130" y="-814070"/>
+            <a:ext cx="2271395" cy="2862580"/>
           </a:xfrm>
           <a:prstGeom prst="line">
             <a:avLst/>
@@ -11098,8 +11030,8 @@
         </p:nvSpPr>
         <p:spPr>
           <a:xfrm>
-            <a:off x="2706053" y="3906520"/>
-            <a:ext cx="4749165" cy="2295525"/>
+            <a:off x="2992121" y="471805"/>
+            <a:ext cx="2717800" cy="1316355"/>
           </a:xfrm>
           <a:prstGeom prst="rect">
             <a:avLst/>
@@ -11116,7 +11048,7 @@
           <a:p>
             <a:pPr algn="ctr"/>
             <a:r>
-              <a:rPr lang="en-US" altLang="zh-CN" sz="7200" b="1">
+              <a:rPr lang="en-US" altLang="zh-CN" sz="4000" b="1">
                 <a:solidFill>
                   <a:schemeClr val="tx1"/>
                 </a:solidFill>
@@ -11130,7 +11062,7 @@
               </a:rPr>
               <a:t>Source </a:t>
             </a:r>
-            <a:endParaRPr lang="en-US" altLang="zh-CN" sz="7200" b="1">
+            <a:endParaRPr lang="en-US" altLang="zh-CN" sz="4000" b="1">
               <a:solidFill>
                 <a:schemeClr val="tx1"/>
               </a:solidFill>
@@ -11146,7 +11078,7 @@
           <a:p>
             <a:pPr algn="ctr"/>
             <a:r>
-              <a:rPr lang="en-US" altLang="zh-CN" sz="7200" b="1">
+              <a:rPr lang="en-US" altLang="zh-CN" sz="4000" b="1">
                 <a:solidFill>
                   <a:schemeClr val="tx1"/>
                 </a:solidFill>
@@ -11160,7 +11092,7 @@
               </a:rPr>
               <a:t>synchrotron</a:t>
             </a:r>
-            <a:endParaRPr lang="en-US" altLang="zh-CN" sz="7200" b="1">
+            <a:endParaRPr lang="en-US" altLang="zh-CN" sz="4000" b="1">
               <a:solidFill>
                 <a:schemeClr val="tx1"/>
               </a:solidFill>
@@ -11183,8 +11115,8 @@
         </p:nvSpPr>
         <p:spPr>
           <a:xfrm>
-            <a:off x="11771313" y="3906520"/>
-            <a:ext cx="4749165" cy="2295525"/>
+            <a:off x="12057381" y="471805"/>
+            <a:ext cx="2717800" cy="1316355"/>
           </a:xfrm>
           <a:prstGeom prst="rect">
             <a:avLst/>
@@ -11201,7 +11133,7 @@
           <a:p>
             <a:pPr algn="ctr"/>
             <a:r>
-              <a:rPr lang="en-US" altLang="zh-CN" sz="7200" b="1">
+              <a:rPr lang="en-US" altLang="zh-CN" sz="4000" b="1">
                 <a:solidFill>
                   <a:schemeClr val="tx1"/>
                 </a:solidFill>
@@ -11215,7 +11147,7 @@
               </a:rPr>
               <a:t>Target</a:t>
             </a:r>
-            <a:endParaRPr lang="en-US" altLang="zh-CN" sz="7200" b="1">
+            <a:endParaRPr lang="en-US" altLang="zh-CN" sz="4000" b="1">
               <a:solidFill>
                 <a:schemeClr val="tx1"/>
               </a:solidFill>
@@ -11231,7 +11163,7 @@
           <a:p>
             <a:pPr algn="ctr"/>
             <a:r>
-              <a:rPr lang="en-US" altLang="zh-CN" sz="7200" b="1">
+              <a:rPr lang="en-US" altLang="zh-CN" sz="4000" b="1">
                 <a:solidFill>
                   <a:schemeClr val="tx1"/>
                 </a:solidFill>
@@ -11245,7 +11177,7 @@
               </a:rPr>
               <a:t>synchrotron</a:t>
             </a:r>
-            <a:endParaRPr lang="en-US" altLang="zh-CN" sz="7200" b="1">
+            <a:endParaRPr lang="en-US" altLang="zh-CN" sz="4000" b="1">
               <a:solidFill>
                 <a:schemeClr val="tx1"/>
               </a:solidFill>
@@ -11268,7 +11200,7 @@
         </p:nvSpPr>
         <p:spPr>
           <a:xfrm>
-            <a:off x="5134610" y="24773255"/>
+            <a:off x="5052060" y="21877655"/>
             <a:ext cx="1607820" cy="527050"/>
           </a:xfrm>
           <a:custGeom>
@@ -11340,7 +11272,7 @@
           <a:bodyPr rtlCol="0" anchor="ctr"/>
           <a:p>
             <a:pPr algn="ctr"/>
-            <a:endParaRPr lang="zh-CN" altLang="en-US"/>
+            <a:endParaRPr lang="zh-CN" altLang="en-US" sz="3600"/>
           </a:p>
         </p:txBody>
       </p:sp>
@@ -11352,7 +11284,7 @@
         </p:nvSpPr>
         <p:spPr>
           <a:xfrm>
-            <a:off x="13342620" y="24773255"/>
+            <a:off x="13298805" y="21537930"/>
             <a:ext cx="1607820" cy="527050"/>
           </a:xfrm>
           <a:custGeom>
@@ -11424,7 +11356,7 @@
           <a:bodyPr rtlCol="0" anchor="ctr"/>
           <a:p>
             <a:pPr algn="ctr"/>
-            <a:endParaRPr lang="zh-CN" altLang="en-US"/>
+            <a:endParaRPr lang="zh-CN" altLang="en-US" sz="3600"/>
           </a:p>
         </p:txBody>
       </p:sp>
@@ -11436,8 +11368,8 @@
         </p:nvSpPr>
         <p:spPr>
           <a:xfrm>
-            <a:off x="15058173" y="24467854"/>
-            <a:ext cx="3809833" cy="495300"/>
+            <a:off x="15110243" y="20380359"/>
+            <a:ext cx="3809833" cy="1193800"/>
           </a:xfrm>
           <a:prstGeom prst="rect">
             <a:avLst/>
@@ -11450,7 +11382,7 @@
           </a:bodyPr>
           <a:p>
             <a:r>
-              <a:rPr lang="de-DE" sz="2630" i="1" dirty="0">
+              <a:rPr lang="de-DE" sz="3600" i="1" dirty="0">
                 <a:effectLst>
                   <a:outerShdw blurRad="38100" dist="38100" dir="2700000" algn="tl">
                     <a:srgbClr val="000000">
@@ -11461,8 +11393,19 @@
               </a:rPr>
               <a:t>Phase  </a:t>
             </a:r>
-            <a:r>
-              <a:rPr lang="de-DE" sz="2630" i="1" dirty="0" err="1" smtClean="0">
+            <a:endParaRPr lang="de-DE" sz="3600" i="1" dirty="0">
+              <a:effectLst>
+                <a:outerShdw blurRad="38100" dist="38100" dir="2700000" algn="tl">
+                  <a:srgbClr val="000000">
+                    <a:alpha val="43137"/>
+                  </a:srgbClr>
+                </a:outerShdw>
+              </a:effectLst>
+            </a:endParaRPr>
+          </a:p>
+          <a:p>
+            <a:r>
+              <a:rPr lang="de-DE" sz="3600" i="1" dirty="0" err="1" smtClean="0">
                 <a:effectLst>
                   <a:outerShdw blurRad="38100" dist="38100" dir="2700000" algn="tl">
                     <a:srgbClr val="000000">
@@ -11473,7 +11416,7 @@
               </a:rPr>
               <a:t>correction</a:t>
             </a:r>
-            <a:endParaRPr lang="de-DE" sz="2630" i="1" dirty="0">
+            <a:endParaRPr lang="de-DE" sz="3600" i="1" dirty="0">
               <a:effectLst>
                 <a:outerShdw blurRad="38100" dist="38100" dir="2700000" algn="tl">
                   <a:srgbClr val="000000">
@@ -11493,8 +11436,8 @@
         </p:nvSpPr>
         <p:spPr>
           <a:xfrm>
-            <a:off x="7144803" y="24467854"/>
-            <a:ext cx="3809833" cy="495300"/>
+            <a:off x="7100988" y="21232529"/>
+            <a:ext cx="3809833" cy="645160"/>
           </a:xfrm>
           <a:prstGeom prst="rect">
             <a:avLst/>
@@ -11507,7 +11450,7 @@
           </a:bodyPr>
           <a:p>
             <a:r>
-              <a:rPr lang="de-DE" sz="2630" i="1" dirty="0">
+              <a:rPr lang="de-DE" sz="3600" i="1" dirty="0">
                 <a:effectLst>
                   <a:outerShdw blurRad="38100" dist="38100" dir="2700000" algn="tl">
                     <a:srgbClr val="000000">
@@ -11519,7 +11462,7 @@
               <a:t>Phase  </a:t>
             </a:r>
             <a:r>
-              <a:rPr lang="de-DE" sz="2630" i="1" dirty="0" err="1" smtClean="0">
+              <a:rPr lang="de-DE" sz="3600" i="1" dirty="0" err="1" smtClean="0">
                 <a:effectLst>
                   <a:outerShdw blurRad="38100" dist="38100" dir="2700000" algn="tl">
                     <a:srgbClr val="000000">
@@ -11530,7 +11473,7 @@
               </a:rPr>
               <a:t>correction</a:t>
             </a:r>
-            <a:endParaRPr lang="de-DE" sz="2630" i="1" dirty="0">
+            <a:endParaRPr lang="de-DE" sz="3600" i="1" dirty="0">
               <a:effectLst>
                 <a:outerShdw blurRad="38100" dist="38100" dir="2700000" algn="tl">
                   <a:srgbClr val="000000">
@@ -11550,7 +11493,7 @@
         </p:nvSpPr>
         <p:spPr>
           <a:xfrm>
-            <a:off x="6337300" y="31633160"/>
+            <a:off x="6080125" y="28544520"/>
             <a:ext cx="2656205" cy="1415415"/>
           </a:xfrm>
           <a:custGeom>
@@ -11622,7 +11565,7 @@
           <a:bodyPr rtlCol="0" anchor="ctr"/>
           <a:p>
             <a:pPr algn="ctr"/>
-            <a:endParaRPr lang="zh-CN" altLang="en-US"/>
+            <a:endParaRPr lang="zh-CN" altLang="en-US" sz="3600"/>
           </a:p>
         </p:txBody>
       </p:sp>
@@ -11634,8 +11577,8 @@
         </p:nvSpPr>
         <p:spPr>
           <a:xfrm rot="600000">
-            <a:off x="6576075" y="32233570"/>
-            <a:ext cx="4435093" cy="495300"/>
+            <a:off x="6306835" y="28917600"/>
+            <a:ext cx="4435093" cy="645160"/>
           </a:xfrm>
           <a:prstGeom prst="rect">
             <a:avLst/>
@@ -11648,7 +11591,7 @@
           </a:bodyPr>
           <a:p>
             <a:r>
-              <a:rPr lang="en-US" sz="2630" i="1" dirty="0" err="1">
+              <a:rPr lang="en-US" sz="3600" i="1" dirty="0" err="1">
                 <a:effectLst>
                   <a:outerShdw blurRad="38100" dist="38100" dir="2700000" algn="tl">
                     <a:srgbClr val="000000">
@@ -11659,7 +11602,7 @@
               </a:rPr>
               <a:t>Injection inhibit </a:t>
             </a:r>
-            <a:endParaRPr lang="en-US" sz="2630" i="1" dirty="0" err="1">
+            <a:endParaRPr lang="en-US" sz="3600" i="1" dirty="0" err="1">
               <a:effectLst>
                 <a:outerShdw blurRad="38100" dist="38100" dir="2700000" algn="tl">
                   <a:srgbClr val="000000">
@@ -11679,7 +11622,7 @@
         </p:nvSpPr>
         <p:spPr>
           <a:xfrm>
-            <a:off x="6494145" y="31630620"/>
+            <a:off x="6236970" y="28541980"/>
             <a:ext cx="2656205" cy="1197610"/>
           </a:xfrm>
           <a:custGeom>
@@ -11751,7 +11694,7 @@
           <a:bodyPr rtlCol="0" anchor="ctr"/>
           <a:p>
             <a:pPr algn="ctr"/>
-            <a:endParaRPr lang="zh-CN" altLang="en-US"/>
+            <a:endParaRPr lang="zh-CN" altLang="en-US" sz="3600"/>
           </a:p>
         </p:txBody>
       </p:sp>
@@ -11763,8 +11706,8 @@
         </p:nvSpPr>
         <p:spPr>
           <a:xfrm rot="1860000">
-            <a:off x="14765020" y="32881570"/>
-            <a:ext cx="2941320" cy="895985"/>
+            <a:off x="14035405" y="30397450"/>
+            <a:ext cx="2941320" cy="1193800"/>
           </a:xfrm>
           <a:prstGeom prst="rect">
             <a:avLst/>
@@ -11777,7 +11720,7 @@
           </a:bodyPr>
           <a:p>
             <a:r>
-              <a:rPr lang="en-US" sz="2630" i="1" dirty="0" err="1">
+              <a:rPr lang="en-US" sz="3600" i="1" dirty="0" err="1">
                 <a:effectLst>
                   <a:outerShdw blurRad="38100" dist="38100" dir="2700000" algn="tl">
                     <a:srgbClr val="000000">
@@ -11788,7 +11731,7 @@
               </a:rPr>
               <a:t>Emergency</a:t>
             </a:r>
-            <a:endParaRPr lang="en-US" sz="2630" i="1" dirty="0" err="1">
+            <a:endParaRPr lang="en-US" sz="3600" i="1" dirty="0" err="1">
               <a:effectLst>
                 <a:outerShdw blurRad="38100" dist="38100" dir="2700000" algn="tl">
                   <a:srgbClr val="000000">
@@ -11800,7 +11743,7 @@
           </a:p>
           <a:p>
             <a:r>
-              <a:rPr lang="en-US" sz="2630" i="1" dirty="0" err="1">
+              <a:rPr lang="en-US" sz="3600" i="1" dirty="0" err="1">
                 <a:effectLst>
                   <a:outerShdw blurRad="38100" dist="38100" dir="2700000" algn="tl">
                     <a:srgbClr val="000000">
@@ -11811,7 +11754,7 @@
               </a:rPr>
               <a:t> kick</a:t>
             </a:r>
-            <a:endParaRPr lang="en-US" sz="2630" i="1" baseline="-25000" dirty="0">
+            <a:endParaRPr lang="en-US" sz="3600" i="1" baseline="-25000" dirty="0">
               <a:effectLst>
                 <a:outerShdw blurRad="38100" dist="38100" dir="2700000" algn="tl">
                   <a:srgbClr val="000000">
@@ -11831,8 +11774,8 @@
         </p:nvSpPr>
         <p:spPr>
           <a:xfrm>
-            <a:off x="15435580" y="31522035"/>
-            <a:ext cx="1644650" cy="1739265"/>
+            <a:off x="14435455" y="28433395"/>
+            <a:ext cx="2225675" cy="2345690"/>
           </a:xfrm>
           <a:custGeom>
             <a:avLst/>
@@ -11903,7 +11846,7 @@
           <a:bodyPr rtlCol="0" anchor="ctr"/>
           <a:p>
             <a:pPr algn="ctr"/>
-            <a:endParaRPr lang="zh-CN" altLang="en-US"/>
+            <a:endParaRPr lang="zh-CN" altLang="en-US" sz="3600"/>
           </a:p>
         </p:txBody>
       </p:sp>
@@ -11915,8 +11858,8 @@
         </p:nvSpPr>
         <p:spPr>
           <a:xfrm rot="1920000">
-            <a:off x="15220965" y="32735855"/>
-            <a:ext cx="4435093" cy="495300"/>
+            <a:off x="14476110" y="29638960"/>
+            <a:ext cx="4435093" cy="645160"/>
           </a:xfrm>
           <a:prstGeom prst="rect">
             <a:avLst/>
@@ -11929,7 +11872,7 @@
           </a:bodyPr>
           <a:p>
             <a:r>
-              <a:rPr lang="en-US" sz="2630" i="1" dirty="0" err="1">
+              <a:rPr lang="en-US" sz="3600" i="1" dirty="0" err="1">
                 <a:effectLst>
                   <a:outerShdw blurRad="38100" dist="38100" dir="2700000" algn="tl">
                     <a:srgbClr val="000000">
@@ -11940,7 +11883,7 @@
               </a:rPr>
               <a:t>Injection inhibit </a:t>
             </a:r>
-            <a:endParaRPr lang="en-US" sz="2630" i="1" dirty="0" err="1">
+            <a:endParaRPr lang="en-US" sz="3600" i="1" dirty="0" err="1">
               <a:effectLst>
                 <a:outerShdw blurRad="38100" dist="38100" dir="2700000" algn="tl">
                   <a:srgbClr val="000000">
@@ -11960,8 +11903,8 @@
         </p:nvSpPr>
         <p:spPr>
           <a:xfrm>
-            <a:off x="15559405" y="31490285"/>
-            <a:ext cx="1673860" cy="1619885"/>
+            <a:off x="14559280" y="28401645"/>
+            <a:ext cx="2856865" cy="2377440"/>
           </a:xfrm>
           <a:custGeom>
             <a:avLst/>
@@ -12032,7 +11975,7 @@
           <a:bodyPr rtlCol="0" anchor="ctr"/>
           <a:p>
             <a:pPr algn="ctr"/>
-            <a:endParaRPr lang="zh-CN" altLang="en-US"/>
+            <a:endParaRPr lang="zh-CN" altLang="en-US" sz="3600"/>
           </a:p>
         </p:txBody>
       </p:sp>
@@ -12044,8 +11987,8 @@
         </p:nvSpPr>
         <p:spPr>
           <a:xfrm>
-            <a:off x="16489544" y="33110384"/>
-            <a:ext cx="1074754" cy="533269"/>
+            <a:off x="16347440" y="30530800"/>
+            <a:ext cx="1336040" cy="879475"/>
           </a:xfrm>
           <a:prstGeom prst="rect">
             <a:avLst/>
@@ -12075,14 +12018,68 @@
           <a:p>
             <a:pPr algn="ctr"/>
             <a:r>
-              <a:rPr lang="en-US" altLang="de-DE" sz="3070" i="1" dirty="0">
+              <a:rPr lang="en-US" altLang="de-DE" sz="3600" i="1" dirty="0">
                 <a:solidFill>
                   <a:schemeClr val="tx1"/>
                 </a:solidFill>
               </a:rPr>
               <a:t>MPS</a:t>
             </a:r>
-            <a:endParaRPr lang="en-US" altLang="de-DE" sz="3070" i="1" dirty="0">
+            <a:endParaRPr lang="en-US" altLang="de-DE" sz="3600" i="1" dirty="0">
+              <a:solidFill>
+                <a:schemeClr val="tx1"/>
+              </a:solidFill>
+            </a:endParaRPr>
+          </a:p>
+        </p:txBody>
+      </p:sp>
+      <p:sp>
+        <p:nvSpPr>
+          <p:cNvPr id="146" name="Rechteck 48"/>
+          <p:cNvSpPr/>
+          <p:nvPr/>
+        </p:nvSpPr>
+        <p:spPr>
+          <a:xfrm>
+            <a:off x="8721725" y="29582110"/>
+            <a:ext cx="1017270" cy="972820"/>
+          </a:xfrm>
+          <a:prstGeom prst="rect">
+            <a:avLst/>
+          </a:prstGeom>
+          <a:solidFill>
+            <a:schemeClr val="bg1"/>
+          </a:solidFill>
+        </p:spPr>
+        <p:style>
+          <a:lnRef idx="2">
+            <a:schemeClr val="accent1">
+              <a:shade val="50000"/>
+            </a:schemeClr>
+          </a:lnRef>
+          <a:fillRef idx="1">
+            <a:schemeClr val="accent1"/>
+          </a:fillRef>
+          <a:effectRef idx="0">
+            <a:schemeClr val="accent1"/>
+          </a:effectRef>
+          <a:fontRef idx="minor">
+            <a:schemeClr val="lt1"/>
+          </a:fontRef>
+        </p:style>
+        <p:txBody>
+          <a:bodyPr rtlCol="0" anchor="ctr"/>
+          <a:p>
+            <a:pPr algn="ctr"/>
+            <a:r>
+              <a:rPr lang="en-US" altLang="de-DE" sz="3600" i="1" dirty="0">
+                <a:solidFill>
+                  <a:schemeClr val="tx1"/>
+                </a:solidFill>
+              </a:rPr>
+              <a:t>MPS</a:t>
+            </a:r>
+            <a:endParaRPr lang="en-US" altLang="de-DE" sz="3600" i="1" dirty="0">
               <a:solidFill>
                 <a:schemeClr val="tx1"/>
               </a:solidFill>

</xml_diff>

<commit_message>
replace fre relation by har raltion
</commit_message>
<xml_diff>
--- a/images/data_flow.pptx
+++ b/images/data_flow.pptx
@@ -3022,7 +3022,7 @@
         </p:nvSpPr>
         <p:spPr>
           <a:xfrm>
-            <a:off x="353060" y="32048450"/>
+            <a:off x="366395" y="32075120"/>
             <a:ext cx="17317085" cy="9963150"/>
           </a:xfrm>
           <a:prstGeom prst="roundRect">
@@ -9203,14 +9203,14 @@
       </p:sp>
       <p:sp>
         <p:nvSpPr>
-          <p:cNvPr id="183" name="Rechteck 12"/>
+          <p:cNvPr id="184" name="Rechteck 14"/>
           <p:cNvSpPr/>
           <p:nvPr/>
         </p:nvSpPr>
         <p:spPr>
           <a:xfrm>
-            <a:off x="13565284" y="37480701"/>
-            <a:ext cx="1076585" cy="1495293"/>
+            <a:off x="15120788" y="40508721"/>
+            <a:ext cx="1954005" cy="1204663"/>
           </a:xfrm>
           <a:prstGeom prst="rect">
             <a:avLst/>
@@ -9240,31 +9240,47 @@
           <a:p>
             <a:pPr algn="ctr"/>
             <a:r>
-              <a:rPr lang="de-DE" sz="3600" i="1" dirty="0" smtClean="0">
+              <a:rPr lang="en-US" altLang="de-DE" sz="3600" i="1" dirty="0" err="1" smtClean="0">
                 <a:solidFill>
                   <a:schemeClr val="tx1"/>
                 </a:solidFill>
               </a:rPr>
-              <a:t>TD</a:t>
-            </a:r>
-            <a:endParaRPr lang="de-DE" sz="3600" i="1" dirty="0" smtClean="0">
+              <a:t>Injection</a:t>
+            </a:r>
+            <a:endParaRPr lang="en-US" altLang="de-DE" sz="3600" i="1" dirty="0" err="1" smtClean="0">
               <a:solidFill>
                 <a:schemeClr val="tx1"/>
               </a:solidFill>
             </a:endParaRPr>
           </a:p>
-        </p:txBody>
-      </p:sp>
-      <p:sp>
-        <p:nvSpPr>
-          <p:cNvPr id="184" name="Rechteck 14"/>
+          <a:p>
+            <a:pPr algn="ctr"/>
+            <a:r>
+              <a:rPr lang="de-DE" sz="3600" i="1" dirty="0" err="1" smtClean="0">
+                <a:solidFill>
+                  <a:schemeClr val="tx1"/>
+                </a:solidFill>
+              </a:rPr>
+              <a:t>kicker</a:t>
+            </a:r>
+            <a:endParaRPr lang="de-DE" sz="3600" i="1" dirty="0">
+              <a:solidFill>
+                <a:schemeClr val="tx1"/>
+              </a:solidFill>
+            </a:endParaRPr>
+          </a:p>
+        </p:txBody>
+      </p:sp>
+      <p:sp>
+        <p:nvSpPr>
+          <p:cNvPr id="186" name="Rechteck 16"/>
           <p:cNvSpPr/>
           <p:nvPr/>
         </p:nvSpPr>
         <p:spPr>
           <a:xfrm>
-            <a:off x="13100218" y="40515706"/>
-            <a:ext cx="1954005" cy="1204663"/>
+            <a:off x="15034895" y="39237920"/>
+            <a:ext cx="2268855" cy="1077595"/>
           </a:xfrm>
           <a:prstGeom prst="rect">
             <a:avLst/>
@@ -9294,21 +9310,13 @@
           <a:p>
             <a:pPr algn="ctr"/>
             <a:r>
-              <a:rPr lang="en-US" altLang="de-DE" sz="3600" i="1" dirty="0" err="1" smtClean="0">
+              <a:rPr lang="de-DE" sz="3600" i="1" dirty="0" smtClean="0">
                 <a:solidFill>
                   <a:schemeClr val="tx1"/>
                 </a:solidFill>
               </a:rPr>
-              <a:t>Injection</a:t>
-            </a:r>
-            <a:endParaRPr lang="en-US" altLang="de-DE" sz="3600" i="1" dirty="0" err="1" smtClean="0">
-              <a:solidFill>
-                <a:schemeClr val="tx1"/>
-              </a:solidFill>
-            </a:endParaRPr>
-          </a:p>
-          <a:p>
-            <a:pPr algn="ctr"/>
+              <a:t>Emergency </a:t>
+            </a:r>
             <a:r>
               <a:rPr lang="de-DE" sz="3600" i="1" dirty="0" err="1" smtClean="0">
                 <a:solidFill>
@@ -9327,114 +9335,13 @@
       </p:sp>
       <p:sp>
         <p:nvSpPr>
-          <p:cNvPr id="186" name="Rechteck 16"/>
-          <p:cNvSpPr/>
-          <p:nvPr/>
-        </p:nvSpPr>
-        <p:spPr>
-          <a:xfrm>
-            <a:off x="15034895" y="39237920"/>
-            <a:ext cx="2268855" cy="1077595"/>
-          </a:xfrm>
-          <a:prstGeom prst="rect">
-            <a:avLst/>
-          </a:prstGeom>
-          <a:solidFill>
-            <a:schemeClr val="bg1"/>
-          </a:solidFill>
-        </p:spPr>
-        <p:style>
-          <a:lnRef idx="2">
-            <a:schemeClr val="accent1">
-              <a:shade val="50000"/>
-            </a:schemeClr>
-          </a:lnRef>
-          <a:fillRef idx="1">
-            <a:schemeClr val="accent1"/>
-          </a:fillRef>
-          <a:effectRef idx="0">
-            <a:schemeClr val="accent1"/>
-          </a:effectRef>
-          <a:fontRef idx="minor">
-            <a:schemeClr val="lt1"/>
-          </a:fontRef>
-        </p:style>
-        <p:txBody>
-          <a:bodyPr rtlCol="0" anchor="ctr"/>
-          <a:p>
-            <a:pPr algn="ctr"/>
-            <a:r>
-              <a:rPr lang="de-DE" sz="3600" i="1" dirty="0" smtClean="0">
-                <a:solidFill>
-                  <a:schemeClr val="tx1"/>
-                </a:solidFill>
-              </a:rPr>
-              <a:t>Emergency </a:t>
-            </a:r>
-            <a:r>
-              <a:rPr lang="de-DE" sz="3600" i="1" dirty="0" err="1" smtClean="0">
-                <a:solidFill>
-                  <a:schemeClr val="tx1"/>
-                </a:solidFill>
-              </a:rPr>
-              <a:t>kicker</a:t>
-            </a:r>
-            <a:endParaRPr lang="de-DE" sz="3600" i="1" dirty="0">
-              <a:solidFill>
-                <a:schemeClr val="tx1"/>
-              </a:solidFill>
-            </a:endParaRPr>
-          </a:p>
-        </p:txBody>
-      </p:sp>
-      <p:cxnSp>
-        <p:nvCxnSpPr>
-          <p:cNvPr id="187" name="Gerade Verbindung mit Pfeil 15"/>
-          <p:cNvCxnSpPr>
-            <a:endCxn id="186" idx="1"/>
-          </p:cNvCxnSpPr>
-          <p:nvPr/>
-        </p:nvCxnSpPr>
-        <p:spPr>
-          <a:xfrm>
-            <a:off x="14074775" y="39776400"/>
-            <a:ext cx="960120" cy="635"/>
-          </a:xfrm>
-          <a:prstGeom prst="straightConnector1">
-            <a:avLst/>
-          </a:prstGeom>
-          <a:ln w="44450">
-            <a:solidFill>
-              <a:schemeClr val="tx1"/>
-            </a:solidFill>
-            <a:prstDash val="sysDash"/>
-            <a:tailEnd type="triangle"/>
-          </a:ln>
-        </p:spPr>
-        <p:style>
-          <a:lnRef idx="1">
-            <a:schemeClr val="accent1"/>
-          </a:lnRef>
-          <a:fillRef idx="0">
-            <a:schemeClr val="accent1"/>
-          </a:fillRef>
-          <a:effectRef idx="0">
-            <a:schemeClr val="accent1"/>
-          </a:effectRef>
-          <a:fontRef idx="minor">
-            <a:schemeClr val="tx1"/>
-          </a:fontRef>
-        </p:style>
-      </p:cxnSp>
-      <p:sp>
-        <p:nvSpPr>
           <p:cNvPr id="189" name="Textfeld 10"/>
           <p:cNvSpPr txBox="1"/>
           <p:nvPr/>
         </p:nvSpPr>
         <p:spPr>
           <a:xfrm>
-            <a:off x="14255115" y="39863395"/>
+            <a:off x="14319885" y="40121840"/>
             <a:ext cx="779780" cy="645160"/>
           </a:xfrm>
           <a:prstGeom prst="rect">
@@ -9471,26 +9378,512 @@
           </a:p>
         </p:txBody>
       </p:sp>
-      <p:cxnSp>
-        <p:nvCxnSpPr>
-          <p:cNvPr id="193" name="Gerade Verbindung mit Pfeil 15"/>
-          <p:cNvCxnSpPr/>
-          <p:nvPr/>
-        </p:nvCxnSpPr>
-        <p:spPr>
-          <a:xfrm>
-            <a:off x="14084935" y="39668450"/>
-            <a:ext cx="5080" cy="885190"/>
-          </a:xfrm>
-          <a:prstGeom prst="straightConnector1">
-            <a:avLst/>
-          </a:prstGeom>
-          <a:ln w="44450">
+      <p:sp>
+        <p:nvSpPr>
+          <p:cNvPr id="197" name="Textfeld 62"/>
+          <p:cNvSpPr txBox="1"/>
+          <p:nvPr/>
+        </p:nvSpPr>
+        <p:spPr>
+          <a:xfrm>
+            <a:off x="10050145" y="39401115"/>
+            <a:ext cx="4728845" cy="1742440"/>
+          </a:xfrm>
+          <a:prstGeom prst="rect">
+            <a:avLst/>
+          </a:prstGeom>
+          <a:noFill/>
+        </p:spPr>
+        <p:txBody>
+          <a:bodyPr wrap="square" rtlCol="0">
+            <a:spAutoFit/>
+          </a:bodyPr>
+          <a:p>
+            <a:r>
+              <a:rPr lang="en-US" sz="3600" i="1" dirty="0" err="1">
+                <a:effectLst>
+                  <a:outerShdw blurRad="38100" dist="38100" dir="2700000" algn="tl">
+                    <a:srgbClr val="000000">
+                      <a:alpha val="43137"/>
+                    </a:srgbClr>
+                  </a:outerShdw>
+                </a:effectLst>
+              </a:rPr>
+              <a:t>Beam injection time &amp; </a:t>
+            </a:r>
+            <a:endParaRPr lang="en-US" sz="3600" i="1" dirty="0" err="1">
+              <a:effectLst>
+                <a:outerShdw blurRad="38100" dist="38100" dir="2700000" algn="tl">
+                  <a:srgbClr val="000000">
+                    <a:alpha val="43137"/>
+                  </a:srgbClr>
+                </a:outerShdw>
+              </a:effectLst>
+            </a:endParaRPr>
+          </a:p>
+          <a:p>
+            <a:r>
+              <a:rPr lang="en-US" sz="3600" i="1" dirty="0" err="1">
+                <a:effectLst>
+                  <a:outerShdw blurRad="38100" dist="38100" dir="2700000" algn="tl">
+                    <a:srgbClr val="000000">
+                      <a:alpha val="43137"/>
+                    </a:srgbClr>
+                  </a:outerShdw>
+                </a:effectLst>
+              </a:rPr>
+              <a:t>injection kicker trigger time</a:t>
+            </a:r>
+            <a:endParaRPr lang="en-US" sz="3600" i="1" baseline="-25000" dirty="0">
+              <a:effectLst>
+                <a:outerShdw blurRad="38100" dist="38100" dir="2700000" algn="tl">
+                  <a:srgbClr val="000000">
+                    <a:alpha val="43137"/>
+                  </a:srgbClr>
+                </a:outerShdw>
+              </a:effectLst>
+            </a:endParaRPr>
+          </a:p>
+        </p:txBody>
+      </p:sp>
+      <p:sp>
+        <p:nvSpPr>
+          <p:cNvPr id="198" name="Rechteck 3"/>
+          <p:cNvSpPr/>
+          <p:nvPr/>
+        </p:nvSpPr>
+        <p:spPr>
+          <a:xfrm>
+            <a:off x="2584264" y="37477387"/>
+            <a:ext cx="5237143" cy="1492969"/>
+          </a:xfrm>
+          <a:prstGeom prst="rect">
+            <a:avLst/>
+          </a:prstGeom>
+          <a:solidFill>
+            <a:schemeClr val="bg1"/>
+          </a:solidFill>
+          <a:ln>
             <a:solidFill>
               <a:schemeClr val="tx1"/>
             </a:solidFill>
-            <a:prstDash val="sysDash"/>
-            <a:tailEnd type="triangle"/>
+          </a:ln>
+          <a:effectLst>
+            <a:outerShdw blurRad="50800" dist="38100" dir="2700000" algn="tl" rotWithShape="0">
+              <a:prstClr val="black">
+                <a:alpha val="40000"/>
+              </a:prstClr>
+            </a:outerShdw>
+          </a:effectLst>
+          <a:scene3d>
+            <a:camera prst="orthographicFront"/>
+            <a:lightRig rig="threePt" dir="t"/>
+          </a:scene3d>
+          <a:sp3d>
+            <a:bevelT/>
+          </a:sp3d>
+        </p:spPr>
+        <p:style>
+          <a:lnRef idx="2">
+            <a:schemeClr val="accent1">
+              <a:shade val="50000"/>
+            </a:schemeClr>
+          </a:lnRef>
+          <a:fillRef idx="1">
+            <a:schemeClr val="accent1"/>
+          </a:fillRef>
+          <a:effectRef idx="0">
+            <a:schemeClr val="accent1"/>
+          </a:effectRef>
+          <a:fontRef idx="minor">
+            <a:schemeClr val="lt1"/>
+          </a:fontRef>
+        </p:style>
+        <p:txBody>
+          <a:bodyPr rtlCol="0" anchor="ctr"/>
+          <a:p>
+            <a:pPr algn="ctr"/>
+            <a:endParaRPr lang="de-DE" sz="3600"/>
+          </a:p>
+        </p:txBody>
+      </p:sp>
+      <p:sp>
+        <p:nvSpPr>
+          <p:cNvPr id="199" name="Rechteck 4"/>
+          <p:cNvSpPr/>
+          <p:nvPr/>
+        </p:nvSpPr>
+        <p:spPr>
+          <a:xfrm>
+            <a:off x="2584450" y="37477700"/>
+            <a:ext cx="1706880" cy="1492885"/>
+          </a:xfrm>
+          <a:prstGeom prst="rect">
+            <a:avLst/>
+          </a:prstGeom>
+        </p:spPr>
+        <p:style>
+          <a:lnRef idx="2">
+            <a:schemeClr val="accent1">
+              <a:shade val="50000"/>
+            </a:schemeClr>
+          </a:lnRef>
+          <a:fillRef idx="1">
+            <a:schemeClr val="accent1"/>
+          </a:fillRef>
+          <a:effectRef idx="0">
+            <a:schemeClr val="accent1"/>
+          </a:effectRef>
+          <a:fontRef idx="minor">
+            <a:schemeClr val="lt1"/>
+          </a:fontRef>
+        </p:style>
+        <p:txBody>
+          <a:bodyPr rtlCol="0" anchor="ctr"/>
+          <a:p>
+            <a:pPr algn="ctr"/>
+            <a:r>
+              <a:rPr lang="de-DE" sz="3600" dirty="0" err="1" smtClean="0"/>
+              <a:t>Trigger</a:t>
+            </a:r>
+            <a:endParaRPr lang="de-DE" sz="3600" dirty="0" err="1" smtClean="0"/>
+          </a:p>
+          <a:p>
+            <a:pPr algn="ctr"/>
+            <a:r>
+              <a:rPr lang="de-DE" sz="3600" dirty="0" err="1" smtClean="0"/>
+              <a:t>SCU</a:t>
+            </a:r>
+            <a:endParaRPr lang="de-DE" sz="3600" dirty="0" err="1" smtClean="0"/>
+          </a:p>
+        </p:txBody>
+      </p:sp>
+      <p:sp>
+        <p:nvSpPr>
+          <p:cNvPr id="208" name="Textfeld 62"/>
+          <p:cNvSpPr txBox="1"/>
+          <p:nvPr/>
+        </p:nvSpPr>
+        <p:spPr>
+          <a:xfrm>
+            <a:off x="485140" y="39401115"/>
+            <a:ext cx="5030470" cy="1742440"/>
+          </a:xfrm>
+          <a:prstGeom prst="rect">
+            <a:avLst/>
+          </a:prstGeom>
+          <a:noFill/>
+        </p:spPr>
+        <p:txBody>
+          <a:bodyPr wrap="square" rtlCol="0">
+            <a:spAutoFit/>
+          </a:bodyPr>
+          <a:p>
+            <a:r>
+              <a:rPr lang="en-US" sz="3600" i="1" dirty="0" err="1">
+                <a:effectLst>
+                  <a:outerShdw blurRad="38100" dist="38100" dir="2700000" algn="tl">
+                    <a:srgbClr val="000000">
+                      <a:alpha val="43137"/>
+                    </a:srgbClr>
+                  </a:outerShdw>
+                </a:effectLst>
+              </a:rPr>
+              <a:t>Beam extraction time &amp; </a:t>
+            </a:r>
+            <a:endParaRPr lang="en-US" sz="3600" i="1" dirty="0" err="1">
+              <a:effectLst>
+                <a:outerShdw blurRad="38100" dist="38100" dir="2700000" algn="tl">
+                  <a:srgbClr val="000000">
+                    <a:alpha val="43137"/>
+                  </a:srgbClr>
+                </a:outerShdw>
+              </a:effectLst>
+            </a:endParaRPr>
+          </a:p>
+          <a:p>
+            <a:r>
+              <a:rPr lang="en-US" sz="3600" i="1" dirty="0" err="1">
+                <a:effectLst>
+                  <a:outerShdw blurRad="38100" dist="38100" dir="2700000" algn="tl">
+                    <a:srgbClr val="000000">
+                      <a:alpha val="43137"/>
+                    </a:srgbClr>
+                  </a:outerShdw>
+                </a:effectLst>
+              </a:rPr>
+              <a:t>extraction kicker trigger time</a:t>
+            </a:r>
+            <a:endParaRPr lang="en-US" sz="3600" i="1" baseline="-25000" dirty="0">
+              <a:effectLst>
+                <a:outerShdw blurRad="38100" dist="38100" dir="2700000" algn="tl">
+                  <a:srgbClr val="000000">
+                    <a:alpha val="43137"/>
+                  </a:srgbClr>
+                </a:outerShdw>
+              </a:effectLst>
+            </a:endParaRPr>
+          </a:p>
+        </p:txBody>
+      </p:sp>
+      <p:sp>
+        <p:nvSpPr>
+          <p:cNvPr id="209" name="Rechteck 14"/>
+          <p:cNvSpPr/>
+          <p:nvPr/>
+        </p:nvSpPr>
+        <p:spPr>
+          <a:xfrm>
+            <a:off x="6557010" y="40515540"/>
+            <a:ext cx="2098040" cy="1204595"/>
+          </a:xfrm>
+          <a:prstGeom prst="rect">
+            <a:avLst/>
+          </a:prstGeom>
+          <a:solidFill>
+            <a:schemeClr val="bg1"/>
+          </a:solidFill>
+        </p:spPr>
+        <p:style>
+          <a:lnRef idx="2">
+            <a:schemeClr val="accent1">
+              <a:shade val="50000"/>
+            </a:schemeClr>
+          </a:lnRef>
+          <a:fillRef idx="1">
+            <a:schemeClr val="accent1"/>
+          </a:fillRef>
+          <a:effectRef idx="0">
+            <a:schemeClr val="accent1"/>
+          </a:effectRef>
+          <a:fontRef idx="minor">
+            <a:schemeClr val="lt1"/>
+          </a:fontRef>
+        </p:style>
+        <p:txBody>
+          <a:bodyPr rtlCol="0" anchor="ctr"/>
+          <a:p>
+            <a:pPr algn="ctr"/>
+            <a:r>
+              <a:rPr lang="en-US" altLang="de-DE" sz="3600" i="1" dirty="0" err="1" smtClean="0">
+                <a:solidFill>
+                  <a:schemeClr val="tx1"/>
+                </a:solidFill>
+              </a:rPr>
+              <a:t>Extraction</a:t>
+            </a:r>
+            <a:endParaRPr lang="en-US" altLang="de-DE" sz="3600" i="1" dirty="0" err="1" smtClean="0">
+              <a:solidFill>
+                <a:schemeClr val="tx1"/>
+              </a:solidFill>
+            </a:endParaRPr>
+          </a:p>
+          <a:p>
+            <a:pPr algn="ctr"/>
+            <a:r>
+              <a:rPr lang="de-DE" sz="3600" i="1" dirty="0" err="1" smtClean="0">
+                <a:solidFill>
+                  <a:schemeClr val="tx1"/>
+                </a:solidFill>
+              </a:rPr>
+              <a:t>kicker</a:t>
+            </a:r>
+            <a:endParaRPr lang="de-DE" sz="3600" i="1" dirty="0">
+              <a:solidFill>
+                <a:schemeClr val="tx1"/>
+              </a:solidFill>
+            </a:endParaRPr>
+          </a:p>
+        </p:txBody>
+      </p:sp>
+      <p:sp>
+        <p:nvSpPr>
+          <p:cNvPr id="210" name="Rechteck 16"/>
+          <p:cNvSpPr/>
+          <p:nvPr/>
+        </p:nvSpPr>
+        <p:spPr>
+          <a:xfrm>
+            <a:off x="6539230" y="39237920"/>
+            <a:ext cx="2453640" cy="1077595"/>
+          </a:xfrm>
+          <a:prstGeom prst="rect">
+            <a:avLst/>
+          </a:prstGeom>
+          <a:solidFill>
+            <a:schemeClr val="bg1"/>
+          </a:solidFill>
+        </p:spPr>
+        <p:style>
+          <a:lnRef idx="2">
+            <a:schemeClr val="accent1">
+              <a:shade val="50000"/>
+            </a:schemeClr>
+          </a:lnRef>
+          <a:fillRef idx="1">
+            <a:schemeClr val="accent1"/>
+          </a:fillRef>
+          <a:effectRef idx="0">
+            <a:schemeClr val="accent1"/>
+          </a:effectRef>
+          <a:fontRef idx="minor">
+            <a:schemeClr val="lt1"/>
+          </a:fontRef>
+        </p:style>
+        <p:txBody>
+          <a:bodyPr rtlCol="0" anchor="ctr"/>
+          <a:p>
+            <a:pPr algn="ctr"/>
+            <a:r>
+              <a:rPr lang="de-DE" sz="3600" i="1" dirty="0" smtClean="0">
+                <a:solidFill>
+                  <a:schemeClr val="tx1"/>
+                </a:solidFill>
+              </a:rPr>
+              <a:t>Emergency </a:t>
+            </a:r>
+            <a:r>
+              <a:rPr lang="de-DE" sz="3600" i="1" dirty="0" err="1" smtClean="0">
+                <a:solidFill>
+                  <a:schemeClr val="tx1"/>
+                </a:solidFill>
+              </a:rPr>
+              <a:t>kicker</a:t>
+            </a:r>
+            <a:endParaRPr lang="de-DE" sz="3600" i="1" dirty="0">
+              <a:solidFill>
+                <a:schemeClr val="tx1"/>
+              </a:solidFill>
+            </a:endParaRPr>
+          </a:p>
+        </p:txBody>
+      </p:sp>
+      <p:sp>
+        <p:nvSpPr>
+          <p:cNvPr id="212" name="Textfeld 10"/>
+          <p:cNvSpPr txBox="1"/>
+          <p:nvPr/>
+        </p:nvSpPr>
+        <p:spPr>
+          <a:xfrm>
+            <a:off x="5759450" y="39863395"/>
+            <a:ext cx="779780" cy="645160"/>
+          </a:xfrm>
+          <a:prstGeom prst="rect">
+            <a:avLst/>
+          </a:prstGeom>
+          <a:noFill/>
+        </p:spPr>
+        <p:txBody>
+          <a:bodyPr wrap="square" rtlCol="0">
+            <a:spAutoFit/>
+          </a:bodyPr>
+          <a:p>
+            <a:r>
+              <a:rPr lang="en-US" altLang="de-DE" sz="3600" i="1" dirty="0" err="1" smtClean="0">
+                <a:effectLst>
+                  <a:outerShdw blurRad="38100" dist="38100" dir="2700000" algn="tl">
+                    <a:srgbClr val="000000">
+                      <a:alpha val="43137"/>
+                    </a:srgbClr>
+                  </a:outerShdw>
+                </a:effectLst>
+              </a:rPr>
+              <a:t>or</a:t>
+            </a:r>
+            <a:endParaRPr lang="en-US" altLang="de-DE" sz="3600" i="1" dirty="0" err="1" smtClean="0">
+              <a:effectLst>
+                <a:outerShdw blurRad="38100" dist="38100" dir="2700000" algn="tl">
+                  <a:srgbClr val="000000">
+                    <a:alpha val="43137"/>
+                  </a:srgbClr>
+                </a:outerShdw>
+              </a:effectLst>
+            </a:endParaRPr>
+          </a:p>
+        </p:txBody>
+      </p:sp>
+      <p:sp>
+        <p:nvSpPr>
+          <p:cNvPr id="217" name="云形 216"/>
+          <p:cNvSpPr/>
+          <p:nvPr/>
+        </p:nvSpPr>
+        <p:spPr>
+          <a:xfrm>
+            <a:off x="7828280" y="35903535"/>
+            <a:ext cx="2710180" cy="1764665"/>
+          </a:xfrm>
+          <a:prstGeom prst="cloud">
+            <a:avLst/>
+          </a:prstGeom>
+          <a:noFill/>
+          <a:extLst>
+            <a:ext uri="{909E8E84-426E-40DD-AFC4-6F175D3DCCD1}">
+              <a14:hiddenFill xmlns:a14="http://schemas.microsoft.com/office/drawing/2010/main">
+                <a:solidFill>
+                  <a:schemeClr val="accent1"/>
+                </a:solidFill>
+              </a14:hiddenFill>
+            </a:ext>
+          </a:extLst>
+        </p:spPr>
+        <p:style>
+          <a:lnRef idx="2">
+            <a:schemeClr val="accent1">
+              <a:shade val="50000"/>
+            </a:schemeClr>
+          </a:lnRef>
+          <a:fillRef idx="1">
+            <a:schemeClr val="accent1"/>
+          </a:fillRef>
+          <a:effectRef idx="0">
+            <a:schemeClr val="accent1"/>
+          </a:effectRef>
+          <a:fontRef idx="minor">
+            <a:schemeClr val="lt1"/>
+          </a:fontRef>
+        </p:style>
+        <p:txBody>
+          <a:bodyPr rtlCol="0" anchor="ctr"/>
+          <a:p>
+            <a:pPr algn="ctr"/>
+            <a:r>
+              <a:rPr lang="en-US" altLang="zh-CN" sz="3600">
+                <a:solidFill>
+                  <a:schemeClr val="tx1"/>
+                </a:solidFill>
+              </a:rPr>
+              <a:t>WR network</a:t>
+            </a:r>
+            <a:endParaRPr lang="en-US" altLang="zh-CN" sz="3600">
+              <a:solidFill>
+                <a:schemeClr val="tx1"/>
+              </a:solidFill>
+            </a:endParaRPr>
+          </a:p>
+        </p:txBody>
+      </p:sp>
+      <p:cxnSp>
+        <p:nvCxnSpPr>
+          <p:cNvPr id="218" name="肘形连接符 217"/>
+          <p:cNvCxnSpPr/>
+          <p:nvPr/>
+        </p:nvCxnSpPr>
+        <p:spPr>
+          <a:xfrm rot="10800000" flipV="1">
+            <a:off x="3453765" y="36786185"/>
+            <a:ext cx="4398645" cy="691515"/>
+          </a:xfrm>
+          <a:prstGeom prst="bentConnector2">
+            <a:avLst/>
+          </a:prstGeom>
+          <a:ln w="38100">
+            <a:solidFill>
+              <a:schemeClr val="tx1"/>
+            </a:solidFill>
+            <a:headEnd type="arrow"/>
+            <a:tailEnd type="none"/>
           </a:ln>
         </p:spPr>
         <p:style>
@@ -9510,29 +9903,34 @@
       </p:cxnSp>
       <p:cxnSp>
         <p:nvCxnSpPr>
-          <p:cNvPr id="194" name="直接连接符 193"/>
+          <p:cNvPr id="219" name="肘形连接符 218"/>
           <p:cNvCxnSpPr/>
           <p:nvPr/>
         </p:nvCxnSpPr>
         <p:spPr>
-          <a:xfrm flipH="1">
-            <a:off x="14070930" y="38976582"/>
-            <a:ext cx="3810" cy="692190"/>
-          </a:xfrm>
-          <a:prstGeom prst="line">
-            <a:avLst/>
-          </a:prstGeom>
-          <a:ln w="38100"/>
+          <a:xfrm rot="16200000" flipV="1">
+            <a:off x="10918825" y="36567110"/>
+            <a:ext cx="533400" cy="1294130"/>
+          </a:xfrm>
+          <a:prstGeom prst="bentConnector2">
+            <a:avLst/>
+          </a:prstGeom>
+          <a:ln w="38100">
+            <a:solidFill>
+              <a:schemeClr val="tx1"/>
+            </a:solidFill>
+            <a:tailEnd type="arrow"/>
+          </a:ln>
         </p:spPr>
         <p:style>
-          <a:lnRef idx="3">
-            <a:schemeClr val="dk1"/>
+          <a:lnRef idx="1">
+            <a:schemeClr val="accent1"/>
           </a:lnRef>
           <a:fillRef idx="0">
-            <a:schemeClr val="dk1"/>
+            <a:schemeClr val="accent1"/>
           </a:fillRef>
-          <a:effectRef idx="2">
-            <a:schemeClr val="dk1"/>
+          <a:effectRef idx="0">
+            <a:schemeClr val="accent1"/>
           </a:effectRef>
           <a:fontRef idx="minor">
             <a:schemeClr val="tx1"/>
@@ -9541,14 +9939,557 @@
       </p:cxnSp>
       <p:sp>
         <p:nvSpPr>
-          <p:cNvPr id="196" name="任意多边形 195"/>
+          <p:cNvPr id="220" name="文本框 219"/>
+          <p:cNvSpPr txBox="1"/>
+          <p:nvPr/>
+        </p:nvSpPr>
+        <p:spPr>
+          <a:xfrm>
+            <a:off x="2458085" y="35998150"/>
+            <a:ext cx="5120640" cy="645160"/>
+          </a:xfrm>
+          <a:prstGeom prst="rect">
+            <a:avLst/>
+          </a:prstGeom>
+          <a:noFill/>
+        </p:spPr>
+        <p:txBody>
+          <a:bodyPr wrap="square" rtlCol="0">
+            <a:spAutoFit/>
+          </a:bodyPr>
+          <a:p>
+            <a:r>
+              <a:rPr lang="en-US" altLang="zh-CN" sz="3600">
+                <a:sym typeface="+mn-ea"/>
+              </a:rPr>
+              <a:t>TGM_KICKER_TRIGGER_S</a:t>
+            </a:r>
+            <a:endParaRPr lang="en-US" altLang="zh-CN" sz="3600">
+              <a:sym typeface="+mn-ea"/>
+            </a:endParaRPr>
+          </a:p>
+        </p:txBody>
+      </p:sp>
+      <p:sp>
+        <p:nvSpPr>
+          <p:cNvPr id="223" name="文本框 222"/>
+          <p:cNvSpPr txBox="1"/>
+          <p:nvPr/>
+        </p:nvSpPr>
+        <p:spPr>
+          <a:xfrm>
+            <a:off x="10772140" y="36312475"/>
+            <a:ext cx="5524500" cy="645160"/>
+          </a:xfrm>
+          <a:prstGeom prst="rect">
+            <a:avLst/>
+          </a:prstGeom>
+          <a:noFill/>
+        </p:spPr>
+        <p:txBody>
+          <a:bodyPr wrap="square" rtlCol="0">
+            <a:spAutoFit/>
+          </a:bodyPr>
+          <a:p>
+            <a:r>
+              <a:rPr lang="en-US" altLang="zh-CN" sz="3600">
+                <a:sym typeface="+mn-ea"/>
+              </a:rPr>
+              <a:t>TGM_KICKER_TRIGGER_T</a:t>
+            </a:r>
+            <a:endParaRPr lang="en-US" altLang="zh-CN" sz="3600">
+              <a:sym typeface="+mn-ea"/>
+            </a:endParaRPr>
+          </a:p>
+        </p:txBody>
+      </p:sp>
+      <p:sp>
+        <p:nvSpPr>
+          <p:cNvPr id="224" name="Rechteck 3"/>
           <p:cNvSpPr/>
           <p:nvPr/>
         </p:nvSpPr>
         <p:spPr>
-          <a:xfrm flipH="1" flipV="1">
-            <a:off x="11670030" y="38709600"/>
-            <a:ext cx="2145665" cy="691515"/>
+          <a:xfrm>
+            <a:off x="2512509" y="33006987"/>
+            <a:ext cx="5237143" cy="1492969"/>
+          </a:xfrm>
+          <a:prstGeom prst="rect">
+            <a:avLst/>
+          </a:prstGeom>
+          <a:solidFill>
+            <a:schemeClr val="bg1"/>
+          </a:solidFill>
+          <a:ln>
+            <a:solidFill>
+              <a:schemeClr val="tx1"/>
+            </a:solidFill>
+          </a:ln>
+          <a:effectLst>
+            <a:outerShdw blurRad="50800" dist="38100" dir="2700000" algn="tl" rotWithShape="0">
+              <a:prstClr val="black">
+                <a:alpha val="40000"/>
+              </a:prstClr>
+            </a:outerShdw>
+          </a:effectLst>
+          <a:scene3d>
+            <a:camera prst="orthographicFront"/>
+            <a:lightRig rig="threePt" dir="t"/>
+          </a:scene3d>
+          <a:sp3d>
+            <a:bevelT/>
+          </a:sp3d>
+        </p:spPr>
+        <p:style>
+          <a:lnRef idx="2">
+            <a:schemeClr val="accent1">
+              <a:shade val="50000"/>
+            </a:schemeClr>
+          </a:lnRef>
+          <a:fillRef idx="1">
+            <a:schemeClr val="accent1"/>
+          </a:fillRef>
+          <a:effectRef idx="0">
+            <a:schemeClr val="accent1"/>
+          </a:effectRef>
+          <a:fontRef idx="minor">
+            <a:schemeClr val="lt1"/>
+          </a:fontRef>
+        </p:style>
+        <p:txBody>
+          <a:bodyPr rtlCol="0" anchor="ctr"/>
+          <a:p>
+            <a:pPr algn="ctr"/>
+            <a:endParaRPr lang="de-DE" sz="3600"/>
+          </a:p>
+        </p:txBody>
+      </p:sp>
+      <p:sp>
+        <p:nvSpPr>
+          <p:cNvPr id="225" name="Rechteck 4"/>
+          <p:cNvSpPr/>
+          <p:nvPr/>
+        </p:nvSpPr>
+        <p:spPr>
+          <a:xfrm>
+            <a:off x="2512695" y="33007300"/>
+            <a:ext cx="1672590" cy="1492885"/>
+          </a:xfrm>
+          <a:prstGeom prst="rect">
+            <a:avLst/>
+          </a:prstGeom>
+        </p:spPr>
+        <p:style>
+          <a:lnRef idx="2">
+            <a:schemeClr val="accent1">
+              <a:shade val="50000"/>
+            </a:schemeClr>
+          </a:lnRef>
+          <a:fillRef idx="1">
+            <a:schemeClr val="accent1"/>
+          </a:fillRef>
+          <a:effectRef idx="0">
+            <a:schemeClr val="accent1"/>
+          </a:effectRef>
+          <a:fontRef idx="minor">
+            <a:schemeClr val="lt1"/>
+          </a:fontRef>
+        </p:style>
+        <p:txBody>
+          <a:bodyPr rtlCol="0" anchor="ctr"/>
+          <a:p>
+            <a:pPr algn="ctr"/>
+            <a:r>
+              <a:rPr lang="en-US" altLang="de-DE" sz="3600" dirty="0" err="1" smtClean="0"/>
+              <a:t>B2B source SCU</a:t>
+            </a:r>
+            <a:endParaRPr lang="en-US" altLang="de-DE" sz="3600" dirty="0" err="1" smtClean="0"/>
+          </a:p>
+        </p:txBody>
+      </p:sp>
+      <p:cxnSp>
+        <p:nvCxnSpPr>
+          <p:cNvPr id="227" name="肘形连接符 226"/>
+          <p:cNvCxnSpPr>
+            <a:stCxn id="217" idx="3"/>
+            <a:endCxn id="225" idx="2"/>
+          </p:cNvCxnSpPr>
+          <p:nvPr/>
+        </p:nvCxnSpPr>
+        <p:spPr>
+          <a:xfrm rot="16200000" flipV="1">
+            <a:off x="5514023" y="32335153"/>
+            <a:ext cx="1504315" cy="5834380"/>
+          </a:xfrm>
+          <a:prstGeom prst="bentConnector3">
+            <a:avLst>
+              <a:gd name="adj1" fmla="val 53377"/>
+            </a:avLst>
+          </a:prstGeom>
+          <a:ln w="38100">
+            <a:solidFill>
+              <a:schemeClr val="tx1"/>
+            </a:solidFill>
+            <a:tailEnd type="arrow"/>
+          </a:ln>
+        </p:spPr>
+        <p:style>
+          <a:lnRef idx="1">
+            <a:schemeClr val="accent1"/>
+          </a:lnRef>
+          <a:fillRef idx="0">
+            <a:schemeClr val="accent1"/>
+          </a:fillRef>
+          <a:effectRef idx="0">
+            <a:schemeClr val="accent1"/>
+          </a:effectRef>
+          <a:fontRef idx="minor">
+            <a:schemeClr val="tx1"/>
+          </a:fontRef>
+        </p:style>
+      </p:cxnSp>
+      <p:cxnSp>
+        <p:nvCxnSpPr>
+          <p:cNvPr id="228" name="肘形连接符 227"/>
+          <p:cNvCxnSpPr/>
+          <p:nvPr/>
+        </p:nvCxnSpPr>
+        <p:spPr>
+          <a:xfrm rot="10800000">
+            <a:off x="3348990" y="33007300"/>
+            <a:ext cx="6353175" cy="2622550"/>
+          </a:xfrm>
+          <a:prstGeom prst="bentConnector4">
+            <a:avLst>
+              <a:gd name="adj1" fmla="val -89"/>
+              <a:gd name="adj2" fmla="val 109080"/>
+            </a:avLst>
+          </a:prstGeom>
+          <a:ln w="38100">
+            <a:solidFill>
+              <a:srgbClr val="FF0000"/>
+            </a:solidFill>
+            <a:headEnd type="none"/>
+            <a:tailEnd type="none"/>
+          </a:ln>
+        </p:spPr>
+        <p:style>
+          <a:lnRef idx="1">
+            <a:schemeClr val="accent1"/>
+          </a:lnRef>
+          <a:fillRef idx="0">
+            <a:schemeClr val="accent1"/>
+          </a:fillRef>
+          <a:effectRef idx="0">
+            <a:schemeClr val="accent1"/>
+          </a:effectRef>
+          <a:fontRef idx="minor">
+            <a:schemeClr val="tx1"/>
+          </a:fontRef>
+        </p:style>
+      </p:cxnSp>
+      <p:sp>
+        <p:nvSpPr>
+          <p:cNvPr id="229" name="文本框 228"/>
+          <p:cNvSpPr txBox="1"/>
+          <p:nvPr/>
+        </p:nvSpPr>
+        <p:spPr>
+          <a:xfrm>
+            <a:off x="4631690" y="32047815"/>
+            <a:ext cx="3629025" cy="645160"/>
+          </a:xfrm>
+          <a:prstGeom prst="rect">
+            <a:avLst/>
+          </a:prstGeom>
+          <a:noFill/>
+        </p:spPr>
+        <p:txBody>
+          <a:bodyPr wrap="square" rtlCol="0">
+            <a:spAutoFit/>
+          </a:bodyPr>
+          <a:p>
+            <a:r>
+              <a:rPr lang="en-US" altLang="zh-CN" sz="3600"/>
+              <a:t>TGM_B2B_STATUS</a:t>
+            </a:r>
+            <a:endParaRPr lang="en-US" altLang="zh-CN" sz="3600"/>
+          </a:p>
+        </p:txBody>
+      </p:sp>
+      <p:cxnSp>
+        <p:nvCxnSpPr>
+          <p:cNvPr id="230" name="直接箭头连接符 229"/>
+          <p:cNvCxnSpPr/>
+          <p:nvPr/>
+        </p:nvCxnSpPr>
+        <p:spPr>
+          <a:xfrm flipV="1">
+            <a:off x="10186670" y="34523680"/>
+            <a:ext cx="1234440" cy="1960245"/>
+          </a:xfrm>
+          <a:prstGeom prst="straightConnector1">
+            <a:avLst/>
+          </a:prstGeom>
+          <a:ln w="38100">
+            <a:solidFill>
+              <a:srgbClr val="FF0000"/>
+            </a:solidFill>
+            <a:tailEnd type="arrow"/>
+          </a:ln>
+        </p:spPr>
+        <p:style>
+          <a:lnRef idx="1">
+            <a:schemeClr val="accent1"/>
+          </a:lnRef>
+          <a:fillRef idx="0">
+            <a:schemeClr val="accent1"/>
+          </a:fillRef>
+          <a:effectRef idx="0">
+            <a:schemeClr val="accent1"/>
+          </a:effectRef>
+          <a:fontRef idx="minor">
+            <a:schemeClr val="tx1"/>
+          </a:fontRef>
+        </p:style>
+      </p:cxnSp>
+      <p:sp>
+        <p:nvSpPr>
+          <p:cNvPr id="231" name="Rechteck 7"/>
+          <p:cNvSpPr/>
+          <p:nvPr/>
+        </p:nvSpPr>
+        <p:spPr>
+          <a:xfrm>
+            <a:off x="10937685" y="33800205"/>
+            <a:ext cx="1193935" cy="660475"/>
+          </a:xfrm>
+          <a:prstGeom prst="rect">
+            <a:avLst/>
+          </a:prstGeom>
+          <a:noFill/>
+          <a:ln>
+            <a:solidFill>
+              <a:schemeClr val="tx1"/>
+            </a:solidFill>
+          </a:ln>
+        </p:spPr>
+        <p:style>
+          <a:lnRef idx="2">
+            <a:schemeClr val="accent1">
+              <a:shade val="50000"/>
+            </a:schemeClr>
+          </a:lnRef>
+          <a:fillRef idx="1">
+            <a:schemeClr val="accent1"/>
+          </a:fillRef>
+          <a:effectRef idx="0">
+            <a:schemeClr val="accent1"/>
+          </a:effectRef>
+          <a:fontRef idx="minor">
+            <a:schemeClr val="lt1"/>
+          </a:fontRef>
+        </p:style>
+        <p:txBody>
+          <a:bodyPr rtlCol="0" anchor="ctr"/>
+          <a:p>
+            <a:pPr algn="ctr"/>
+            <a:r>
+              <a:rPr lang="en-US" altLang="zh-CN" sz="3600">
+                <a:solidFill>
+                  <a:schemeClr val="tx1"/>
+                </a:solidFill>
+              </a:rPr>
+              <a:t>DM</a:t>
+            </a:r>
+            <a:endParaRPr lang="en-US" altLang="zh-CN" sz="3600">
+              <a:solidFill>
+                <a:schemeClr val="tx1"/>
+              </a:solidFill>
+            </a:endParaRPr>
+          </a:p>
+        </p:txBody>
+      </p:sp>
+      <p:sp>
+        <p:nvSpPr>
+          <p:cNvPr id="243" name="矩形 242"/>
+          <p:cNvSpPr/>
+          <p:nvPr/>
+        </p:nvSpPr>
+        <p:spPr>
+          <a:xfrm>
+            <a:off x="2992121" y="471805"/>
+            <a:ext cx="2717800" cy="1316355"/>
+          </a:xfrm>
+          <a:prstGeom prst="rect">
+            <a:avLst/>
+          </a:prstGeom>
+          <a:noFill/>
+          <a:ln>
+            <a:noFill/>
+          </a:ln>
+        </p:spPr>
+        <p:txBody>
+          <a:bodyPr wrap="none" rtlCol="0" anchor="t">
+            <a:spAutoFit/>
+          </a:bodyPr>
+          <a:p>
+            <a:pPr algn="ctr"/>
+            <a:r>
+              <a:rPr lang="en-US" altLang="zh-CN" sz="4000" b="1">
+                <a:solidFill>
+                  <a:schemeClr val="tx1"/>
+                </a:solidFill>
+                <a:effectLst>
+                  <a:outerShdw blurRad="38100" dist="19050" dir="2700000" algn="tl" rotWithShape="0">
+                    <a:schemeClr val="dk1">
+                      <a:alpha val="40000"/>
+                    </a:schemeClr>
+                  </a:outerShdw>
+                </a:effectLst>
+              </a:rPr>
+              <a:t>Source </a:t>
+            </a:r>
+            <a:endParaRPr lang="en-US" altLang="zh-CN" sz="4000" b="1">
+              <a:solidFill>
+                <a:schemeClr val="tx1"/>
+              </a:solidFill>
+              <a:effectLst>
+                <a:outerShdw blurRad="38100" dist="19050" dir="2700000" algn="tl" rotWithShape="0">
+                  <a:schemeClr val="dk1">
+                    <a:alpha val="40000"/>
+                  </a:schemeClr>
+                </a:outerShdw>
+              </a:effectLst>
+            </a:endParaRPr>
+          </a:p>
+          <a:p>
+            <a:pPr algn="ctr"/>
+            <a:r>
+              <a:rPr lang="en-US" altLang="zh-CN" sz="4000" b="1">
+                <a:solidFill>
+                  <a:schemeClr val="tx1"/>
+                </a:solidFill>
+                <a:effectLst>
+                  <a:outerShdw blurRad="38100" dist="19050" dir="2700000" algn="tl" rotWithShape="0">
+                    <a:schemeClr val="dk1">
+                      <a:alpha val="40000"/>
+                    </a:schemeClr>
+                  </a:outerShdw>
+                </a:effectLst>
+              </a:rPr>
+              <a:t>synchrotron</a:t>
+            </a:r>
+            <a:endParaRPr lang="en-US" altLang="zh-CN" sz="4000" b="1">
+              <a:solidFill>
+                <a:schemeClr val="tx1"/>
+              </a:solidFill>
+              <a:effectLst>
+                <a:outerShdw blurRad="38100" dist="19050" dir="2700000" algn="tl" rotWithShape="0">
+                  <a:schemeClr val="dk1">
+                    <a:alpha val="40000"/>
+                  </a:schemeClr>
+                </a:outerShdw>
+              </a:effectLst>
+            </a:endParaRPr>
+          </a:p>
+        </p:txBody>
+      </p:sp>
+      <p:sp>
+        <p:nvSpPr>
+          <p:cNvPr id="244" name="矩形 243"/>
+          <p:cNvSpPr/>
+          <p:nvPr/>
+        </p:nvSpPr>
+        <p:spPr>
+          <a:xfrm>
+            <a:off x="12057381" y="471805"/>
+            <a:ext cx="2717800" cy="1316355"/>
+          </a:xfrm>
+          <a:prstGeom prst="rect">
+            <a:avLst/>
+          </a:prstGeom>
+          <a:noFill/>
+          <a:ln>
+            <a:noFill/>
+          </a:ln>
+        </p:spPr>
+        <p:txBody>
+          <a:bodyPr wrap="none" rtlCol="0" anchor="t">
+            <a:spAutoFit/>
+          </a:bodyPr>
+          <a:p>
+            <a:pPr algn="ctr"/>
+            <a:r>
+              <a:rPr lang="en-US" altLang="zh-CN" sz="4000" b="1">
+                <a:solidFill>
+                  <a:schemeClr val="tx1"/>
+                </a:solidFill>
+                <a:effectLst>
+                  <a:outerShdw blurRad="38100" dist="19050" dir="2700000" algn="tl" rotWithShape="0">
+                    <a:schemeClr val="dk1">
+                      <a:alpha val="40000"/>
+                    </a:schemeClr>
+                  </a:outerShdw>
+                </a:effectLst>
+              </a:rPr>
+              <a:t>Target</a:t>
+            </a:r>
+            <a:endParaRPr lang="en-US" altLang="zh-CN" sz="4000" b="1">
+              <a:solidFill>
+                <a:schemeClr val="tx1"/>
+              </a:solidFill>
+              <a:effectLst>
+                <a:outerShdw blurRad="38100" dist="19050" dir="2700000" algn="tl" rotWithShape="0">
+                  <a:schemeClr val="dk1">
+                    <a:alpha val="40000"/>
+                  </a:schemeClr>
+                </a:outerShdw>
+              </a:effectLst>
+            </a:endParaRPr>
+          </a:p>
+          <a:p>
+            <a:pPr algn="ctr"/>
+            <a:r>
+              <a:rPr lang="en-US" altLang="zh-CN" sz="4000" b="1">
+                <a:solidFill>
+                  <a:schemeClr val="tx1"/>
+                </a:solidFill>
+                <a:effectLst>
+                  <a:outerShdw blurRad="38100" dist="19050" dir="2700000" algn="tl" rotWithShape="0">
+                    <a:schemeClr val="dk1">
+                      <a:alpha val="40000"/>
+                    </a:schemeClr>
+                  </a:outerShdw>
+                </a:effectLst>
+              </a:rPr>
+              <a:t>synchrotron</a:t>
+            </a:r>
+            <a:endParaRPr lang="en-US" altLang="zh-CN" sz="4000" b="1">
+              <a:solidFill>
+                <a:schemeClr val="tx1"/>
+              </a:solidFill>
+              <a:effectLst>
+                <a:outerShdw blurRad="38100" dist="19050" dir="2700000" algn="tl" rotWithShape="0">
+                  <a:schemeClr val="dk1">
+                    <a:alpha val="40000"/>
+                  </a:schemeClr>
+                </a:outerShdw>
+              </a:effectLst>
+            </a:endParaRPr>
+          </a:p>
+        </p:txBody>
+      </p:sp>
+      <p:sp>
+        <p:nvSpPr>
+          <p:cNvPr id="245" name="任意多边形 244"/>
+          <p:cNvSpPr/>
+          <p:nvPr/>
+        </p:nvSpPr>
+        <p:spPr>
+          <a:xfrm>
+            <a:off x="5052060" y="21877655"/>
+            <a:ext cx="1607820" cy="527050"/>
           </a:xfrm>
           <a:custGeom>
             <a:avLst/>
@@ -9625,600 +10566,14 @@
       </p:sp>
       <p:sp>
         <p:nvSpPr>
-          <p:cNvPr id="197" name="Textfeld 62"/>
-          <p:cNvSpPr txBox="1"/>
-          <p:nvPr/>
-        </p:nvSpPr>
-        <p:spPr>
-          <a:xfrm>
-            <a:off x="9245600" y="39462710"/>
-            <a:ext cx="4728845" cy="1742440"/>
-          </a:xfrm>
-          <a:prstGeom prst="rect">
-            <a:avLst/>
-          </a:prstGeom>
-          <a:noFill/>
-        </p:spPr>
-        <p:txBody>
-          <a:bodyPr wrap="square" rtlCol="0">
-            <a:spAutoFit/>
-          </a:bodyPr>
-          <a:p>
-            <a:r>
-              <a:rPr lang="en-US" sz="3600" i="1" dirty="0" err="1">
-                <a:effectLst>
-                  <a:outerShdw blurRad="38100" dist="38100" dir="2700000" algn="tl">
-                    <a:srgbClr val="000000">
-                      <a:alpha val="43137"/>
-                    </a:srgbClr>
-                  </a:outerShdw>
-                </a:effectLst>
-              </a:rPr>
-              <a:t>Beam injection time &amp; </a:t>
-            </a:r>
-            <a:endParaRPr lang="en-US" sz="3600" i="1" dirty="0" err="1">
-              <a:effectLst>
-                <a:outerShdw blurRad="38100" dist="38100" dir="2700000" algn="tl">
-                  <a:srgbClr val="000000">
-                    <a:alpha val="43137"/>
-                  </a:srgbClr>
-                </a:outerShdw>
-              </a:effectLst>
-            </a:endParaRPr>
-          </a:p>
-          <a:p>
-            <a:r>
-              <a:rPr lang="en-US" sz="3600" i="1" dirty="0" err="1">
-                <a:effectLst>
-                  <a:outerShdw blurRad="38100" dist="38100" dir="2700000" algn="tl">
-                    <a:srgbClr val="000000">
-                      <a:alpha val="43137"/>
-                    </a:srgbClr>
-                  </a:outerShdw>
-                </a:effectLst>
-              </a:rPr>
-              <a:t>injection kicker trigger time</a:t>
-            </a:r>
-            <a:endParaRPr lang="en-US" sz="3600" i="1" baseline="-25000" dirty="0">
-              <a:effectLst>
-                <a:outerShdw blurRad="38100" dist="38100" dir="2700000" algn="tl">
-                  <a:srgbClr val="000000">
-                    <a:alpha val="43137"/>
-                  </a:srgbClr>
-                </a:outerShdw>
-              </a:effectLst>
-            </a:endParaRPr>
-          </a:p>
-        </p:txBody>
-      </p:sp>
-      <p:sp>
-        <p:nvSpPr>
-          <p:cNvPr id="198" name="Rechteck 3"/>
+          <p:cNvPr id="246" name="任意多边形 245"/>
           <p:cNvSpPr/>
           <p:nvPr/>
         </p:nvSpPr>
         <p:spPr>
           <a:xfrm>
-            <a:off x="2584264" y="37477387"/>
-            <a:ext cx="5237143" cy="1492969"/>
-          </a:xfrm>
-          <a:prstGeom prst="rect">
-            <a:avLst/>
-          </a:prstGeom>
-          <a:solidFill>
-            <a:schemeClr val="bg1"/>
-          </a:solidFill>
-          <a:ln>
-            <a:solidFill>
-              <a:schemeClr val="tx1"/>
-            </a:solidFill>
-          </a:ln>
-          <a:effectLst>
-            <a:outerShdw blurRad="50800" dist="38100" dir="2700000" algn="tl" rotWithShape="0">
-              <a:prstClr val="black">
-                <a:alpha val="40000"/>
-              </a:prstClr>
-            </a:outerShdw>
-          </a:effectLst>
-          <a:scene3d>
-            <a:camera prst="orthographicFront"/>
-            <a:lightRig rig="threePt" dir="t"/>
-          </a:scene3d>
-          <a:sp3d>
-            <a:bevelT/>
-          </a:sp3d>
-        </p:spPr>
-        <p:style>
-          <a:lnRef idx="2">
-            <a:schemeClr val="accent1">
-              <a:shade val="50000"/>
-            </a:schemeClr>
-          </a:lnRef>
-          <a:fillRef idx="1">
-            <a:schemeClr val="accent1"/>
-          </a:fillRef>
-          <a:effectRef idx="0">
-            <a:schemeClr val="accent1"/>
-          </a:effectRef>
-          <a:fontRef idx="minor">
-            <a:schemeClr val="lt1"/>
-          </a:fontRef>
-        </p:style>
-        <p:txBody>
-          <a:bodyPr rtlCol="0" anchor="ctr"/>
-          <a:p>
-            <a:pPr algn="ctr"/>
-            <a:endParaRPr lang="de-DE" sz="3600"/>
-          </a:p>
-        </p:txBody>
-      </p:sp>
-      <p:sp>
-        <p:nvSpPr>
-          <p:cNvPr id="199" name="Rechteck 4"/>
-          <p:cNvSpPr/>
-          <p:nvPr/>
-        </p:nvSpPr>
-        <p:spPr>
-          <a:xfrm>
-            <a:off x="2584450" y="37477700"/>
-            <a:ext cx="1706880" cy="1492885"/>
-          </a:xfrm>
-          <a:prstGeom prst="rect">
-            <a:avLst/>
-          </a:prstGeom>
-        </p:spPr>
-        <p:style>
-          <a:lnRef idx="2">
-            <a:schemeClr val="accent1">
-              <a:shade val="50000"/>
-            </a:schemeClr>
-          </a:lnRef>
-          <a:fillRef idx="1">
-            <a:schemeClr val="accent1"/>
-          </a:fillRef>
-          <a:effectRef idx="0">
-            <a:schemeClr val="accent1"/>
-          </a:effectRef>
-          <a:fontRef idx="minor">
-            <a:schemeClr val="lt1"/>
-          </a:fontRef>
-        </p:style>
-        <p:txBody>
-          <a:bodyPr rtlCol="0" anchor="ctr"/>
-          <a:p>
-            <a:pPr algn="ctr"/>
-            <a:r>
-              <a:rPr lang="de-DE" sz="3600" dirty="0" err="1" smtClean="0"/>
-              <a:t>Trigger</a:t>
-            </a:r>
-            <a:endParaRPr lang="de-DE" sz="3600" dirty="0" err="1" smtClean="0"/>
-          </a:p>
-          <a:p>
-            <a:pPr algn="ctr"/>
-            <a:r>
-              <a:rPr lang="de-DE" sz="3600" dirty="0" err="1" smtClean="0"/>
-              <a:t>SCU</a:t>
-            </a:r>
-            <a:endParaRPr lang="de-DE" sz="3600" dirty="0" err="1" smtClean="0"/>
-          </a:p>
-        </p:txBody>
-      </p:sp>
-      <p:sp>
-        <p:nvSpPr>
-          <p:cNvPr id="200" name="Rechteck 12"/>
-          <p:cNvSpPr/>
-          <p:nvPr/>
-        </p:nvSpPr>
-        <p:spPr>
-          <a:xfrm>
-            <a:off x="4983015" y="37480701"/>
-            <a:ext cx="1076585" cy="1495293"/>
-          </a:xfrm>
-          <a:prstGeom prst="rect">
-            <a:avLst/>
-          </a:prstGeom>
-          <a:solidFill>
-            <a:schemeClr val="bg1"/>
-          </a:solidFill>
-        </p:spPr>
-        <p:style>
-          <a:lnRef idx="2">
-            <a:schemeClr val="accent1">
-              <a:shade val="50000"/>
-            </a:schemeClr>
-          </a:lnRef>
-          <a:fillRef idx="1">
-            <a:schemeClr val="accent1"/>
-          </a:fillRef>
-          <a:effectRef idx="0">
-            <a:schemeClr val="accent1"/>
-          </a:effectRef>
-          <a:fontRef idx="minor">
-            <a:schemeClr val="lt1"/>
-          </a:fontRef>
-        </p:style>
-        <p:txBody>
-          <a:bodyPr rtlCol="0" anchor="ctr"/>
-          <a:p>
-            <a:pPr algn="ctr"/>
-            <a:r>
-              <a:rPr lang="de-DE" sz="3600" i="1" dirty="0" smtClean="0">
-                <a:solidFill>
-                  <a:schemeClr val="tx1"/>
-                </a:solidFill>
-              </a:rPr>
-              <a:t>TD</a:t>
-            </a:r>
-            <a:endParaRPr lang="de-DE" sz="3600" i="1" dirty="0" smtClean="0">
-              <a:solidFill>
-                <a:schemeClr val="tx1"/>
-              </a:solidFill>
-            </a:endParaRPr>
-          </a:p>
-        </p:txBody>
-      </p:sp>
-      <p:sp>
-        <p:nvSpPr>
-          <p:cNvPr id="208" name="Textfeld 62"/>
-          <p:cNvSpPr txBox="1"/>
-          <p:nvPr/>
-        </p:nvSpPr>
-        <p:spPr>
-          <a:xfrm>
-            <a:off x="865505" y="39429055"/>
-            <a:ext cx="5030470" cy="1742440"/>
-          </a:xfrm>
-          <a:prstGeom prst="rect">
-            <a:avLst/>
-          </a:prstGeom>
-          <a:noFill/>
-        </p:spPr>
-        <p:txBody>
-          <a:bodyPr wrap="square" rtlCol="0">
-            <a:spAutoFit/>
-          </a:bodyPr>
-          <a:p>
-            <a:r>
-              <a:rPr lang="en-US" sz="3600" i="1" dirty="0" err="1">
-                <a:effectLst>
-                  <a:outerShdw blurRad="38100" dist="38100" dir="2700000" algn="tl">
-                    <a:srgbClr val="000000">
-                      <a:alpha val="43137"/>
-                    </a:srgbClr>
-                  </a:outerShdw>
-                </a:effectLst>
-              </a:rPr>
-              <a:t>Beam extraction time &amp; </a:t>
-            </a:r>
-            <a:endParaRPr lang="en-US" sz="3600" i="1" dirty="0" err="1">
-              <a:effectLst>
-                <a:outerShdw blurRad="38100" dist="38100" dir="2700000" algn="tl">
-                  <a:srgbClr val="000000">
-                    <a:alpha val="43137"/>
-                  </a:srgbClr>
-                </a:outerShdw>
-              </a:effectLst>
-            </a:endParaRPr>
-          </a:p>
-          <a:p>
-            <a:r>
-              <a:rPr lang="en-US" sz="3600" i="1" dirty="0" err="1">
-                <a:effectLst>
-                  <a:outerShdw blurRad="38100" dist="38100" dir="2700000" algn="tl">
-                    <a:srgbClr val="000000">
-                      <a:alpha val="43137"/>
-                    </a:srgbClr>
-                  </a:outerShdw>
-                </a:effectLst>
-              </a:rPr>
-              <a:t>extraction kicker trigger time</a:t>
-            </a:r>
-            <a:endParaRPr lang="en-US" sz="3600" i="1" baseline="-25000" dirty="0">
-              <a:effectLst>
-                <a:outerShdw blurRad="38100" dist="38100" dir="2700000" algn="tl">
-                  <a:srgbClr val="000000">
-                    <a:alpha val="43137"/>
-                  </a:srgbClr>
-                </a:outerShdw>
-              </a:effectLst>
-            </a:endParaRPr>
-          </a:p>
-        </p:txBody>
-      </p:sp>
-      <p:sp>
-        <p:nvSpPr>
-          <p:cNvPr id="209" name="Rechteck 14"/>
-          <p:cNvSpPr/>
-          <p:nvPr/>
-        </p:nvSpPr>
-        <p:spPr>
-          <a:xfrm>
-            <a:off x="4604553" y="40515706"/>
-            <a:ext cx="1954005" cy="1204663"/>
-          </a:xfrm>
-          <a:prstGeom prst="rect">
-            <a:avLst/>
-          </a:prstGeom>
-          <a:solidFill>
-            <a:schemeClr val="bg1"/>
-          </a:solidFill>
-        </p:spPr>
-        <p:style>
-          <a:lnRef idx="2">
-            <a:schemeClr val="accent1">
-              <a:shade val="50000"/>
-            </a:schemeClr>
-          </a:lnRef>
-          <a:fillRef idx="1">
-            <a:schemeClr val="accent1"/>
-          </a:fillRef>
-          <a:effectRef idx="0">
-            <a:schemeClr val="accent1"/>
-          </a:effectRef>
-          <a:fontRef idx="minor">
-            <a:schemeClr val="lt1"/>
-          </a:fontRef>
-        </p:style>
-        <p:txBody>
-          <a:bodyPr rtlCol="0" anchor="ctr"/>
-          <a:p>
-            <a:pPr algn="ctr"/>
-            <a:r>
-              <a:rPr lang="en-US" altLang="de-DE" sz="3600" i="1" dirty="0" err="1" smtClean="0">
-                <a:solidFill>
-                  <a:schemeClr val="tx1"/>
-                </a:solidFill>
-              </a:rPr>
-              <a:t>Injection</a:t>
-            </a:r>
-            <a:endParaRPr lang="en-US" altLang="de-DE" sz="3600" i="1" dirty="0" err="1" smtClean="0">
-              <a:solidFill>
-                <a:schemeClr val="tx1"/>
-              </a:solidFill>
-            </a:endParaRPr>
-          </a:p>
-          <a:p>
-            <a:pPr algn="ctr"/>
-            <a:r>
-              <a:rPr lang="de-DE" sz="3600" i="1" dirty="0" err="1" smtClean="0">
-                <a:solidFill>
-                  <a:schemeClr val="tx1"/>
-                </a:solidFill>
-              </a:rPr>
-              <a:t>kicker</a:t>
-            </a:r>
-            <a:endParaRPr lang="de-DE" sz="3600" i="1" dirty="0">
-              <a:solidFill>
-                <a:schemeClr val="tx1"/>
-              </a:solidFill>
-            </a:endParaRPr>
-          </a:p>
-        </p:txBody>
-      </p:sp>
-      <p:sp>
-        <p:nvSpPr>
-          <p:cNvPr id="210" name="Rechteck 16"/>
-          <p:cNvSpPr/>
-          <p:nvPr/>
-        </p:nvSpPr>
-        <p:spPr>
-          <a:xfrm>
-            <a:off x="6539230" y="39237920"/>
-            <a:ext cx="2453640" cy="1077595"/>
-          </a:xfrm>
-          <a:prstGeom prst="rect">
-            <a:avLst/>
-          </a:prstGeom>
-          <a:solidFill>
-            <a:schemeClr val="bg1"/>
-          </a:solidFill>
-        </p:spPr>
-        <p:style>
-          <a:lnRef idx="2">
-            <a:schemeClr val="accent1">
-              <a:shade val="50000"/>
-            </a:schemeClr>
-          </a:lnRef>
-          <a:fillRef idx="1">
-            <a:schemeClr val="accent1"/>
-          </a:fillRef>
-          <a:effectRef idx="0">
-            <a:schemeClr val="accent1"/>
-          </a:effectRef>
-          <a:fontRef idx="minor">
-            <a:schemeClr val="lt1"/>
-          </a:fontRef>
-        </p:style>
-        <p:txBody>
-          <a:bodyPr rtlCol="0" anchor="ctr"/>
-          <a:p>
-            <a:pPr algn="ctr"/>
-            <a:r>
-              <a:rPr lang="de-DE" sz="3600" i="1" dirty="0" smtClean="0">
-                <a:solidFill>
-                  <a:schemeClr val="tx1"/>
-                </a:solidFill>
-              </a:rPr>
-              <a:t>Emergency </a:t>
-            </a:r>
-            <a:r>
-              <a:rPr lang="de-DE" sz="3600" i="1" dirty="0" err="1" smtClean="0">
-                <a:solidFill>
-                  <a:schemeClr val="tx1"/>
-                </a:solidFill>
-              </a:rPr>
-              <a:t>kicker</a:t>
-            </a:r>
-            <a:endParaRPr lang="de-DE" sz="3600" i="1" dirty="0">
-              <a:solidFill>
-                <a:schemeClr val="tx1"/>
-              </a:solidFill>
-            </a:endParaRPr>
-          </a:p>
-        </p:txBody>
-      </p:sp>
-      <p:cxnSp>
-        <p:nvCxnSpPr>
-          <p:cNvPr id="211" name="Gerade Verbindung mit Pfeil 15"/>
-          <p:cNvCxnSpPr>
-            <a:endCxn id="210" idx="1"/>
-          </p:cNvCxnSpPr>
-          <p:nvPr/>
-        </p:nvCxnSpPr>
-        <p:spPr>
-          <a:xfrm>
-            <a:off x="5579110" y="39776400"/>
-            <a:ext cx="960120" cy="635"/>
-          </a:xfrm>
-          <a:prstGeom prst="straightConnector1">
-            <a:avLst/>
-          </a:prstGeom>
-          <a:ln w="44450">
-            <a:solidFill>
-              <a:schemeClr val="tx1"/>
-            </a:solidFill>
-            <a:prstDash val="sysDash"/>
-            <a:tailEnd type="triangle"/>
-          </a:ln>
-        </p:spPr>
-        <p:style>
-          <a:lnRef idx="1">
-            <a:schemeClr val="accent1"/>
-          </a:lnRef>
-          <a:fillRef idx="0">
-            <a:schemeClr val="accent1"/>
-          </a:fillRef>
-          <a:effectRef idx="0">
-            <a:schemeClr val="accent1"/>
-          </a:effectRef>
-          <a:fontRef idx="minor">
-            <a:schemeClr val="tx1"/>
-          </a:fontRef>
-        </p:style>
-      </p:cxnSp>
-      <p:sp>
-        <p:nvSpPr>
-          <p:cNvPr id="212" name="Textfeld 10"/>
-          <p:cNvSpPr txBox="1"/>
-          <p:nvPr/>
-        </p:nvSpPr>
-        <p:spPr>
-          <a:xfrm>
-            <a:off x="5759450" y="39863395"/>
-            <a:ext cx="779780" cy="645160"/>
-          </a:xfrm>
-          <a:prstGeom prst="rect">
-            <a:avLst/>
-          </a:prstGeom>
-          <a:noFill/>
-        </p:spPr>
-        <p:txBody>
-          <a:bodyPr wrap="square" rtlCol="0">
-            <a:spAutoFit/>
-          </a:bodyPr>
-          <a:p>
-            <a:r>
-              <a:rPr lang="en-US" altLang="de-DE" sz="3600" i="1" dirty="0" err="1" smtClean="0">
-                <a:effectLst>
-                  <a:outerShdw blurRad="38100" dist="38100" dir="2700000" algn="tl">
-                    <a:srgbClr val="000000">
-                      <a:alpha val="43137"/>
-                    </a:srgbClr>
-                  </a:outerShdw>
-                </a:effectLst>
-              </a:rPr>
-              <a:t>or</a:t>
-            </a:r>
-            <a:endParaRPr lang="en-US" altLang="de-DE" sz="3600" i="1" dirty="0" err="1" smtClean="0">
-              <a:effectLst>
-                <a:outerShdw blurRad="38100" dist="38100" dir="2700000" algn="tl">
-                  <a:srgbClr val="000000">
-                    <a:alpha val="43137"/>
-                  </a:srgbClr>
-                </a:outerShdw>
-              </a:effectLst>
-            </a:endParaRPr>
-          </a:p>
-        </p:txBody>
-      </p:sp>
-      <p:cxnSp>
-        <p:nvCxnSpPr>
-          <p:cNvPr id="213" name="Gerade Verbindung mit Pfeil 15"/>
-          <p:cNvCxnSpPr/>
-          <p:nvPr/>
-        </p:nvCxnSpPr>
-        <p:spPr>
-          <a:xfrm>
-            <a:off x="5589270" y="39668450"/>
-            <a:ext cx="5080" cy="885190"/>
-          </a:xfrm>
-          <a:prstGeom prst="straightConnector1">
-            <a:avLst/>
-          </a:prstGeom>
-          <a:ln w="44450">
-            <a:solidFill>
-              <a:schemeClr val="tx1"/>
-            </a:solidFill>
-            <a:prstDash val="sysDash"/>
-            <a:tailEnd type="triangle"/>
-          </a:ln>
-        </p:spPr>
-        <p:style>
-          <a:lnRef idx="1">
-            <a:schemeClr val="accent1"/>
-          </a:lnRef>
-          <a:fillRef idx="0">
-            <a:schemeClr val="accent1"/>
-          </a:fillRef>
-          <a:effectRef idx="0">
-            <a:schemeClr val="accent1"/>
-          </a:effectRef>
-          <a:fontRef idx="minor">
-            <a:schemeClr val="tx1"/>
-          </a:fontRef>
-        </p:style>
-      </p:cxnSp>
-      <p:cxnSp>
-        <p:nvCxnSpPr>
-          <p:cNvPr id="214" name="直接连接符 213"/>
-          <p:cNvCxnSpPr/>
-          <p:nvPr/>
-        </p:nvCxnSpPr>
-        <p:spPr>
-          <a:xfrm flipH="1">
-            <a:off x="5575265" y="38976582"/>
-            <a:ext cx="3810" cy="692190"/>
-          </a:xfrm>
-          <a:prstGeom prst="line">
-            <a:avLst/>
-          </a:prstGeom>
-          <a:ln w="38100"/>
-        </p:spPr>
-        <p:style>
-          <a:lnRef idx="3">
-            <a:schemeClr val="dk1"/>
-          </a:lnRef>
-          <a:fillRef idx="0">
-            <a:schemeClr val="dk1"/>
-          </a:fillRef>
-          <a:effectRef idx="2">
-            <a:schemeClr val="dk1"/>
-          </a:effectRef>
-          <a:fontRef idx="minor">
-            <a:schemeClr val="tx1"/>
-          </a:fontRef>
-        </p:style>
-      </p:cxnSp>
-      <p:sp>
-        <p:nvSpPr>
-          <p:cNvPr id="215" name="任意多边形 214"/>
-          <p:cNvSpPr/>
-          <p:nvPr/>
-        </p:nvSpPr>
-        <p:spPr>
-          <a:xfrm flipH="1" flipV="1">
-            <a:off x="3174365" y="38709600"/>
-            <a:ext cx="2145665" cy="691515"/>
+            <a:off x="13298805" y="21537930"/>
+            <a:ext cx="1607820" cy="527050"/>
           </a:xfrm>
           <a:custGeom>
             <a:avLst/>
@@ -10295,1115 +10650,6 @@
       </p:sp>
       <p:sp>
         <p:nvSpPr>
-          <p:cNvPr id="217" name="云形 216"/>
-          <p:cNvSpPr/>
-          <p:nvPr/>
-        </p:nvSpPr>
-        <p:spPr>
-          <a:xfrm>
-            <a:off x="7828280" y="35903535"/>
-            <a:ext cx="2710180" cy="1764665"/>
-          </a:xfrm>
-          <a:prstGeom prst="cloud">
-            <a:avLst/>
-          </a:prstGeom>
-          <a:noFill/>
-          <a:extLst>
-            <a:ext uri="{909E8E84-426E-40DD-AFC4-6F175D3DCCD1}">
-              <a14:hiddenFill xmlns:a14="http://schemas.microsoft.com/office/drawing/2010/main">
-                <a:solidFill>
-                  <a:schemeClr val="accent1"/>
-                </a:solidFill>
-              </a14:hiddenFill>
-            </a:ext>
-          </a:extLst>
-        </p:spPr>
-        <p:style>
-          <a:lnRef idx="2">
-            <a:schemeClr val="accent1">
-              <a:shade val="50000"/>
-            </a:schemeClr>
-          </a:lnRef>
-          <a:fillRef idx="1">
-            <a:schemeClr val="accent1"/>
-          </a:fillRef>
-          <a:effectRef idx="0">
-            <a:schemeClr val="accent1"/>
-          </a:effectRef>
-          <a:fontRef idx="minor">
-            <a:schemeClr val="lt1"/>
-          </a:fontRef>
-        </p:style>
-        <p:txBody>
-          <a:bodyPr rtlCol="0" anchor="ctr"/>
-          <a:p>
-            <a:pPr algn="ctr"/>
-            <a:r>
-              <a:rPr lang="en-US" altLang="zh-CN" sz="3600">
-                <a:solidFill>
-                  <a:schemeClr val="tx1"/>
-                </a:solidFill>
-              </a:rPr>
-              <a:t>WR network</a:t>
-            </a:r>
-            <a:endParaRPr lang="en-US" altLang="zh-CN" sz="3600">
-              <a:solidFill>
-                <a:schemeClr val="tx1"/>
-              </a:solidFill>
-            </a:endParaRPr>
-          </a:p>
-        </p:txBody>
-      </p:sp>
-      <p:cxnSp>
-        <p:nvCxnSpPr>
-          <p:cNvPr id="218" name="肘形连接符 217"/>
-          <p:cNvCxnSpPr>
-            <a:stCxn id="217" idx="2"/>
-            <a:endCxn id="199" idx="0"/>
-          </p:cNvCxnSpPr>
-          <p:nvPr/>
-        </p:nvCxnSpPr>
-        <p:spPr>
-          <a:xfrm rot="10800000" flipV="1">
-            <a:off x="3437890" y="36786185"/>
-            <a:ext cx="4398645" cy="691515"/>
-          </a:xfrm>
-          <a:prstGeom prst="bentConnector2">
-            <a:avLst/>
-          </a:prstGeom>
-          <a:ln w="38100">
-            <a:solidFill>
-              <a:schemeClr val="tx1"/>
-            </a:solidFill>
-            <a:headEnd type="arrow"/>
-            <a:tailEnd type="none"/>
-          </a:ln>
-        </p:spPr>
-        <p:style>
-          <a:lnRef idx="1">
-            <a:schemeClr val="accent1"/>
-          </a:lnRef>
-          <a:fillRef idx="0">
-            <a:schemeClr val="accent1"/>
-          </a:fillRef>
-          <a:effectRef idx="0">
-            <a:schemeClr val="accent1"/>
-          </a:effectRef>
-          <a:fontRef idx="minor">
-            <a:schemeClr val="tx1"/>
-          </a:fontRef>
-        </p:style>
-      </p:cxnSp>
-      <p:cxnSp>
-        <p:nvCxnSpPr>
-          <p:cNvPr id="219" name="肘形连接符 218"/>
-          <p:cNvCxnSpPr/>
-          <p:nvPr/>
-        </p:nvCxnSpPr>
-        <p:spPr>
-          <a:xfrm rot="16200000" flipV="1">
-            <a:off x="10918825" y="36567110"/>
-            <a:ext cx="533400" cy="1294130"/>
-          </a:xfrm>
-          <a:prstGeom prst="bentConnector2">
-            <a:avLst/>
-          </a:prstGeom>
-          <a:ln w="38100">
-            <a:solidFill>
-              <a:schemeClr val="tx1"/>
-            </a:solidFill>
-            <a:tailEnd type="arrow"/>
-          </a:ln>
-        </p:spPr>
-        <p:style>
-          <a:lnRef idx="1">
-            <a:schemeClr val="accent1"/>
-          </a:lnRef>
-          <a:fillRef idx="0">
-            <a:schemeClr val="accent1"/>
-          </a:fillRef>
-          <a:effectRef idx="0">
-            <a:schemeClr val="accent1"/>
-          </a:effectRef>
-          <a:fontRef idx="minor">
-            <a:schemeClr val="tx1"/>
-          </a:fontRef>
-        </p:style>
-      </p:cxnSp>
-      <p:sp>
-        <p:nvSpPr>
-          <p:cNvPr id="220" name="文本框 219"/>
-          <p:cNvSpPr txBox="1"/>
-          <p:nvPr/>
-        </p:nvSpPr>
-        <p:spPr>
-          <a:xfrm>
-            <a:off x="2458085" y="35998150"/>
-            <a:ext cx="5120640" cy="645160"/>
-          </a:xfrm>
-          <a:prstGeom prst="rect">
-            <a:avLst/>
-          </a:prstGeom>
-          <a:noFill/>
-        </p:spPr>
-        <p:txBody>
-          <a:bodyPr wrap="square" rtlCol="0">
-            <a:spAutoFit/>
-          </a:bodyPr>
-          <a:p>
-            <a:r>
-              <a:rPr lang="en-US" altLang="zh-CN" sz="3600">
-                <a:sym typeface="+mn-ea"/>
-              </a:rPr>
-              <a:t>TGM_KICKER_TRIGGER_S</a:t>
-            </a:r>
-            <a:endParaRPr lang="en-US" altLang="zh-CN" sz="3600">
-              <a:sym typeface="+mn-ea"/>
-            </a:endParaRPr>
-          </a:p>
-        </p:txBody>
-      </p:sp>
-      <p:sp>
-        <p:nvSpPr>
-          <p:cNvPr id="223" name="文本框 222"/>
-          <p:cNvSpPr txBox="1"/>
-          <p:nvPr/>
-        </p:nvSpPr>
-        <p:spPr>
-          <a:xfrm>
-            <a:off x="10772140" y="36312475"/>
-            <a:ext cx="5524500" cy="645160"/>
-          </a:xfrm>
-          <a:prstGeom prst="rect">
-            <a:avLst/>
-          </a:prstGeom>
-          <a:noFill/>
-        </p:spPr>
-        <p:txBody>
-          <a:bodyPr wrap="square" rtlCol="0">
-            <a:spAutoFit/>
-          </a:bodyPr>
-          <a:p>
-            <a:r>
-              <a:rPr lang="en-US" altLang="zh-CN" sz="3600">
-                <a:sym typeface="+mn-ea"/>
-              </a:rPr>
-              <a:t>TGM_KICKER_TRIGGER_T</a:t>
-            </a:r>
-            <a:endParaRPr lang="en-US" altLang="zh-CN" sz="3600">
-              <a:sym typeface="+mn-ea"/>
-            </a:endParaRPr>
-          </a:p>
-        </p:txBody>
-      </p:sp>
-      <p:sp>
-        <p:nvSpPr>
-          <p:cNvPr id="224" name="Rechteck 3"/>
-          <p:cNvSpPr/>
-          <p:nvPr/>
-        </p:nvSpPr>
-        <p:spPr>
-          <a:xfrm>
-            <a:off x="2512509" y="33006987"/>
-            <a:ext cx="5237143" cy="1492969"/>
-          </a:xfrm>
-          <a:prstGeom prst="rect">
-            <a:avLst/>
-          </a:prstGeom>
-          <a:solidFill>
-            <a:schemeClr val="bg1"/>
-          </a:solidFill>
-          <a:ln>
-            <a:solidFill>
-              <a:schemeClr val="tx1"/>
-            </a:solidFill>
-          </a:ln>
-          <a:effectLst>
-            <a:outerShdw blurRad="50800" dist="38100" dir="2700000" algn="tl" rotWithShape="0">
-              <a:prstClr val="black">
-                <a:alpha val="40000"/>
-              </a:prstClr>
-            </a:outerShdw>
-          </a:effectLst>
-          <a:scene3d>
-            <a:camera prst="orthographicFront"/>
-            <a:lightRig rig="threePt" dir="t"/>
-          </a:scene3d>
-          <a:sp3d>
-            <a:bevelT/>
-          </a:sp3d>
-        </p:spPr>
-        <p:style>
-          <a:lnRef idx="2">
-            <a:schemeClr val="accent1">
-              <a:shade val="50000"/>
-            </a:schemeClr>
-          </a:lnRef>
-          <a:fillRef idx="1">
-            <a:schemeClr val="accent1"/>
-          </a:fillRef>
-          <a:effectRef idx="0">
-            <a:schemeClr val="accent1"/>
-          </a:effectRef>
-          <a:fontRef idx="minor">
-            <a:schemeClr val="lt1"/>
-          </a:fontRef>
-        </p:style>
-        <p:txBody>
-          <a:bodyPr rtlCol="0" anchor="ctr"/>
-          <a:p>
-            <a:pPr algn="ctr"/>
-            <a:endParaRPr lang="de-DE" sz="3600"/>
-          </a:p>
-        </p:txBody>
-      </p:sp>
-      <p:sp>
-        <p:nvSpPr>
-          <p:cNvPr id="225" name="Rechteck 4"/>
-          <p:cNvSpPr/>
-          <p:nvPr/>
-        </p:nvSpPr>
-        <p:spPr>
-          <a:xfrm>
-            <a:off x="2512695" y="33007300"/>
-            <a:ext cx="1672590" cy="1492885"/>
-          </a:xfrm>
-          <a:prstGeom prst="rect">
-            <a:avLst/>
-          </a:prstGeom>
-        </p:spPr>
-        <p:style>
-          <a:lnRef idx="2">
-            <a:schemeClr val="accent1">
-              <a:shade val="50000"/>
-            </a:schemeClr>
-          </a:lnRef>
-          <a:fillRef idx="1">
-            <a:schemeClr val="accent1"/>
-          </a:fillRef>
-          <a:effectRef idx="0">
-            <a:schemeClr val="accent1"/>
-          </a:effectRef>
-          <a:fontRef idx="minor">
-            <a:schemeClr val="lt1"/>
-          </a:fontRef>
-        </p:style>
-        <p:txBody>
-          <a:bodyPr rtlCol="0" anchor="ctr"/>
-          <a:p>
-            <a:pPr algn="ctr"/>
-            <a:r>
-              <a:rPr lang="en-US" altLang="de-DE" sz="3600" dirty="0" err="1" smtClean="0"/>
-              <a:t>B2B source SCU</a:t>
-            </a:r>
-            <a:endParaRPr lang="en-US" altLang="de-DE" sz="3600" dirty="0" err="1" smtClean="0"/>
-          </a:p>
-        </p:txBody>
-      </p:sp>
-      <p:cxnSp>
-        <p:nvCxnSpPr>
-          <p:cNvPr id="227" name="肘形连接符 226"/>
-          <p:cNvCxnSpPr>
-            <a:stCxn id="217" idx="3"/>
-            <a:endCxn id="225" idx="2"/>
-          </p:cNvCxnSpPr>
-          <p:nvPr/>
-        </p:nvCxnSpPr>
-        <p:spPr>
-          <a:xfrm rot="16200000" flipV="1">
-            <a:off x="5514023" y="32335153"/>
-            <a:ext cx="1504315" cy="5834380"/>
-          </a:xfrm>
-          <a:prstGeom prst="bentConnector3">
-            <a:avLst>
-              <a:gd name="adj1" fmla="val 53377"/>
-            </a:avLst>
-          </a:prstGeom>
-          <a:ln w="38100">
-            <a:solidFill>
-              <a:schemeClr val="tx1"/>
-            </a:solidFill>
-            <a:tailEnd type="arrow"/>
-          </a:ln>
-        </p:spPr>
-        <p:style>
-          <a:lnRef idx="1">
-            <a:schemeClr val="accent1"/>
-          </a:lnRef>
-          <a:fillRef idx="0">
-            <a:schemeClr val="accent1"/>
-          </a:fillRef>
-          <a:effectRef idx="0">
-            <a:schemeClr val="accent1"/>
-          </a:effectRef>
-          <a:fontRef idx="minor">
-            <a:schemeClr val="tx1"/>
-          </a:fontRef>
-        </p:style>
-      </p:cxnSp>
-      <p:cxnSp>
-        <p:nvCxnSpPr>
-          <p:cNvPr id="228" name="肘形连接符 227"/>
-          <p:cNvCxnSpPr>
-            <a:endCxn id="225" idx="0"/>
-          </p:cNvCxnSpPr>
-          <p:nvPr/>
-        </p:nvCxnSpPr>
-        <p:spPr>
-          <a:xfrm rot="10800000">
-            <a:off x="3348990" y="33007300"/>
-            <a:ext cx="6353175" cy="2622550"/>
-          </a:xfrm>
-          <a:prstGeom prst="bentConnector4">
-            <a:avLst>
-              <a:gd name="adj1" fmla="val -89"/>
-              <a:gd name="adj2" fmla="val 109080"/>
-            </a:avLst>
-          </a:prstGeom>
-          <a:ln w="38100">
-            <a:solidFill>
-              <a:srgbClr val="FF0000"/>
-            </a:solidFill>
-            <a:headEnd type="arrow"/>
-            <a:tailEnd type="none"/>
-          </a:ln>
-        </p:spPr>
-        <p:style>
-          <a:lnRef idx="1">
-            <a:schemeClr val="accent1"/>
-          </a:lnRef>
-          <a:fillRef idx="0">
-            <a:schemeClr val="accent1"/>
-          </a:fillRef>
-          <a:effectRef idx="0">
-            <a:schemeClr val="accent1"/>
-          </a:effectRef>
-          <a:fontRef idx="minor">
-            <a:schemeClr val="tx1"/>
-          </a:fontRef>
-        </p:style>
-      </p:cxnSp>
-      <p:sp>
-        <p:nvSpPr>
-          <p:cNvPr id="229" name="文本框 228"/>
-          <p:cNvSpPr txBox="1"/>
-          <p:nvPr/>
-        </p:nvSpPr>
-        <p:spPr>
-          <a:xfrm>
-            <a:off x="4631690" y="32047815"/>
-            <a:ext cx="3629025" cy="645160"/>
-          </a:xfrm>
-          <a:prstGeom prst="rect">
-            <a:avLst/>
-          </a:prstGeom>
-          <a:noFill/>
-        </p:spPr>
-        <p:txBody>
-          <a:bodyPr wrap="square" rtlCol="0">
-            <a:spAutoFit/>
-          </a:bodyPr>
-          <a:p>
-            <a:r>
-              <a:rPr lang="en-US" altLang="zh-CN" sz="3600"/>
-              <a:t>TGM_B2B_STATUS</a:t>
-            </a:r>
-            <a:endParaRPr lang="en-US" altLang="zh-CN" sz="3600"/>
-          </a:p>
-        </p:txBody>
-      </p:sp>
-      <p:cxnSp>
-        <p:nvCxnSpPr>
-          <p:cNvPr id="230" name="直接箭头连接符 229"/>
-          <p:cNvCxnSpPr/>
-          <p:nvPr/>
-        </p:nvCxnSpPr>
-        <p:spPr>
-          <a:xfrm flipV="1">
-            <a:off x="10186670" y="34523680"/>
-            <a:ext cx="1234440" cy="1960245"/>
-          </a:xfrm>
-          <a:prstGeom prst="straightConnector1">
-            <a:avLst/>
-          </a:prstGeom>
-          <a:ln w="38100">
-            <a:solidFill>
-              <a:srgbClr val="FF0000"/>
-            </a:solidFill>
-            <a:tailEnd type="arrow"/>
-          </a:ln>
-        </p:spPr>
-        <p:style>
-          <a:lnRef idx="1">
-            <a:schemeClr val="accent1"/>
-          </a:lnRef>
-          <a:fillRef idx="0">
-            <a:schemeClr val="accent1"/>
-          </a:fillRef>
-          <a:effectRef idx="0">
-            <a:schemeClr val="accent1"/>
-          </a:effectRef>
-          <a:fontRef idx="minor">
-            <a:schemeClr val="tx1"/>
-          </a:fontRef>
-        </p:style>
-      </p:cxnSp>
-      <p:sp>
-        <p:nvSpPr>
-          <p:cNvPr id="231" name="Rechteck 7"/>
-          <p:cNvSpPr/>
-          <p:nvPr/>
-        </p:nvSpPr>
-        <p:spPr>
-          <a:xfrm>
-            <a:off x="10937685" y="33800205"/>
-            <a:ext cx="1193935" cy="660475"/>
-          </a:xfrm>
-          <a:prstGeom prst="rect">
-            <a:avLst/>
-          </a:prstGeom>
-          <a:noFill/>
-          <a:ln>
-            <a:solidFill>
-              <a:schemeClr val="tx1"/>
-            </a:solidFill>
-          </a:ln>
-        </p:spPr>
-        <p:style>
-          <a:lnRef idx="2">
-            <a:schemeClr val="accent1">
-              <a:shade val="50000"/>
-            </a:schemeClr>
-          </a:lnRef>
-          <a:fillRef idx="1">
-            <a:schemeClr val="accent1"/>
-          </a:fillRef>
-          <a:effectRef idx="0">
-            <a:schemeClr val="accent1"/>
-          </a:effectRef>
-          <a:fontRef idx="minor">
-            <a:schemeClr val="lt1"/>
-          </a:fontRef>
-        </p:style>
-        <p:txBody>
-          <a:bodyPr rtlCol="0" anchor="ctr"/>
-          <a:p>
-            <a:pPr algn="ctr"/>
-            <a:r>
-              <a:rPr lang="en-US" altLang="zh-CN" sz="3600">
-                <a:solidFill>
-                  <a:schemeClr val="tx1"/>
-                </a:solidFill>
-              </a:rPr>
-              <a:t>DM</a:t>
-            </a:r>
-            <a:endParaRPr lang="en-US" altLang="zh-CN" sz="3600">
-              <a:solidFill>
-                <a:schemeClr val="tx1"/>
-              </a:solidFill>
-            </a:endParaRPr>
-          </a:p>
-        </p:txBody>
-      </p:sp>
-      <p:cxnSp>
-        <p:nvCxnSpPr>
-          <p:cNvPr id="235" name="直接连接符 234"/>
-          <p:cNvCxnSpPr/>
-          <p:nvPr/>
-        </p:nvCxnSpPr>
-        <p:spPr>
-          <a:xfrm flipH="1">
-            <a:off x="9038590" y="5111115"/>
-            <a:ext cx="1392555" cy="1779905"/>
-          </a:xfrm>
-          <a:prstGeom prst="line">
-            <a:avLst/>
-          </a:prstGeom>
-          <a:ln w="635000">
-            <a:solidFill>
-              <a:schemeClr val="accent1">
-                <a:alpha val="18000"/>
-              </a:schemeClr>
-            </a:solidFill>
-          </a:ln>
-        </p:spPr>
-        <p:style>
-          <a:lnRef idx="1">
-            <a:schemeClr val="accent1"/>
-          </a:lnRef>
-          <a:fillRef idx="0">
-            <a:schemeClr val="accent1"/>
-          </a:fillRef>
-          <a:effectRef idx="0">
-            <a:schemeClr val="accent1"/>
-          </a:effectRef>
-          <a:fontRef idx="minor">
-            <a:schemeClr val="tx1"/>
-          </a:fontRef>
-        </p:style>
-      </p:cxnSp>
-      <p:cxnSp>
-        <p:nvCxnSpPr>
-          <p:cNvPr id="236" name="直接连接符 235"/>
-          <p:cNvCxnSpPr/>
-          <p:nvPr/>
-        </p:nvCxnSpPr>
-        <p:spPr>
-          <a:xfrm flipH="1">
-            <a:off x="8221980" y="7571740"/>
-            <a:ext cx="2355850" cy="3121660"/>
-          </a:xfrm>
-          <a:prstGeom prst="line">
-            <a:avLst/>
-          </a:prstGeom>
-          <a:ln w="635000">
-            <a:solidFill>
-              <a:schemeClr val="accent1">
-                <a:alpha val="18000"/>
-              </a:schemeClr>
-            </a:solidFill>
-          </a:ln>
-        </p:spPr>
-        <p:style>
-          <a:lnRef idx="1">
-            <a:schemeClr val="accent1"/>
-          </a:lnRef>
-          <a:fillRef idx="0">
-            <a:schemeClr val="accent1"/>
-          </a:fillRef>
-          <a:effectRef idx="0">
-            <a:schemeClr val="accent1"/>
-          </a:effectRef>
-          <a:fontRef idx="minor">
-            <a:schemeClr val="tx1"/>
-          </a:fontRef>
-        </p:style>
-      </p:cxnSp>
-      <p:cxnSp>
-        <p:nvCxnSpPr>
-          <p:cNvPr id="237" name="直接连接符 236"/>
-          <p:cNvCxnSpPr/>
-          <p:nvPr/>
-        </p:nvCxnSpPr>
-        <p:spPr>
-          <a:xfrm flipH="1">
-            <a:off x="8813165" y="12371705"/>
-            <a:ext cx="1677035" cy="2223770"/>
-          </a:xfrm>
-          <a:prstGeom prst="line">
-            <a:avLst/>
-          </a:prstGeom>
-          <a:ln w="635000">
-            <a:solidFill>
-              <a:schemeClr val="accent1">
-                <a:alpha val="18000"/>
-              </a:schemeClr>
-            </a:solidFill>
-          </a:ln>
-        </p:spPr>
-        <p:style>
-          <a:lnRef idx="1">
-            <a:schemeClr val="accent1"/>
-          </a:lnRef>
-          <a:fillRef idx="0">
-            <a:schemeClr val="accent1"/>
-          </a:fillRef>
-          <a:effectRef idx="0">
-            <a:schemeClr val="accent1"/>
-          </a:effectRef>
-          <a:fontRef idx="minor">
-            <a:schemeClr val="tx1"/>
-          </a:fontRef>
-        </p:style>
-      </p:cxnSp>
-      <p:cxnSp>
-        <p:nvCxnSpPr>
-          <p:cNvPr id="238" name="直接连接符 237"/>
-          <p:cNvCxnSpPr/>
-          <p:nvPr/>
-        </p:nvCxnSpPr>
-        <p:spPr>
-          <a:xfrm flipH="1">
-            <a:off x="9765030" y="17463770"/>
-            <a:ext cx="4653915" cy="6054725"/>
-          </a:xfrm>
-          <a:prstGeom prst="line">
-            <a:avLst/>
-          </a:prstGeom>
-          <a:ln w="635000">
-            <a:solidFill>
-              <a:schemeClr val="accent1">
-                <a:alpha val="18000"/>
-              </a:schemeClr>
-            </a:solidFill>
-          </a:ln>
-        </p:spPr>
-        <p:style>
-          <a:lnRef idx="1">
-            <a:schemeClr val="accent1"/>
-          </a:lnRef>
-          <a:fillRef idx="0">
-            <a:schemeClr val="accent1"/>
-          </a:fillRef>
-          <a:effectRef idx="0">
-            <a:schemeClr val="accent1"/>
-          </a:effectRef>
-          <a:fontRef idx="minor">
-            <a:schemeClr val="tx1"/>
-          </a:fontRef>
-        </p:style>
-      </p:cxnSp>
-      <p:cxnSp>
-        <p:nvCxnSpPr>
-          <p:cNvPr id="239" name="直接连接符 238"/>
-          <p:cNvCxnSpPr/>
-          <p:nvPr/>
-        </p:nvCxnSpPr>
-        <p:spPr>
-          <a:xfrm flipH="1">
-            <a:off x="7505065" y="24150955"/>
-            <a:ext cx="5459730" cy="7046595"/>
-          </a:xfrm>
-          <a:prstGeom prst="line">
-            <a:avLst/>
-          </a:prstGeom>
-          <a:ln w="635000">
-            <a:solidFill>
-              <a:schemeClr val="accent1">
-                <a:alpha val="18000"/>
-              </a:schemeClr>
-            </a:solidFill>
-          </a:ln>
-        </p:spPr>
-        <p:style>
-          <a:lnRef idx="1">
-            <a:schemeClr val="accent1"/>
-          </a:lnRef>
-          <a:fillRef idx="0">
-            <a:schemeClr val="accent1"/>
-          </a:fillRef>
-          <a:effectRef idx="0">
-            <a:schemeClr val="accent1"/>
-          </a:effectRef>
-          <a:fontRef idx="minor">
-            <a:schemeClr val="tx1"/>
-          </a:fontRef>
-        </p:style>
-      </p:cxnSp>
-      <p:cxnSp>
-        <p:nvCxnSpPr>
-          <p:cNvPr id="240" name="直接连接符 239"/>
-          <p:cNvCxnSpPr/>
-          <p:nvPr/>
-        </p:nvCxnSpPr>
-        <p:spPr>
-          <a:xfrm flipH="1">
-            <a:off x="7184390" y="34568130"/>
-            <a:ext cx="5632450" cy="7443470"/>
-          </a:xfrm>
-          <a:prstGeom prst="line">
-            <a:avLst/>
-          </a:prstGeom>
-          <a:ln w="635000">
-            <a:solidFill>
-              <a:schemeClr val="accent1">
-                <a:alpha val="18000"/>
-              </a:schemeClr>
-            </a:solidFill>
-          </a:ln>
-        </p:spPr>
-        <p:style>
-          <a:lnRef idx="1">
-            <a:schemeClr val="accent1"/>
-          </a:lnRef>
-          <a:fillRef idx="0">
-            <a:schemeClr val="accent1"/>
-          </a:fillRef>
-          <a:effectRef idx="0">
-            <a:schemeClr val="accent1"/>
-          </a:effectRef>
-          <a:fontRef idx="minor">
-            <a:schemeClr val="tx1"/>
-          </a:fontRef>
-        </p:style>
-      </p:cxnSp>
-      <p:cxnSp>
-        <p:nvCxnSpPr>
-          <p:cNvPr id="241" name="直接连接符 240"/>
-          <p:cNvCxnSpPr/>
-          <p:nvPr/>
-        </p:nvCxnSpPr>
-        <p:spPr>
-          <a:xfrm flipH="1">
-            <a:off x="9168130" y="-814070"/>
-            <a:ext cx="2271395" cy="2862580"/>
-          </a:xfrm>
-          <a:prstGeom prst="line">
-            <a:avLst/>
-          </a:prstGeom>
-          <a:ln w="635000">
-            <a:solidFill>
-              <a:schemeClr val="accent1">
-                <a:alpha val="18000"/>
-              </a:schemeClr>
-            </a:solidFill>
-          </a:ln>
-        </p:spPr>
-        <p:style>
-          <a:lnRef idx="1">
-            <a:schemeClr val="accent1"/>
-          </a:lnRef>
-          <a:fillRef idx="0">
-            <a:schemeClr val="accent1"/>
-          </a:fillRef>
-          <a:effectRef idx="0">
-            <a:schemeClr val="accent1"/>
-          </a:effectRef>
-          <a:fontRef idx="minor">
-            <a:schemeClr val="tx1"/>
-          </a:fontRef>
-        </p:style>
-      </p:cxnSp>
-      <p:sp>
-        <p:nvSpPr>
-          <p:cNvPr id="243" name="矩形 242"/>
-          <p:cNvSpPr/>
-          <p:nvPr/>
-        </p:nvSpPr>
-        <p:spPr>
-          <a:xfrm>
-            <a:off x="2992121" y="471805"/>
-            <a:ext cx="2717800" cy="1316355"/>
-          </a:xfrm>
-          <a:prstGeom prst="rect">
-            <a:avLst/>
-          </a:prstGeom>
-          <a:noFill/>
-          <a:ln>
-            <a:noFill/>
-          </a:ln>
-        </p:spPr>
-        <p:txBody>
-          <a:bodyPr wrap="none" rtlCol="0" anchor="t">
-            <a:spAutoFit/>
-          </a:bodyPr>
-          <a:p>
-            <a:pPr algn="ctr"/>
-            <a:r>
-              <a:rPr lang="en-US" altLang="zh-CN" sz="4000" b="1">
-                <a:solidFill>
-                  <a:schemeClr val="tx1"/>
-                </a:solidFill>
-                <a:effectLst>
-                  <a:outerShdw blurRad="38100" dist="19050" dir="2700000" algn="tl" rotWithShape="0">
-                    <a:schemeClr val="dk1">
-                      <a:alpha val="40000"/>
-                    </a:schemeClr>
-                  </a:outerShdw>
-                </a:effectLst>
-              </a:rPr>
-              <a:t>Source </a:t>
-            </a:r>
-            <a:endParaRPr lang="en-US" altLang="zh-CN" sz="4000" b="1">
-              <a:solidFill>
-                <a:schemeClr val="tx1"/>
-              </a:solidFill>
-              <a:effectLst>
-                <a:outerShdw blurRad="38100" dist="19050" dir="2700000" algn="tl" rotWithShape="0">
-                  <a:schemeClr val="dk1">
-                    <a:alpha val="40000"/>
-                  </a:schemeClr>
-                </a:outerShdw>
-              </a:effectLst>
-            </a:endParaRPr>
-          </a:p>
-          <a:p>
-            <a:pPr algn="ctr"/>
-            <a:r>
-              <a:rPr lang="en-US" altLang="zh-CN" sz="4000" b="1">
-                <a:solidFill>
-                  <a:schemeClr val="tx1"/>
-                </a:solidFill>
-                <a:effectLst>
-                  <a:outerShdw blurRad="38100" dist="19050" dir="2700000" algn="tl" rotWithShape="0">
-                    <a:schemeClr val="dk1">
-                      <a:alpha val="40000"/>
-                    </a:schemeClr>
-                  </a:outerShdw>
-                </a:effectLst>
-              </a:rPr>
-              <a:t>synchrotron</a:t>
-            </a:r>
-            <a:endParaRPr lang="en-US" altLang="zh-CN" sz="4000" b="1">
-              <a:solidFill>
-                <a:schemeClr val="tx1"/>
-              </a:solidFill>
-              <a:effectLst>
-                <a:outerShdw blurRad="38100" dist="19050" dir="2700000" algn="tl" rotWithShape="0">
-                  <a:schemeClr val="dk1">
-                    <a:alpha val="40000"/>
-                  </a:schemeClr>
-                </a:outerShdw>
-              </a:effectLst>
-            </a:endParaRPr>
-          </a:p>
-        </p:txBody>
-      </p:sp>
-      <p:sp>
-        <p:nvSpPr>
-          <p:cNvPr id="244" name="矩形 243"/>
-          <p:cNvSpPr/>
-          <p:nvPr/>
-        </p:nvSpPr>
-        <p:spPr>
-          <a:xfrm>
-            <a:off x="12057381" y="471805"/>
-            <a:ext cx="2717800" cy="1316355"/>
-          </a:xfrm>
-          <a:prstGeom prst="rect">
-            <a:avLst/>
-          </a:prstGeom>
-          <a:noFill/>
-          <a:ln>
-            <a:noFill/>
-          </a:ln>
-        </p:spPr>
-        <p:txBody>
-          <a:bodyPr wrap="none" rtlCol="0" anchor="t">
-            <a:spAutoFit/>
-          </a:bodyPr>
-          <a:p>
-            <a:pPr algn="ctr"/>
-            <a:r>
-              <a:rPr lang="en-US" altLang="zh-CN" sz="4000" b="1">
-                <a:solidFill>
-                  <a:schemeClr val="tx1"/>
-                </a:solidFill>
-                <a:effectLst>
-                  <a:outerShdw blurRad="38100" dist="19050" dir="2700000" algn="tl" rotWithShape="0">
-                    <a:schemeClr val="dk1">
-                      <a:alpha val="40000"/>
-                    </a:schemeClr>
-                  </a:outerShdw>
-                </a:effectLst>
-              </a:rPr>
-              <a:t>Target</a:t>
-            </a:r>
-            <a:endParaRPr lang="en-US" altLang="zh-CN" sz="4000" b="1">
-              <a:solidFill>
-                <a:schemeClr val="tx1"/>
-              </a:solidFill>
-              <a:effectLst>
-                <a:outerShdw blurRad="38100" dist="19050" dir="2700000" algn="tl" rotWithShape="0">
-                  <a:schemeClr val="dk1">
-                    <a:alpha val="40000"/>
-                  </a:schemeClr>
-                </a:outerShdw>
-              </a:effectLst>
-            </a:endParaRPr>
-          </a:p>
-          <a:p>
-            <a:pPr algn="ctr"/>
-            <a:r>
-              <a:rPr lang="en-US" altLang="zh-CN" sz="4000" b="1">
-                <a:solidFill>
-                  <a:schemeClr val="tx1"/>
-                </a:solidFill>
-                <a:effectLst>
-                  <a:outerShdw blurRad="38100" dist="19050" dir="2700000" algn="tl" rotWithShape="0">
-                    <a:schemeClr val="dk1">
-                      <a:alpha val="40000"/>
-                    </a:schemeClr>
-                  </a:outerShdw>
-                </a:effectLst>
-              </a:rPr>
-              <a:t>synchrotron</a:t>
-            </a:r>
-            <a:endParaRPr lang="en-US" altLang="zh-CN" sz="4000" b="1">
-              <a:solidFill>
-                <a:schemeClr val="tx1"/>
-              </a:solidFill>
-              <a:effectLst>
-                <a:outerShdw blurRad="38100" dist="19050" dir="2700000" algn="tl" rotWithShape="0">
-                  <a:schemeClr val="dk1">
-                    <a:alpha val="40000"/>
-                  </a:schemeClr>
-                </a:outerShdw>
-              </a:effectLst>
-            </a:endParaRPr>
-          </a:p>
-        </p:txBody>
-      </p:sp>
-      <p:sp>
-        <p:nvSpPr>
-          <p:cNvPr id="245" name="任意多边形 244"/>
-          <p:cNvSpPr/>
-          <p:nvPr/>
-        </p:nvSpPr>
-        <p:spPr>
-          <a:xfrm>
-            <a:off x="5052060" y="21877655"/>
-            <a:ext cx="1607820" cy="527050"/>
-          </a:xfrm>
-          <a:custGeom>
-            <a:avLst/>
-            <a:gdLst>
-              <a:gd name="connisteX0" fmla="*/ 0 w 1991360"/>
-              <a:gd name="connsiteY0" fmla="*/ 352972 h 641897"/>
-              <a:gd name="connisteX1" fmla="*/ 1125855 w 1991360"/>
-              <a:gd name="connsiteY1" fmla="*/ 6897 h 641897"/>
-              <a:gd name="connisteX2" fmla="*/ 1991360 w 1991360"/>
-              <a:gd name="connsiteY2" fmla="*/ 641897 h 641897"/>
-            </a:gdLst>
-            <a:ahLst/>
-            <a:cxnLst>
-              <a:cxn ang="0">
-                <a:pos x="connisteX0" y="connsiteY0"/>
-              </a:cxn>
-              <a:cxn ang="0">
-                <a:pos x="connisteX1" y="connsiteY1"/>
-              </a:cxn>
-              <a:cxn ang="0">
-                <a:pos x="connisteX2" y="connsiteY2"/>
-              </a:cxn>
-            </a:cxnLst>
-            <a:rect l="l" t="t" r="r" b="b"/>
-            <a:pathLst>
-              <a:path w="1991360" h="641897">
-                <a:moveTo>
-                  <a:pt x="0" y="352972"/>
-                </a:moveTo>
-                <a:cubicBezTo>
-                  <a:pt x="207645" y="271057"/>
-                  <a:pt x="727710" y="-50888"/>
-                  <a:pt x="1125855" y="6897"/>
-                </a:cubicBezTo>
-                <a:cubicBezTo>
-                  <a:pt x="1524000" y="64682"/>
-                  <a:pt x="1840865" y="507912"/>
-                  <a:pt x="1991360" y="641897"/>
-                </a:cubicBezTo>
-              </a:path>
-            </a:pathLst>
-          </a:custGeom>
-          <a:noFill/>
-          <a:ln w="38100">
-            <a:solidFill>
-              <a:schemeClr val="tx1"/>
-            </a:solidFill>
-            <a:tailEnd type="arrow"/>
-          </a:ln>
-        </p:spPr>
-        <p:style>
-          <a:lnRef idx="2">
-            <a:schemeClr val="accent1">
-              <a:shade val="50000"/>
-            </a:schemeClr>
-          </a:lnRef>
-          <a:fillRef idx="1">
-            <a:schemeClr val="accent1"/>
-          </a:fillRef>
-          <a:effectRef idx="0">
-            <a:schemeClr val="accent1"/>
-          </a:effectRef>
-          <a:fontRef idx="minor">
-            <a:schemeClr val="lt1"/>
-          </a:fontRef>
-        </p:style>
-        <p:txBody>
-          <a:bodyPr rtlCol="0" anchor="ctr"/>
-          <a:p>
-            <a:pPr algn="ctr"/>
-            <a:endParaRPr lang="zh-CN" altLang="en-US" sz="3600"/>
-          </a:p>
-        </p:txBody>
-      </p:sp>
-      <p:sp>
-        <p:nvSpPr>
-          <p:cNvPr id="246" name="任意多边形 245"/>
-          <p:cNvSpPr/>
-          <p:nvPr/>
-        </p:nvSpPr>
-        <p:spPr>
-          <a:xfrm>
-            <a:off x="13298805" y="21537930"/>
-            <a:ext cx="1607820" cy="527050"/>
-          </a:xfrm>
-          <a:custGeom>
-            <a:avLst/>
-            <a:gdLst>
-              <a:gd name="connisteX0" fmla="*/ 0 w 1991360"/>
-              <a:gd name="connsiteY0" fmla="*/ 352972 h 641897"/>
-              <a:gd name="connisteX1" fmla="*/ 1125855 w 1991360"/>
-              <a:gd name="connsiteY1" fmla="*/ 6897 h 641897"/>
-              <a:gd name="connisteX2" fmla="*/ 1991360 w 1991360"/>
-              <a:gd name="connsiteY2" fmla="*/ 641897 h 641897"/>
-            </a:gdLst>
-            <a:ahLst/>
-            <a:cxnLst>
-              <a:cxn ang="0">
-                <a:pos x="connisteX0" y="connsiteY0"/>
-              </a:cxn>
-              <a:cxn ang="0">
-                <a:pos x="connisteX1" y="connsiteY1"/>
-              </a:cxn>
-              <a:cxn ang="0">
-                <a:pos x="connisteX2" y="connsiteY2"/>
-              </a:cxn>
-            </a:cxnLst>
-            <a:rect l="l" t="t" r="r" b="b"/>
-            <a:pathLst>
-              <a:path w="1991360" h="641897">
-                <a:moveTo>
-                  <a:pt x="0" y="352972"/>
-                </a:moveTo>
-                <a:cubicBezTo>
-                  <a:pt x="207645" y="271057"/>
-                  <a:pt x="727710" y="-50888"/>
-                  <a:pt x="1125855" y="6897"/>
-                </a:cubicBezTo>
-                <a:cubicBezTo>
-                  <a:pt x="1524000" y="64682"/>
-                  <a:pt x="1840865" y="507912"/>
-                  <a:pt x="1991360" y="641897"/>
-                </a:cubicBezTo>
-              </a:path>
-            </a:pathLst>
-          </a:custGeom>
-          <a:noFill/>
-          <a:ln w="38100">
-            <a:solidFill>
-              <a:schemeClr val="tx1"/>
-            </a:solidFill>
-            <a:tailEnd type="arrow"/>
-          </a:ln>
-        </p:spPr>
-        <p:style>
-          <a:lnRef idx="2">
-            <a:schemeClr val="accent1">
-              <a:shade val="50000"/>
-            </a:schemeClr>
-          </a:lnRef>
-          <a:fillRef idx="1">
-            <a:schemeClr val="accent1"/>
-          </a:fillRef>
-          <a:effectRef idx="0">
-            <a:schemeClr val="accent1"/>
-          </a:effectRef>
-          <a:fontRef idx="minor">
-            <a:schemeClr val="lt1"/>
-          </a:fontRef>
-        </p:style>
-        <p:txBody>
-          <a:bodyPr rtlCol="0" anchor="ctr"/>
-          <a:p>
-            <a:pPr algn="ctr"/>
-            <a:endParaRPr lang="zh-CN" altLang="en-US" sz="3600"/>
-          </a:p>
-        </p:txBody>
-      </p:sp>
-      <p:sp>
-        <p:nvSpPr>
           <p:cNvPr id="247" name="Textfeld 65"/>
           <p:cNvSpPr txBox="1"/>
           <p:nvPr/>
@@ -12129,6 +11375,231 @@
           </a:p>
         </p:txBody>
       </p:sp>
+      <p:cxnSp>
+        <p:nvCxnSpPr>
+          <p:cNvPr id="12" name="直接连接符 11"/>
+          <p:cNvCxnSpPr/>
+          <p:nvPr/>
+        </p:nvCxnSpPr>
+        <p:spPr>
+          <a:xfrm>
+            <a:off x="10022205" y="57150"/>
+            <a:ext cx="57785" cy="41981120"/>
+          </a:xfrm>
+          <a:prstGeom prst="line">
+            <a:avLst/>
+          </a:prstGeom>
+          <a:ln>
+            <a:solidFill>
+              <a:schemeClr val="tx1"/>
+            </a:solidFill>
+            <a:prstDash val="dash"/>
+          </a:ln>
+        </p:spPr>
+        <p:style>
+          <a:lnRef idx="1">
+            <a:schemeClr val="accent1"/>
+          </a:lnRef>
+          <a:fillRef idx="0">
+            <a:schemeClr val="accent1"/>
+          </a:fillRef>
+          <a:effectRef idx="0">
+            <a:schemeClr val="accent1"/>
+          </a:effectRef>
+          <a:fontRef idx="minor">
+            <a:schemeClr val="tx1"/>
+          </a:fontRef>
+        </p:style>
+      </p:cxnSp>
+      <p:cxnSp>
+        <p:nvCxnSpPr>
+          <p:cNvPr id="22" name="曲线连接符 21"/>
+          <p:cNvCxnSpPr>
+            <a:endCxn id="199" idx="2"/>
+          </p:cNvCxnSpPr>
+          <p:nvPr/>
+        </p:nvCxnSpPr>
+        <p:spPr>
+          <a:xfrm rot="10800000">
+            <a:off x="3437255" y="38970585"/>
+            <a:ext cx="3062605" cy="614680"/>
+          </a:xfrm>
+          <a:prstGeom prst="curvedConnector2">
+            <a:avLst/>
+          </a:prstGeom>
+          <a:ln w="38100">
+            <a:solidFill>
+              <a:schemeClr val="tx1"/>
+            </a:solidFill>
+            <a:headEnd type="none"/>
+            <a:tailEnd type="stealth" w="lg" len="lg"/>
+          </a:ln>
+        </p:spPr>
+        <p:style>
+          <a:lnRef idx="1">
+            <a:schemeClr val="accent1"/>
+          </a:lnRef>
+          <a:fillRef idx="0">
+            <a:schemeClr val="accent1"/>
+          </a:fillRef>
+          <a:effectRef idx="0">
+            <a:schemeClr val="accent1"/>
+          </a:effectRef>
+          <a:fontRef idx="minor">
+            <a:schemeClr val="tx1"/>
+          </a:fontRef>
+        </p:style>
+      </p:cxnSp>
+      <p:cxnSp>
+        <p:nvCxnSpPr>
+          <p:cNvPr id="23" name="曲线连接符 22"/>
+          <p:cNvCxnSpPr>
+            <a:stCxn id="209" idx="1"/>
+            <a:endCxn id="199" idx="2"/>
+          </p:cNvCxnSpPr>
+          <p:nvPr/>
+        </p:nvCxnSpPr>
+        <p:spPr>
+          <a:xfrm rot="10800000">
+            <a:off x="3437890" y="38970585"/>
+            <a:ext cx="3119120" cy="2147570"/>
+          </a:xfrm>
+          <a:prstGeom prst="curvedConnector2">
+            <a:avLst/>
+          </a:prstGeom>
+          <a:ln w="38100">
+            <a:solidFill>
+              <a:schemeClr val="tx1"/>
+            </a:solidFill>
+            <a:headEnd type="none"/>
+            <a:tailEnd type="stealth" w="lg" len="lg"/>
+          </a:ln>
+        </p:spPr>
+        <p:style>
+          <a:lnRef idx="1">
+            <a:schemeClr val="accent1"/>
+          </a:lnRef>
+          <a:fillRef idx="0">
+            <a:schemeClr val="accent1"/>
+          </a:fillRef>
+          <a:effectRef idx="0">
+            <a:schemeClr val="accent1"/>
+          </a:effectRef>
+          <a:fontRef idx="minor">
+            <a:schemeClr val="tx1"/>
+          </a:fontRef>
+        </p:style>
+      </p:cxnSp>
+      <p:cxnSp>
+        <p:nvCxnSpPr>
+          <p:cNvPr id="24" name="曲线连接符 23"/>
+          <p:cNvCxnSpPr/>
+          <p:nvPr/>
+        </p:nvCxnSpPr>
+        <p:spPr>
+          <a:xfrm rot="10800000">
+            <a:off x="12002770" y="38959790"/>
+            <a:ext cx="3062605" cy="614680"/>
+          </a:xfrm>
+          <a:prstGeom prst="curvedConnector2">
+            <a:avLst/>
+          </a:prstGeom>
+          <a:ln w="38100">
+            <a:solidFill>
+              <a:schemeClr val="tx1"/>
+            </a:solidFill>
+            <a:headEnd type="none"/>
+            <a:tailEnd type="stealth" w="lg" len="lg"/>
+          </a:ln>
+        </p:spPr>
+        <p:style>
+          <a:lnRef idx="1">
+            <a:schemeClr val="accent1"/>
+          </a:lnRef>
+          <a:fillRef idx="0">
+            <a:schemeClr val="accent1"/>
+          </a:fillRef>
+          <a:effectRef idx="0">
+            <a:schemeClr val="accent1"/>
+          </a:effectRef>
+          <a:fontRef idx="minor">
+            <a:schemeClr val="tx1"/>
+          </a:fontRef>
+        </p:style>
+      </p:cxnSp>
+      <p:cxnSp>
+        <p:nvCxnSpPr>
+          <p:cNvPr id="28" name="曲线连接符 27"/>
+          <p:cNvCxnSpPr/>
+          <p:nvPr/>
+        </p:nvCxnSpPr>
+        <p:spPr>
+          <a:xfrm rot="10800000">
+            <a:off x="11965305" y="38978840"/>
+            <a:ext cx="3119120" cy="2147570"/>
+          </a:xfrm>
+          <a:prstGeom prst="curvedConnector2">
+            <a:avLst/>
+          </a:prstGeom>
+          <a:ln w="38100">
+            <a:solidFill>
+              <a:schemeClr val="tx1"/>
+            </a:solidFill>
+            <a:headEnd type="none"/>
+            <a:tailEnd type="stealth" w="lg" len="lg"/>
+          </a:ln>
+        </p:spPr>
+        <p:style>
+          <a:lnRef idx="1">
+            <a:schemeClr val="accent1"/>
+          </a:lnRef>
+          <a:fillRef idx="0">
+            <a:schemeClr val="accent1"/>
+          </a:fillRef>
+          <a:effectRef idx="0">
+            <a:schemeClr val="accent1"/>
+          </a:effectRef>
+          <a:fontRef idx="minor">
+            <a:schemeClr val="tx1"/>
+          </a:fontRef>
+        </p:style>
+      </p:cxnSp>
+      <p:cxnSp>
+        <p:nvCxnSpPr>
+          <p:cNvPr id="13" name="直接箭头连接符 12"/>
+          <p:cNvCxnSpPr/>
+          <p:nvPr/>
+        </p:nvCxnSpPr>
+        <p:spPr>
+          <a:xfrm flipH="1">
+            <a:off x="9722485" y="35299015"/>
+            <a:ext cx="4445" cy="775335"/>
+          </a:xfrm>
+          <a:prstGeom prst="straightConnector1">
+            <a:avLst/>
+          </a:prstGeom>
+          <a:ln w="38100">
+            <a:solidFill>
+              <a:srgbClr val="FF0000"/>
+            </a:solidFill>
+            <a:tailEnd type="arrow"/>
+          </a:ln>
+        </p:spPr>
+        <p:style>
+          <a:lnRef idx="1">
+            <a:schemeClr val="accent1"/>
+          </a:lnRef>
+          <a:fillRef idx="0">
+            <a:schemeClr val="accent1"/>
+          </a:fillRef>
+          <a:effectRef idx="0">
+            <a:schemeClr val="accent1"/>
+          </a:effectRef>
+          <a:fontRef idx="minor">
+            <a:schemeClr val="tx1"/>
+          </a:fontRef>
+        </p:style>
+      </p:cxnSp>
     </p:spTree>
   </p:cSld>
   <p:clrMapOvr>

</xml_diff>

<commit_message>
add inkscape figure in chapter 4 and recommendation case for application
</commit_message>
<xml_diff>
--- a/images/data_flow.pptx
+++ b/images/data_flow.pptx
@@ -4164,18 +4164,6 @@
               <a:t>deviation </a:t>
             </a:r>
             <a:r>
-              <a:rPr lang="de-DE" sz="3600" i="1" dirty="0" smtClean="0">
-                <a:effectLst>
-                  <a:outerShdw blurRad="38100" dist="38100" dir="2700000" algn="tl">
-                    <a:srgbClr val="000000">
-                      <a:alpha val="43137"/>
-                    </a:srgbClr>
-                  </a:outerShdw>
-                </a:effectLst>
-              </a:rPr>
-              <a:t>∆</a:t>
-            </a:r>
-            <a:r>
               <a:rPr lang="el-GR" sz="3600" i="1" dirty="0">
                 <a:effectLst>
                   <a:outerShdw blurRad="38100" dist="38100" dir="2700000" algn="tl">
@@ -4756,18 +4744,6 @@
                 </a:effectLst>
               </a:rPr>
               <a:t>deviation </a:t>
-            </a:r>
-            <a:r>
-              <a:rPr lang="de-DE" sz="3600" i="1" dirty="0" smtClean="0">
-                <a:effectLst>
-                  <a:outerShdw blurRad="38100" dist="38100" dir="2700000" algn="tl">
-                    <a:srgbClr val="000000">
-                      <a:alpha val="43137"/>
-                    </a:srgbClr>
-                  </a:outerShdw>
-                </a:effectLst>
-              </a:rPr>
-              <a:t>∆</a:t>
             </a:r>
             <a:r>
               <a:rPr lang="el-GR" sz="3600" i="1" dirty="0">

</xml_diff>

<commit_message>
abstract,conclusion german+realization network modified
</commit_message>
<xml_diff>
--- a/images/data_flow.pptx
+++ b/images/data_flow.pptx
@@ -6668,7 +6668,7 @@
         </p:nvSpPr>
         <p:spPr>
           <a:xfrm>
-            <a:off x="5038455" y="20641979"/>
+            <a:off x="5016865" y="20661029"/>
             <a:ext cx="3809833" cy="1193800"/>
           </a:xfrm>
           <a:prstGeom prst="rect">
@@ -8181,8 +8181,8 @@
         </p:nvSpPr>
         <p:spPr>
           <a:xfrm>
-            <a:off x="11331876" y="27051773"/>
-            <a:ext cx="1298016" cy="1492877"/>
+            <a:off x="11331575" y="27051635"/>
+            <a:ext cx="1565910" cy="1492885"/>
           </a:xfrm>
           <a:prstGeom prst="rect">
             <a:avLst/>

</xml_diff>